<commit_message>
modification du pp et du exel
</commit_message>
<xml_diff>
--- a/Rapport audit.pptx
+++ b/Rapport audit.pptx
@@ -5,7 +5,7 @@
     <p:sldMasterId id="2147483660" r:id="rId1"/>
   </p:sldMasterIdLst>
   <p:notesMasterIdLst>
-    <p:notesMasterId r:id="rId27"/>
+    <p:notesMasterId r:id="rId26"/>
   </p:notesMasterIdLst>
   <p:sldIdLst>
     <p:sldId id="256" r:id="rId2"/>
@@ -29,10 +29,9 @@
     <p:sldId id="265" r:id="rId20"/>
     <p:sldId id="269" r:id="rId21"/>
     <p:sldId id="273" r:id="rId22"/>
-    <p:sldId id="274" r:id="rId23"/>
-    <p:sldId id="281" r:id="rId24"/>
-    <p:sldId id="275" r:id="rId25"/>
-    <p:sldId id="276" r:id="rId26"/>
+    <p:sldId id="281" r:id="rId23"/>
+    <p:sldId id="275" r:id="rId24"/>
+    <p:sldId id="276" r:id="rId25"/>
   </p:sldIdLst>
   <p:sldSz cx="9144000" cy="6858000" type="screen4x3"/>
   <p:notesSz cx="6858000" cy="9144000"/>
@@ -217,7 +216,7 @@
             <a:fld id="{14D24793-A503-4F90-ABDF-E673D6CE5CC6}" type="datetimeFigureOut">
               <a:rPr lang="fr-FR" smtClean="0"/>
               <a:pPr/>
-              <a:t>29/03/2022</a:t>
+              <a:t>06/04/2022</a:t>
             </a:fld>
             <a:endParaRPr lang="fr-FR"/>
           </a:p>
@@ -1191,7 +1190,7 @@
             <a:fld id="{46424B8A-6F70-4E04-A385-B9478C8C335B}" type="datetimeFigureOut">
               <a:rPr lang="fr-FR" smtClean="0"/>
               <a:pPr/>
-              <a:t>29/03/2022</a:t>
+              <a:t>06/04/2022</a:t>
             </a:fld>
             <a:endParaRPr lang="fr-FR"/>
           </a:p>
@@ -1389,7 +1388,7 @@
             <a:fld id="{46424B8A-6F70-4E04-A385-B9478C8C335B}" type="datetimeFigureOut">
               <a:rPr lang="fr-FR" smtClean="0"/>
               <a:pPr/>
-              <a:t>29/03/2022</a:t>
+              <a:t>06/04/2022</a:t>
             </a:fld>
             <a:endParaRPr lang="fr-FR"/>
           </a:p>
@@ -1576,7 +1575,7 @@
             <a:fld id="{46424B8A-6F70-4E04-A385-B9478C8C335B}" type="datetimeFigureOut">
               <a:rPr lang="fr-FR" smtClean="0"/>
               <a:pPr/>
-              <a:t>29/03/2022</a:t>
+              <a:t>06/04/2022</a:t>
             </a:fld>
             <a:endParaRPr lang="fr-FR"/>
           </a:p>
@@ -1728,7 +1727,7 @@
             <a:fld id="{46424B8A-6F70-4E04-A385-B9478C8C335B}" type="datetimeFigureOut">
               <a:rPr lang="fr-FR" smtClean="0"/>
               <a:pPr/>
-              <a:t>29/03/2022</a:t>
+              <a:t>06/04/2022</a:t>
             </a:fld>
             <a:endParaRPr lang="fr-FR"/>
           </a:p>
@@ -1985,7 +1984,7 @@
             <a:fld id="{46424B8A-6F70-4E04-A385-B9478C8C335B}" type="datetimeFigureOut">
               <a:rPr lang="fr-FR" smtClean="0"/>
               <a:pPr/>
-              <a:t>29/03/2022</a:t>
+              <a:t>06/04/2022</a:t>
             </a:fld>
             <a:endParaRPr lang="fr-FR"/>
           </a:p>
@@ -2396,7 +2395,7 @@
             <a:fld id="{46424B8A-6F70-4E04-A385-B9478C8C335B}" type="datetimeFigureOut">
               <a:rPr lang="fr-FR" smtClean="0"/>
               <a:pPr/>
-              <a:t>29/03/2022</a:t>
+              <a:t>06/04/2022</a:t>
             </a:fld>
             <a:endParaRPr lang="fr-FR"/>
           </a:p>
@@ -2844,7 +2843,7 @@
             <a:fld id="{46424B8A-6F70-4E04-A385-B9478C8C335B}" type="datetimeFigureOut">
               <a:rPr lang="fr-FR" smtClean="0"/>
               <a:pPr/>
-              <a:t>29/03/2022</a:t>
+              <a:t>06/04/2022</a:t>
             </a:fld>
             <a:endParaRPr lang="fr-FR"/>
           </a:p>
@@ -2947,7 +2946,7 @@
             <a:fld id="{46424B8A-6F70-4E04-A385-B9478C8C335B}" type="datetimeFigureOut">
               <a:rPr lang="fr-FR" smtClean="0"/>
               <a:pPr/>
-              <a:t>29/03/2022</a:t>
+              <a:t>06/04/2022</a:t>
             </a:fld>
             <a:endParaRPr lang="fr-FR"/>
           </a:p>
@@ -3070,7 +3069,7 @@
             <a:fld id="{46424B8A-6F70-4E04-A385-B9478C8C335B}" type="datetimeFigureOut">
               <a:rPr lang="fr-FR" smtClean="0"/>
               <a:pPr/>
-              <a:t>29/03/2022</a:t>
+              <a:t>06/04/2022</a:t>
             </a:fld>
             <a:endParaRPr lang="fr-FR"/>
           </a:p>
@@ -3346,7 +3345,7 @@
             <a:fld id="{46424B8A-6F70-4E04-A385-B9478C8C335B}" type="datetimeFigureOut">
               <a:rPr lang="fr-FR" smtClean="0"/>
               <a:pPr/>
-              <a:t>29/03/2022</a:t>
+              <a:t>06/04/2022</a:t>
             </a:fld>
             <a:endParaRPr lang="fr-FR"/>
           </a:p>
@@ -3553,7 +3552,7 @@
             <a:fld id="{46424B8A-6F70-4E04-A385-B9478C8C335B}" type="datetimeFigureOut">
               <a:rPr lang="fr-FR" smtClean="0"/>
               <a:pPr/>
-              <a:t>29/03/2022</a:t>
+              <a:t>06/04/2022</a:t>
             </a:fld>
             <a:endParaRPr lang="fr-FR"/>
           </a:p>
@@ -4664,7 +4663,7 @@
             <a:fld id="{46424B8A-6F70-4E04-A385-B9478C8C335B}" type="datetimeFigureOut">
               <a:rPr lang="fr-FR" smtClean="0"/>
               <a:pPr/>
-              <a:t>29/03/2022</a:t>
+              <a:t>06/04/2022</a:t>
             </a:fld>
             <a:endParaRPr lang="fr-FR"/>
           </a:p>
@@ -7111,10 +7110,10 @@
               <a:t>Ou on aurais aussi pu utiliser l’attribut « for </a:t>
             </a:r>
             <a:r>
-              <a:rPr lang="fr-FR" dirty="0" smtClean="0"/>
+              <a:rPr lang="fr-FR" sz="1600" dirty="0" smtClean="0"/>
               <a:t>»</a:t>
             </a:r>
-            <a:endParaRPr lang="fr-FR" dirty="0"/>
+            <a:endParaRPr lang="fr-FR" sz="1600" dirty="0"/>
           </a:p>
         </p:txBody>
       </p:sp>
@@ -7293,23 +7292,7 @@
           <a:p>
             <a:r>
               <a:rPr lang="fr-FR" sz="1600" dirty="0" smtClean="0"/>
-              <a:t>Pour des question </a:t>
-            </a:r>
-            <a:r>
-              <a:rPr lang="fr-FR" sz="1600" dirty="0" smtClean="0"/>
-              <a:t>évidente </a:t>
-            </a:r>
-            <a:r>
-              <a:rPr lang="fr-FR" sz="1600" dirty="0" smtClean="0"/>
-              <a:t>de </a:t>
-            </a:r>
-            <a:r>
-              <a:rPr lang="fr-FR" sz="1600" dirty="0" smtClean="0"/>
-              <a:t>lisibilité </a:t>
-            </a:r>
-            <a:r>
-              <a:rPr lang="fr-FR" sz="1600" dirty="0" smtClean="0"/>
-              <a:t>j’ai passer le texte en noir</a:t>
+              <a:t>Pour des question évidente de lisibilité j’ai passer le texte en noir</a:t>
             </a:r>
             <a:endParaRPr lang="fr-FR" sz="1600" dirty="0"/>
           </a:p>
@@ -7498,31 +7481,7 @@
               <a:rPr lang="fr-FR" sz="1600" dirty="0" smtClean="0">
                 <a:cs typeface="Tahoma" pitchFamily="2"/>
               </a:rPr>
-              <a:t>toute </a:t>
-            </a:r>
-            <a:r>
-              <a:rPr lang="fr-FR" sz="1600" dirty="0" smtClean="0">
-                <a:cs typeface="Tahoma" pitchFamily="2"/>
-              </a:rPr>
-              <a:t>les </a:t>
-            </a:r>
-            <a:r>
-              <a:rPr lang="fr-FR" sz="1600" dirty="0" smtClean="0">
-                <a:cs typeface="Tahoma" pitchFamily="2"/>
-              </a:rPr>
-              <a:t>images </a:t>
-            </a:r>
-            <a:r>
-              <a:rPr lang="fr-FR" sz="1600" dirty="0" smtClean="0">
-                <a:cs typeface="Tahoma" pitchFamily="2"/>
-              </a:rPr>
-              <a:t>les images </a:t>
-            </a:r>
-            <a:r>
-              <a:rPr lang="fr-FR" sz="1600" dirty="0" smtClean="0">
-                <a:cs typeface="Tahoma" pitchFamily="2"/>
-              </a:rPr>
-              <a:t>on </a:t>
+              <a:t>toute les images les images on </a:t>
             </a:r>
             <a:r>
               <a:rPr lang="fr-FR" sz="1600" dirty="0" err="1" smtClean="0">
@@ -7534,13 +7493,7 @@
               <a:rPr lang="fr-FR" sz="1600" dirty="0" smtClean="0">
                 <a:cs typeface="Tahoma" pitchFamily="2"/>
               </a:rPr>
-              <a:t> </a:t>
-            </a:r>
-            <a:r>
-              <a:rPr lang="fr-FR" sz="1600" dirty="0" smtClean="0">
-                <a:cs typeface="Tahoma" pitchFamily="2"/>
-              </a:rPr>
-              <a:t>converti en .</a:t>
+              <a:t> converti en .</a:t>
             </a:r>
             <a:r>
               <a:rPr lang="fr-FR" sz="1600" dirty="0" err="1" smtClean="0">
@@ -7851,8 +7804,8 @@
         </p:nvSpPr>
         <p:spPr>
           <a:xfrm>
-            <a:off x="457200" y="1481329"/>
-            <a:ext cx="8229600" cy="2233424"/>
+            <a:off x="457200" y="1481328"/>
+            <a:ext cx="8229600" cy="3090679"/>
           </a:xfrm>
         </p:spPr>
         <p:txBody>
@@ -7868,6 +7821,24 @@
               </a:rPr>
               <a:t>Les balises Alt ont maintenant une description pertinente qui contient le descriptif de l’image ou des mots clé comme le nom de l’agence, son activité ou sa localisation. LightHouse améliore le score de Best Practices, mais cela à aussi un rôle sur le SEO.</a:t>
             </a:r>
+          </a:p>
+          <a:p>
+            <a:pPr lvl="0"/>
+            <a:r>
+              <a:rPr lang="fr-FR" dirty="0" smtClean="0">
+                <a:cs typeface="Tahoma" pitchFamily="2"/>
+              </a:rPr>
+              <a:t>Nous avons également améliorer l’accessibilité de la page d’accueil grâce à cette </a:t>
+            </a:r>
+            <a:r>
+              <a:rPr lang="fr-FR" dirty="0" err="1" smtClean="0">
+                <a:cs typeface="Tahoma" pitchFamily="2"/>
+              </a:rPr>
+              <a:t>checklist</a:t>
+            </a:r>
+            <a:endParaRPr lang="fr-FR" dirty="0" smtClean="0">
+              <a:cs typeface="Tahoma" pitchFamily="2"/>
+            </a:endParaRPr>
           </a:p>
           <a:p>
             <a:endParaRPr lang="fr-FR" dirty="0"/>
@@ -8028,46 +7999,139 @@
         </p:nvSpPr>
         <p:spPr/>
         <p:txBody>
+          <a:bodyPr>
+            <a:normAutofit/>
+          </a:bodyPr>
+          <a:lstStyle/>
+          <a:p>
+            <a:r>
+              <a:rPr lang="fr-FR" sz="1800" dirty="0" smtClean="0"/>
+              <a:t>La page 2 </a:t>
+            </a:r>
+          </a:p>
+          <a:p>
+            <a:r>
+              <a:rPr lang="fr-FR" sz="1800" dirty="0" smtClean="0"/>
+              <a:t> </a:t>
+            </a:r>
+            <a:r>
+              <a:rPr lang="en-US" sz="1800" dirty="0" smtClean="0"/>
+              <a:t>Error: </a:t>
+            </a:r>
+          </a:p>
+          <a:p>
+            <a:r>
+              <a:rPr lang="en-US" sz="1800" dirty="0" smtClean="0"/>
+              <a:t>Attribute success-</a:t>
+            </a:r>
+            <a:r>
+              <a:rPr lang="en-US" sz="1800" dirty="0" err="1" smtClean="0"/>
+              <a:t>msg</a:t>
+            </a:r>
+            <a:r>
+              <a:rPr lang="en-US" sz="1800" dirty="0" smtClean="0"/>
+              <a:t> not allowed on element </a:t>
+            </a:r>
+            <a:r>
+              <a:rPr lang="en-US" sz="1800" dirty="0" smtClean="0">
+                <a:hlinkClick r:id="rId2"/>
+              </a:rPr>
+              <a:t>form</a:t>
+            </a:r>
+            <a:r>
+              <a:rPr lang="en-US" sz="1800" dirty="0" smtClean="0"/>
+              <a:t> at this point.</a:t>
+            </a:r>
+          </a:p>
+          <a:p>
+            <a:endParaRPr lang="en-US" sz="1800" dirty="0" smtClean="0"/>
+          </a:p>
+          <a:p>
+            <a:r>
+              <a:rPr lang="en-US" sz="1800" dirty="0" smtClean="0"/>
+              <a:t> Attribute fail-</a:t>
+            </a:r>
+            <a:r>
+              <a:rPr lang="en-US" sz="1800" dirty="0" err="1" smtClean="0"/>
+              <a:t>msg</a:t>
+            </a:r>
+            <a:r>
+              <a:rPr lang="en-US" sz="1800" dirty="0" smtClean="0"/>
+              <a:t> not allowed on element </a:t>
+            </a:r>
+            <a:r>
+              <a:rPr lang="en-US" sz="1800" dirty="0" smtClean="0">
+                <a:hlinkClick r:id="rId2"/>
+              </a:rPr>
+              <a:t>form</a:t>
+            </a:r>
+            <a:r>
+              <a:rPr lang="en-US" sz="1800" dirty="0" smtClean="0"/>
+              <a:t> at this point.</a:t>
+            </a:r>
+          </a:p>
+          <a:p>
+            <a:pPr>
+              <a:buNone/>
+            </a:pPr>
+            <a:endParaRPr lang="en-US" sz="1800" dirty="0" smtClean="0"/>
+          </a:p>
+          <a:p>
+            <a:r>
+              <a:rPr lang="en-US" sz="1800" dirty="0" smtClean="0"/>
+              <a:t>Et </a:t>
+            </a:r>
+            <a:r>
+              <a:rPr lang="en-US" sz="1800" dirty="0" err="1" smtClean="0"/>
+              <a:t>encor</a:t>
+            </a:r>
+            <a:r>
+              <a:rPr lang="en-US" sz="1800" dirty="0" smtClean="0"/>
+              <a:t> plus de </a:t>
+            </a:r>
+            <a:r>
+              <a:rPr lang="en-US" sz="1800" dirty="0" err="1" smtClean="0"/>
+              <a:t>probleme</a:t>
+            </a:r>
+            <a:r>
+              <a:rPr lang="en-US" sz="1800" dirty="0" smtClean="0"/>
+              <a:t> </a:t>
+            </a:r>
+            <a:r>
+              <a:rPr lang="en-US" sz="1800" dirty="0" err="1" smtClean="0"/>
+              <a:t>lier</a:t>
+            </a:r>
+            <a:r>
+              <a:rPr lang="en-US" sz="1800" dirty="0" smtClean="0"/>
+              <a:t> au </a:t>
+            </a:r>
+            <a:r>
+              <a:rPr lang="en-US" sz="1800" dirty="0" err="1" smtClean="0"/>
+              <a:t>css</a:t>
+            </a:r>
+            <a:endParaRPr lang="fr-FR" sz="1800" dirty="0"/>
+          </a:p>
+        </p:txBody>
+      </p:sp>
+      <p:sp>
+        <p:nvSpPr>
+          <p:cNvPr id="3" name="Titre 2"/>
+          <p:cNvSpPr>
+            <a:spLocks noGrp="1"/>
+          </p:cNvSpPr>
+          <p:nvPr>
+            <p:ph type="title"/>
+          </p:nvPr>
+        </p:nvSpPr>
+        <p:spPr/>
+        <p:txBody>
           <a:bodyPr/>
           <a:lstStyle/>
           <a:p>
-            <a:pPr lvl="0"/>
-            <a:r>
-              <a:rPr lang="fr-FR" dirty="0" smtClean="0">
-                <a:cs typeface="Tahoma" pitchFamily="2"/>
-              </a:rPr>
-              <a:t>Nous avons également améliorer l’accessibilité de la page d’accueil grâce à cette </a:t>
-            </a:r>
-            <a:r>
-              <a:rPr lang="fr-FR" dirty="0" err="1" smtClean="0">
-                <a:cs typeface="Tahoma" pitchFamily="2"/>
-              </a:rPr>
-              <a:t>checklist</a:t>
-            </a:r>
-            <a:endParaRPr lang="fr-FR" dirty="0" smtClean="0">
-              <a:cs typeface="Tahoma" pitchFamily="2"/>
-            </a:endParaRPr>
-          </a:p>
-          <a:p>
-            <a:endParaRPr lang="fr-FR" dirty="0"/>
-          </a:p>
-        </p:txBody>
-      </p:sp>
-      <p:sp>
-        <p:nvSpPr>
-          <p:cNvPr id="3" name="Titre 2"/>
-          <p:cNvSpPr>
-            <a:spLocks noGrp="1"/>
-          </p:cNvSpPr>
-          <p:nvPr>
-            <p:ph type="title"/>
-          </p:nvPr>
-        </p:nvSpPr>
-        <p:spPr/>
-        <p:txBody>
-          <a:bodyPr/>
-          <a:lstStyle/>
-          <a:p>
+            <a:r>
+              <a:rPr lang="fr-FR" dirty="0" smtClean="0"/>
+              <a:t>Ne passe pas au validateur w3c</a:t>
+            </a:r>
             <a:endParaRPr lang="fr-FR" dirty="0"/>
           </a:p>
         </p:txBody>
@@ -8081,180 +8145,6 @@
 </file>
 
 <file path=ppt/slides/slide23.xml><?xml version="1.0" encoding="utf-8"?>
-<p:sld xmlns:a="http://schemas.openxmlformats.org/drawingml/2006/main" xmlns:r="http://schemas.openxmlformats.org/officeDocument/2006/relationships" xmlns:p="http://schemas.openxmlformats.org/presentationml/2006/main">
-  <p:cSld>
-    <p:spTree>
-      <p:nvGrpSpPr>
-        <p:cNvPr id="1" name=""/>
-        <p:cNvGrpSpPr/>
-        <p:nvPr/>
-      </p:nvGrpSpPr>
-      <p:grpSpPr>
-        <a:xfrm>
-          <a:off x="0" y="0"/>
-          <a:ext cx="0" cy="0"/>
-          <a:chOff x="0" y="0"/>
-          <a:chExt cx="0" cy="0"/>
-        </a:xfrm>
-      </p:grpSpPr>
-      <p:sp>
-        <p:nvSpPr>
-          <p:cNvPr id="2" name="Espace réservé du contenu 1"/>
-          <p:cNvSpPr>
-            <a:spLocks noGrp="1"/>
-          </p:cNvSpPr>
-          <p:nvPr>
-            <p:ph idx="1"/>
-          </p:nvPr>
-        </p:nvSpPr>
-        <p:spPr/>
-        <p:txBody>
-          <a:bodyPr>
-            <a:normAutofit/>
-          </a:bodyPr>
-          <a:lstStyle/>
-          <a:p>
-            <a:r>
-              <a:rPr lang="fr-FR" sz="1800" dirty="0" smtClean="0"/>
-              <a:t>La page 2 </a:t>
-            </a:r>
-          </a:p>
-          <a:p>
-            <a:r>
-              <a:rPr lang="fr-FR" sz="1800" dirty="0" smtClean="0"/>
-              <a:t> </a:t>
-            </a:r>
-            <a:r>
-              <a:rPr lang="en-US" sz="1800" dirty="0" smtClean="0"/>
-              <a:t>Error: </a:t>
-            </a:r>
-          </a:p>
-          <a:p>
-            <a:r>
-              <a:rPr lang="en-US" sz="1800" dirty="0" smtClean="0"/>
-              <a:t>Attribute success-</a:t>
-            </a:r>
-            <a:r>
-              <a:rPr lang="en-US" sz="1800" dirty="0" err="1" smtClean="0"/>
-              <a:t>msg</a:t>
-            </a:r>
-            <a:r>
-              <a:rPr lang="en-US" sz="1800" dirty="0" smtClean="0"/>
-              <a:t> not allowed on element </a:t>
-            </a:r>
-            <a:r>
-              <a:rPr lang="en-US" sz="1800" dirty="0" smtClean="0">
-                <a:hlinkClick r:id="rId2"/>
-              </a:rPr>
-              <a:t>form</a:t>
-            </a:r>
-            <a:r>
-              <a:rPr lang="en-US" sz="1800" dirty="0" smtClean="0"/>
-              <a:t> at this point.</a:t>
-            </a:r>
-          </a:p>
-          <a:p>
-            <a:endParaRPr lang="en-US" sz="1800" dirty="0" smtClean="0"/>
-          </a:p>
-          <a:p>
-            <a:r>
-              <a:rPr lang="en-US" sz="1800" dirty="0" smtClean="0"/>
-              <a:t> Attribute fail-</a:t>
-            </a:r>
-            <a:r>
-              <a:rPr lang="en-US" sz="1800" dirty="0" err="1" smtClean="0"/>
-              <a:t>msg</a:t>
-            </a:r>
-            <a:r>
-              <a:rPr lang="en-US" sz="1800" dirty="0" smtClean="0"/>
-              <a:t> not allowed on element </a:t>
-            </a:r>
-            <a:r>
-              <a:rPr lang="en-US" sz="1800" dirty="0" smtClean="0">
-                <a:hlinkClick r:id="rId2"/>
-              </a:rPr>
-              <a:t>form</a:t>
-            </a:r>
-            <a:r>
-              <a:rPr lang="en-US" sz="1800" dirty="0" smtClean="0"/>
-              <a:t> at this point.</a:t>
-            </a:r>
-          </a:p>
-          <a:p>
-            <a:pPr>
-              <a:buNone/>
-            </a:pPr>
-            <a:endParaRPr lang="en-US" sz="1800" dirty="0" smtClean="0"/>
-          </a:p>
-          <a:p>
-            <a:r>
-              <a:rPr lang="en-US" sz="1800" dirty="0" smtClean="0"/>
-              <a:t>Et </a:t>
-            </a:r>
-            <a:r>
-              <a:rPr lang="en-US" sz="1800" dirty="0" err="1" smtClean="0"/>
-              <a:t>encor</a:t>
-            </a:r>
-            <a:r>
-              <a:rPr lang="en-US" sz="1800" dirty="0" smtClean="0"/>
-              <a:t> plus de </a:t>
-            </a:r>
-            <a:r>
-              <a:rPr lang="en-US" sz="1800" dirty="0" err="1" smtClean="0"/>
-              <a:t>probleme</a:t>
-            </a:r>
-            <a:r>
-              <a:rPr lang="en-US" sz="1800" dirty="0" smtClean="0"/>
-              <a:t> </a:t>
-            </a:r>
-            <a:r>
-              <a:rPr lang="en-US" sz="1800" dirty="0" err="1" smtClean="0"/>
-              <a:t>lier</a:t>
-            </a:r>
-            <a:r>
-              <a:rPr lang="en-US" sz="1800" dirty="0" smtClean="0"/>
-              <a:t> au </a:t>
-            </a:r>
-            <a:r>
-              <a:rPr lang="en-US" sz="1800" dirty="0" err="1" smtClean="0"/>
-              <a:t>css</a:t>
-            </a:r>
-            <a:endParaRPr lang="fr-FR" sz="1800" dirty="0"/>
-          </a:p>
-        </p:txBody>
-      </p:sp>
-      <p:sp>
-        <p:nvSpPr>
-          <p:cNvPr id="3" name="Titre 2"/>
-          <p:cNvSpPr>
-            <a:spLocks noGrp="1"/>
-          </p:cNvSpPr>
-          <p:nvPr>
-            <p:ph type="title"/>
-          </p:nvPr>
-        </p:nvSpPr>
-        <p:spPr/>
-        <p:txBody>
-          <a:bodyPr/>
-          <a:lstStyle/>
-          <a:p>
-            <a:r>
-              <a:rPr lang="fr-FR" dirty="0" smtClean="0"/>
-              <a:t>Ne passe pas au validateur w3c</a:t>
-            </a:r>
-            <a:endParaRPr lang="fr-FR" dirty="0"/>
-          </a:p>
-        </p:txBody>
-      </p:sp>
-    </p:spTree>
-  </p:cSld>
-  <p:clrMapOvr>
-    <a:masterClrMapping/>
-  </p:clrMapOvr>
-</p:sld>
-</file>
-
-<file path=ppt/slides/slide24.xml><?xml version="1.0" encoding="utf-8"?>
 <p:sld xmlns:a="http://schemas.openxmlformats.org/drawingml/2006/main" xmlns:r="http://schemas.openxmlformats.org/officeDocument/2006/relationships" xmlns:p="http://schemas.openxmlformats.org/presentationml/2006/main">
   <p:cSld>
     <p:spTree>
@@ -8365,7 +8255,7 @@
 </p:sld>
 </file>
 
-<file path=ppt/slides/slide25.xml><?xml version="1.0" encoding="utf-8"?>
+<file path=ppt/slides/slide24.xml><?xml version="1.0" encoding="utf-8"?>
 <p:sld xmlns:a="http://schemas.openxmlformats.org/drawingml/2006/main" xmlns:r="http://schemas.openxmlformats.org/officeDocument/2006/relationships" xmlns:p="http://schemas.openxmlformats.org/presentationml/2006/main">
   <p:cSld>
     <p:spTree>

</xml_diff>

<commit_message>
dernier mise jour des fichier
</commit_message>
<xml_diff>
--- a/Rapport audit.pptx
+++ b/Rapport audit.pptx
@@ -5,7 +5,7 @@
     <p:sldMasterId id="2147483660" r:id="rId1"/>
   </p:sldMasterIdLst>
   <p:notesMasterIdLst>
-    <p:notesMasterId r:id="rId26"/>
+    <p:notesMasterId r:id="rId24"/>
   </p:notesMasterIdLst>
   <p:sldIdLst>
     <p:sldId id="256" r:id="rId2"/>
@@ -13,25 +13,23 @@
     <p:sldId id="258" r:id="rId4"/>
     <p:sldId id="261" r:id="rId5"/>
     <p:sldId id="259" r:id="rId6"/>
-    <p:sldId id="263" r:id="rId7"/>
-    <p:sldId id="260" r:id="rId8"/>
-    <p:sldId id="264" r:id="rId9"/>
-    <p:sldId id="262" r:id="rId10"/>
-    <p:sldId id="266" r:id="rId11"/>
-    <p:sldId id="268" r:id="rId12"/>
-    <p:sldId id="267" r:id="rId13"/>
-    <p:sldId id="277" r:id="rId14"/>
-    <p:sldId id="271" r:id="rId15"/>
-    <p:sldId id="270" r:id="rId16"/>
-    <p:sldId id="278" r:id="rId17"/>
-    <p:sldId id="279" r:id="rId18"/>
-    <p:sldId id="280" r:id="rId19"/>
-    <p:sldId id="265" r:id="rId20"/>
-    <p:sldId id="269" r:id="rId21"/>
-    <p:sldId id="273" r:id="rId22"/>
-    <p:sldId id="281" r:id="rId23"/>
-    <p:sldId id="275" r:id="rId24"/>
-    <p:sldId id="276" r:id="rId25"/>
+    <p:sldId id="260" r:id="rId7"/>
+    <p:sldId id="264" r:id="rId8"/>
+    <p:sldId id="262" r:id="rId9"/>
+    <p:sldId id="266" r:id="rId10"/>
+    <p:sldId id="268" r:id="rId11"/>
+    <p:sldId id="267" r:id="rId12"/>
+    <p:sldId id="277" r:id="rId13"/>
+    <p:sldId id="271" r:id="rId14"/>
+    <p:sldId id="270" r:id="rId15"/>
+    <p:sldId id="278" r:id="rId16"/>
+    <p:sldId id="279" r:id="rId17"/>
+    <p:sldId id="280" r:id="rId18"/>
+    <p:sldId id="265" r:id="rId19"/>
+    <p:sldId id="269" r:id="rId20"/>
+    <p:sldId id="273" r:id="rId21"/>
+    <p:sldId id="275" r:id="rId22"/>
+    <p:sldId id="276" r:id="rId23"/>
   </p:sldIdLst>
   <p:sldSz cx="9144000" cy="6858000" type="screen4x3"/>
   <p:notesSz cx="6858000" cy="9144000"/>
@@ -216,7 +214,7 @@
             <a:fld id="{14D24793-A503-4F90-ABDF-E673D6CE5CC6}" type="datetimeFigureOut">
               <a:rPr lang="fr-FR" smtClean="0"/>
               <a:pPr/>
-              <a:t>06/04/2022</a:t>
+              <a:t>27/04/2022</a:t>
             </a:fld>
             <a:endParaRPr lang="fr-FR"/>
           </a:p>
@@ -1190,7 +1188,7 @@
             <a:fld id="{46424B8A-6F70-4E04-A385-B9478C8C335B}" type="datetimeFigureOut">
               <a:rPr lang="fr-FR" smtClean="0"/>
               <a:pPr/>
-              <a:t>06/04/2022</a:t>
+              <a:t>27/04/2022</a:t>
             </a:fld>
             <a:endParaRPr lang="fr-FR"/>
           </a:p>
@@ -1388,7 +1386,7 @@
             <a:fld id="{46424B8A-6F70-4E04-A385-B9478C8C335B}" type="datetimeFigureOut">
               <a:rPr lang="fr-FR" smtClean="0"/>
               <a:pPr/>
-              <a:t>06/04/2022</a:t>
+              <a:t>27/04/2022</a:t>
             </a:fld>
             <a:endParaRPr lang="fr-FR"/>
           </a:p>
@@ -1575,7 +1573,7 @@
             <a:fld id="{46424B8A-6F70-4E04-A385-B9478C8C335B}" type="datetimeFigureOut">
               <a:rPr lang="fr-FR" smtClean="0"/>
               <a:pPr/>
-              <a:t>06/04/2022</a:t>
+              <a:t>27/04/2022</a:t>
             </a:fld>
             <a:endParaRPr lang="fr-FR"/>
           </a:p>
@@ -1727,7 +1725,7 @@
             <a:fld id="{46424B8A-6F70-4E04-A385-B9478C8C335B}" type="datetimeFigureOut">
               <a:rPr lang="fr-FR" smtClean="0"/>
               <a:pPr/>
-              <a:t>06/04/2022</a:t>
+              <a:t>27/04/2022</a:t>
             </a:fld>
             <a:endParaRPr lang="fr-FR"/>
           </a:p>
@@ -1984,7 +1982,7 @@
             <a:fld id="{46424B8A-6F70-4E04-A385-B9478C8C335B}" type="datetimeFigureOut">
               <a:rPr lang="fr-FR" smtClean="0"/>
               <a:pPr/>
-              <a:t>06/04/2022</a:t>
+              <a:t>27/04/2022</a:t>
             </a:fld>
             <a:endParaRPr lang="fr-FR"/>
           </a:p>
@@ -2395,7 +2393,7 @@
             <a:fld id="{46424B8A-6F70-4E04-A385-B9478C8C335B}" type="datetimeFigureOut">
               <a:rPr lang="fr-FR" smtClean="0"/>
               <a:pPr/>
-              <a:t>06/04/2022</a:t>
+              <a:t>27/04/2022</a:t>
             </a:fld>
             <a:endParaRPr lang="fr-FR"/>
           </a:p>
@@ -2843,7 +2841,7 @@
             <a:fld id="{46424B8A-6F70-4E04-A385-B9478C8C335B}" type="datetimeFigureOut">
               <a:rPr lang="fr-FR" smtClean="0"/>
               <a:pPr/>
-              <a:t>06/04/2022</a:t>
+              <a:t>27/04/2022</a:t>
             </a:fld>
             <a:endParaRPr lang="fr-FR"/>
           </a:p>
@@ -2946,7 +2944,7 @@
             <a:fld id="{46424B8A-6F70-4E04-A385-B9478C8C335B}" type="datetimeFigureOut">
               <a:rPr lang="fr-FR" smtClean="0"/>
               <a:pPr/>
-              <a:t>06/04/2022</a:t>
+              <a:t>27/04/2022</a:t>
             </a:fld>
             <a:endParaRPr lang="fr-FR"/>
           </a:p>
@@ -3069,7 +3067,7 @@
             <a:fld id="{46424B8A-6F70-4E04-A385-B9478C8C335B}" type="datetimeFigureOut">
               <a:rPr lang="fr-FR" smtClean="0"/>
               <a:pPr/>
-              <a:t>06/04/2022</a:t>
+              <a:t>27/04/2022</a:t>
             </a:fld>
             <a:endParaRPr lang="fr-FR"/>
           </a:p>
@@ -3345,7 +3343,7 @@
             <a:fld id="{46424B8A-6F70-4E04-A385-B9478C8C335B}" type="datetimeFigureOut">
               <a:rPr lang="fr-FR" smtClean="0"/>
               <a:pPr/>
-              <a:t>06/04/2022</a:t>
+              <a:t>27/04/2022</a:t>
             </a:fld>
             <a:endParaRPr lang="fr-FR"/>
           </a:p>
@@ -3552,7 +3550,7 @@
             <a:fld id="{46424B8A-6F70-4E04-A385-B9478C8C335B}" type="datetimeFigureOut">
               <a:rPr lang="fr-FR" smtClean="0"/>
               <a:pPr/>
-              <a:t>06/04/2022</a:t>
+              <a:t>27/04/2022</a:t>
             </a:fld>
             <a:endParaRPr lang="fr-FR"/>
           </a:p>
@@ -4663,7 +4661,7 @@
             <a:fld id="{46424B8A-6F70-4E04-A385-B9478C8C335B}" type="datetimeFigureOut">
               <a:rPr lang="fr-FR" smtClean="0"/>
               <a:pPr/>
-              <a:t>06/04/2022</a:t>
+              <a:t>27/04/2022</a:t>
             </a:fld>
             <a:endParaRPr lang="fr-FR"/>
           </a:p>
@@ -5208,211 +5206,6 @@
               <a:rPr lang="fr-FR" sz="1600" dirty="0" smtClean="0">
                 <a:cs typeface="Tahoma" pitchFamily="2"/>
               </a:rPr>
-              <a:t>Il vaut mieux privilégier la qualité à la quantité, c’est partenaires et </a:t>
-            </a:r>
-            <a:r>
-              <a:rPr lang="fr-FR" sz="1600" dirty="0" err="1" smtClean="0">
-                <a:cs typeface="Tahoma" pitchFamily="2"/>
-              </a:rPr>
-              <a:t>backlinks</a:t>
-            </a:r>
-            <a:r>
-              <a:rPr lang="fr-FR" sz="1600" dirty="0" smtClean="0">
-                <a:cs typeface="Tahoma" pitchFamily="2"/>
-              </a:rPr>
-              <a:t> ne sont pas pertinents pour votre entreprise car</a:t>
-            </a:r>
-          </a:p>
-          <a:p>
-            <a:pPr lvl="0"/>
-            <a:r>
-              <a:rPr lang="fr-FR" sz="1600" dirty="0" smtClean="0">
-                <a:cs typeface="Tahoma" pitchFamily="2"/>
-              </a:rPr>
-              <a:t>ils sont de mauvaise qualité ou hors sujet. Ils ont même un impact négatif car cela s’apparente à du spam, donc une technique « </a:t>
-            </a:r>
-            <a:r>
-              <a:rPr lang="fr-FR" sz="1600" dirty="0" err="1" smtClean="0">
-                <a:cs typeface="Tahoma" pitchFamily="2"/>
-              </a:rPr>
-              <a:t>blackhat</a:t>
-            </a:r>
-            <a:r>
-              <a:rPr lang="fr-FR" sz="1600" dirty="0" smtClean="0">
-                <a:cs typeface="Tahoma" pitchFamily="2"/>
-              </a:rPr>
-              <a:t> ».</a:t>
-            </a:r>
-          </a:p>
-          <a:p>
-            <a:endParaRPr lang="fr-FR" dirty="0"/>
-          </a:p>
-        </p:txBody>
-      </p:sp>
-      <p:sp>
-        <p:nvSpPr>
-          <p:cNvPr id="3" name="Titre 2"/>
-          <p:cNvSpPr>
-            <a:spLocks noGrp="1"/>
-          </p:cNvSpPr>
-          <p:nvPr>
-            <p:ph type="title"/>
-          </p:nvPr>
-        </p:nvSpPr>
-        <p:spPr/>
-        <p:txBody>
-          <a:bodyPr>
-            <a:normAutofit fontScale="90000"/>
-          </a:bodyPr>
-          <a:lstStyle/>
-          <a:p>
-            <a:r>
-              <a:rPr lang="fr-FR" dirty="0" smtClean="0">
-                <a:cs typeface="Tahoma" pitchFamily="2"/>
-              </a:rPr>
-              <a:t>Suppression de l’annuaire et des partenaires</a:t>
-            </a:r>
-            <a:endParaRPr lang="fr-FR" dirty="0"/>
-          </a:p>
-        </p:txBody>
-      </p:sp>
-      <p:pic>
-        <p:nvPicPr>
-          <p:cNvPr id="2050" name="Picture 2" descr="C:\Users\gress\Desktop\P4_gressier_gwenael\seo page 2 apres modif footer.PNG"/>
-          <p:cNvPicPr>
-            <a:picLocks noChangeAspect="1" noChangeArrowheads="1"/>
-          </p:cNvPicPr>
-          <p:nvPr/>
-        </p:nvPicPr>
-        <p:blipFill>
-          <a:blip r:embed="rId2" cstate="print"/>
-          <a:srcRect/>
-          <a:stretch>
-            <a:fillRect/>
-          </a:stretch>
-        </p:blipFill>
-        <p:spPr bwMode="auto">
-          <a:xfrm>
-            <a:off x="5715008" y="4572008"/>
-            <a:ext cx="1058862" cy="1333500"/>
-          </a:xfrm>
-          <a:prstGeom prst="rect">
-            <a:avLst/>
-          </a:prstGeom>
-          <a:noFill/>
-        </p:spPr>
-      </p:pic>
-      <p:pic>
-        <p:nvPicPr>
-          <p:cNvPr id="2051" name="Picture 3" descr="C:\Users\gress\Desktop\P4_gressier_gwenael\lighthouse sur index apres modif description.PNG"/>
-          <p:cNvPicPr>
-            <a:picLocks noChangeAspect="1" noChangeArrowheads="1"/>
-          </p:cNvPicPr>
-          <p:nvPr/>
-        </p:nvPicPr>
-        <p:blipFill>
-          <a:blip r:embed="rId3" cstate="print"/>
-          <a:srcRect/>
-          <a:stretch>
-            <a:fillRect/>
-          </a:stretch>
-        </p:blipFill>
-        <p:spPr bwMode="auto">
-          <a:xfrm>
-            <a:off x="2571736" y="4572008"/>
-            <a:ext cx="1082675" cy="1341437"/>
-          </a:xfrm>
-          <a:prstGeom prst="rect">
-            <a:avLst/>
-          </a:prstGeom>
-          <a:noFill/>
-        </p:spPr>
-      </p:pic>
-      <p:sp>
-        <p:nvSpPr>
-          <p:cNvPr id="6" name="Flèche droite 5"/>
-          <p:cNvSpPr/>
-          <p:nvPr/>
-        </p:nvSpPr>
-        <p:spPr>
-          <a:xfrm>
-            <a:off x="3929058" y="5214950"/>
-            <a:ext cx="1500198" cy="142876"/>
-          </a:xfrm>
-          <a:prstGeom prst="rightArrow">
-            <a:avLst/>
-          </a:prstGeom>
-        </p:spPr>
-        <p:style>
-          <a:lnRef idx="2">
-            <a:schemeClr val="accent1">
-              <a:shade val="50000"/>
-            </a:schemeClr>
-          </a:lnRef>
-          <a:fillRef idx="1">
-            <a:schemeClr val="accent1"/>
-          </a:fillRef>
-          <a:effectRef idx="0">
-            <a:schemeClr val="accent1"/>
-          </a:effectRef>
-          <a:fontRef idx="minor">
-            <a:schemeClr val="lt1"/>
-          </a:fontRef>
-        </p:style>
-        <p:txBody>
-          <a:bodyPr rtlCol="0" anchor="ctr"/>
-          <a:lstStyle/>
-          <a:p>
-            <a:pPr algn="ctr"/>
-            <a:endParaRPr lang="fr-FR"/>
-          </a:p>
-        </p:txBody>
-      </p:sp>
-    </p:spTree>
-  </p:cSld>
-  <p:clrMapOvr>
-    <a:masterClrMapping/>
-  </p:clrMapOvr>
-</p:sld>
-</file>
-
-<file path=ppt/slides/slide11.xml><?xml version="1.0" encoding="utf-8"?>
-<p:sld xmlns:a="http://schemas.openxmlformats.org/drawingml/2006/main" xmlns:r="http://schemas.openxmlformats.org/officeDocument/2006/relationships" xmlns:p="http://schemas.openxmlformats.org/presentationml/2006/main">
-  <p:cSld>
-    <p:spTree>
-      <p:nvGrpSpPr>
-        <p:cNvPr id="1" name=""/>
-        <p:cNvGrpSpPr/>
-        <p:nvPr/>
-      </p:nvGrpSpPr>
-      <p:grpSpPr>
-        <a:xfrm>
-          <a:off x="0" y="0"/>
-          <a:ext cx="0" cy="0"/>
-          <a:chOff x="0" y="0"/>
-          <a:chExt cx="0" cy="0"/>
-        </a:xfrm>
-      </p:grpSpPr>
-      <p:sp>
-        <p:nvSpPr>
-          <p:cNvPr id="2" name="Espace réservé du contenu 1"/>
-          <p:cNvSpPr>
-            <a:spLocks noGrp="1"/>
-          </p:cNvSpPr>
-          <p:nvPr>
-            <p:ph idx="1"/>
-          </p:nvPr>
-        </p:nvSpPr>
-        <p:spPr/>
-        <p:txBody>
-          <a:bodyPr/>
-          <a:lstStyle/>
-          <a:p>
-            <a:pPr lvl="0"/>
-            <a:r>
-              <a:rPr lang="fr-FR" dirty="0" smtClean="0">
-                <a:cs typeface="Tahoma" pitchFamily="2"/>
-              </a:rPr>
               <a:t>Il y a celons moi un fort intérêt au niveau de l’accessibilité pour les malvoyants et ça augmente même le score SEO de nos pages.</a:t>
             </a:r>
           </a:p>
@@ -5786,6 +5579,207 @@
 </p:sld>
 </file>
 
+<file path=ppt/slides/slide11.xml><?xml version="1.0" encoding="utf-8"?>
+<p:sld xmlns:a="http://schemas.openxmlformats.org/drawingml/2006/main" xmlns:r="http://schemas.openxmlformats.org/officeDocument/2006/relationships" xmlns:p="http://schemas.openxmlformats.org/presentationml/2006/main">
+  <p:cSld>
+    <p:spTree>
+      <p:nvGrpSpPr>
+        <p:cNvPr id="1" name=""/>
+        <p:cNvGrpSpPr/>
+        <p:nvPr/>
+      </p:nvGrpSpPr>
+      <p:grpSpPr>
+        <a:xfrm>
+          <a:off x="0" y="0"/>
+          <a:ext cx="0" cy="0"/>
+          <a:chOff x="0" y="0"/>
+          <a:chExt cx="0" cy="0"/>
+        </a:xfrm>
+      </p:grpSpPr>
+      <p:sp>
+        <p:nvSpPr>
+          <p:cNvPr id="2" name="Espace réservé du contenu 1"/>
+          <p:cNvSpPr>
+            <a:spLocks noGrp="1"/>
+          </p:cNvSpPr>
+          <p:nvPr>
+            <p:ph idx="1"/>
+          </p:nvPr>
+        </p:nvSpPr>
+        <p:spPr>
+          <a:xfrm>
+            <a:off x="457200" y="1481329"/>
+            <a:ext cx="8229600" cy="1804796"/>
+          </a:xfrm>
+        </p:spPr>
+        <p:txBody>
+          <a:bodyPr>
+            <a:normAutofit fontScale="62500" lnSpcReduction="20000"/>
+          </a:bodyPr>
+          <a:lstStyle/>
+          <a:p>
+            <a:pPr lvl="0"/>
+            <a:r>
+              <a:rPr lang="fr-FR" dirty="0" smtClean="0">
+                <a:cs typeface="Tahoma" pitchFamily="2"/>
+              </a:rPr>
+              <a:t>Cela permet de charger le  site plus rapidement, car les images sont des fichiers plus lourds que du texte brute. Ca permet aussi à Google de savoir de quoi parle le texte car il pourra le lire, et permet aussi au malvoyants de lire le texte via un lecteur d’écran.</a:t>
+            </a:r>
+          </a:p>
+          <a:p>
+            <a:pPr lvl="0"/>
+            <a:endParaRPr lang="fr-FR" dirty="0" smtClean="0">
+              <a:cs typeface="Tahoma" pitchFamily="2"/>
+            </a:endParaRPr>
+          </a:p>
+          <a:p>
+            <a:pPr lvl="0"/>
+            <a:r>
+              <a:rPr lang="fr-FR" dirty="0" smtClean="0">
+                <a:cs typeface="Tahoma" pitchFamily="2"/>
+              </a:rPr>
+              <a:t>Le taille du site est allégée, le nombre de requête et donc le temps de chargement le sont aussi.</a:t>
+            </a:r>
+          </a:p>
+          <a:p>
+            <a:endParaRPr lang="fr-FR" dirty="0" smtClean="0"/>
+          </a:p>
+        </p:txBody>
+      </p:sp>
+      <p:sp>
+        <p:nvSpPr>
+          <p:cNvPr id="3" name="Titre 2"/>
+          <p:cNvSpPr>
+            <a:spLocks noGrp="1"/>
+          </p:cNvSpPr>
+          <p:nvPr>
+            <p:ph type="title"/>
+          </p:nvPr>
+        </p:nvSpPr>
+        <p:spPr/>
+        <p:txBody>
+          <a:bodyPr>
+            <a:normAutofit fontScale="90000"/>
+          </a:bodyPr>
+          <a:lstStyle/>
+          <a:p>
+            <a:r>
+              <a:rPr lang="fr-FR" dirty="0" smtClean="0">
+                <a:cs typeface="Tahoma" pitchFamily="2"/>
+              </a:rPr>
+              <a:t>Remplacement des images qui n’affichent que du texte</a:t>
+            </a:r>
+            <a:endParaRPr lang="fr-FR" dirty="0"/>
+          </a:p>
+        </p:txBody>
+      </p:sp>
+      <p:pic>
+        <p:nvPicPr>
+          <p:cNvPr id="1026" name="Picture 2"/>
+          <p:cNvPicPr>
+            <a:picLocks noChangeAspect="1" noChangeArrowheads="1"/>
+          </p:cNvPicPr>
+          <p:nvPr/>
+        </p:nvPicPr>
+        <p:blipFill>
+          <a:blip r:embed="rId2" cstate="print"/>
+          <a:srcRect/>
+          <a:stretch>
+            <a:fillRect/>
+          </a:stretch>
+        </p:blipFill>
+        <p:spPr bwMode="auto">
+          <a:xfrm>
+            <a:off x="5357818" y="3786190"/>
+            <a:ext cx="1000132" cy="1331060"/>
+          </a:xfrm>
+          <a:prstGeom prst="rect">
+            <a:avLst/>
+          </a:prstGeom>
+          <a:noFill/>
+          <a:ln w="9525">
+            <a:noFill/>
+            <a:miter lim="800000"/>
+            <a:headEnd/>
+            <a:tailEnd/>
+          </a:ln>
+          <a:effectLst/>
+        </p:spPr>
+      </p:pic>
+      <p:pic>
+        <p:nvPicPr>
+          <p:cNvPr id="5" name="Picture 3" descr="C:\Users\gress\Desktop\P4_gressier_gwenael\lighthouse sur index apres modif lang.PNG"/>
+          <p:cNvPicPr>
+            <a:picLocks noChangeAspect="1" noChangeArrowheads="1"/>
+          </p:cNvPicPr>
+          <p:nvPr/>
+        </p:nvPicPr>
+        <p:blipFill>
+          <a:blip r:embed="rId3" cstate="print"/>
+          <a:srcRect/>
+          <a:stretch>
+            <a:fillRect/>
+          </a:stretch>
+        </p:blipFill>
+        <p:spPr bwMode="auto">
+          <a:xfrm>
+            <a:off x="2071670" y="3786190"/>
+            <a:ext cx="1448311" cy="1285884"/>
+          </a:xfrm>
+          <a:prstGeom prst="rect">
+            <a:avLst/>
+          </a:prstGeom>
+          <a:noFill/>
+        </p:spPr>
+      </p:pic>
+      <p:sp>
+        <p:nvSpPr>
+          <p:cNvPr id="6" name="Flèche droite 5"/>
+          <p:cNvSpPr/>
+          <p:nvPr/>
+        </p:nvSpPr>
+        <p:spPr>
+          <a:xfrm>
+            <a:off x="3643306" y="4214818"/>
+            <a:ext cx="1571636" cy="357190"/>
+          </a:xfrm>
+          <a:prstGeom prst="rightArrow">
+            <a:avLst/>
+          </a:prstGeom>
+        </p:spPr>
+        <p:style>
+          <a:lnRef idx="2">
+            <a:schemeClr val="accent1">
+              <a:shade val="50000"/>
+            </a:schemeClr>
+          </a:lnRef>
+          <a:fillRef idx="1">
+            <a:schemeClr val="accent1"/>
+          </a:fillRef>
+          <a:effectRef idx="0">
+            <a:schemeClr val="accent1"/>
+          </a:effectRef>
+          <a:fontRef idx="minor">
+            <a:schemeClr val="lt1"/>
+          </a:fontRef>
+        </p:style>
+        <p:txBody>
+          <a:bodyPr rtlCol="0" anchor="ctr"/>
+          <a:lstStyle/>
+          <a:p>
+            <a:pPr algn="ctr"/>
+            <a:endParaRPr lang="fr-FR"/>
+          </a:p>
+        </p:txBody>
+      </p:sp>
+    </p:spTree>
+  </p:cSld>
+  <p:clrMapOvr>
+    <a:masterClrMapping/>
+  </p:clrMapOvr>
+</p:sld>
+</file>
+
 <file path=ppt/slides/slide12.xml><?xml version="1.0" encoding="utf-8"?>
 <p:sld xmlns:a="http://schemas.openxmlformats.org/drawingml/2006/main" xmlns:r="http://schemas.openxmlformats.org/officeDocument/2006/relationships" xmlns:p="http://schemas.openxmlformats.org/presentationml/2006/main">
   <p:cSld>
@@ -5816,207 +5810,6 @@
         <p:spPr>
           <a:xfrm>
             <a:off x="457200" y="1481329"/>
-            <a:ext cx="8229600" cy="1804796"/>
-          </a:xfrm>
-        </p:spPr>
-        <p:txBody>
-          <a:bodyPr>
-            <a:normAutofit fontScale="62500" lnSpcReduction="20000"/>
-          </a:bodyPr>
-          <a:lstStyle/>
-          <a:p>
-            <a:pPr lvl="0"/>
-            <a:r>
-              <a:rPr lang="fr-FR" dirty="0" smtClean="0">
-                <a:cs typeface="Tahoma" pitchFamily="2"/>
-              </a:rPr>
-              <a:t>Cela permet de charger le  site plus rapidement, car les images sont des fichiers plus lourds que du texte brute. Ca permet aussi à Google de savoir de quoi parle le texte car il pourra le lire, et permet aussi au malvoyants de lire le texte via un lecteur d’écran.</a:t>
-            </a:r>
-          </a:p>
-          <a:p>
-            <a:pPr lvl="0"/>
-            <a:endParaRPr lang="fr-FR" dirty="0" smtClean="0">
-              <a:cs typeface="Tahoma" pitchFamily="2"/>
-            </a:endParaRPr>
-          </a:p>
-          <a:p>
-            <a:pPr lvl="0"/>
-            <a:r>
-              <a:rPr lang="fr-FR" dirty="0" smtClean="0">
-                <a:cs typeface="Tahoma" pitchFamily="2"/>
-              </a:rPr>
-              <a:t>Le taille du site est allégée, le nombre de requête et donc le temps de chargement le sont aussi.</a:t>
-            </a:r>
-          </a:p>
-          <a:p>
-            <a:endParaRPr lang="fr-FR" dirty="0" smtClean="0"/>
-          </a:p>
-        </p:txBody>
-      </p:sp>
-      <p:sp>
-        <p:nvSpPr>
-          <p:cNvPr id="3" name="Titre 2"/>
-          <p:cNvSpPr>
-            <a:spLocks noGrp="1"/>
-          </p:cNvSpPr>
-          <p:nvPr>
-            <p:ph type="title"/>
-          </p:nvPr>
-        </p:nvSpPr>
-        <p:spPr/>
-        <p:txBody>
-          <a:bodyPr>
-            <a:normAutofit fontScale="90000"/>
-          </a:bodyPr>
-          <a:lstStyle/>
-          <a:p>
-            <a:r>
-              <a:rPr lang="fr-FR" dirty="0" smtClean="0">
-                <a:cs typeface="Tahoma" pitchFamily="2"/>
-              </a:rPr>
-              <a:t>Remplacement des images qui n’affichent que du texte</a:t>
-            </a:r>
-            <a:endParaRPr lang="fr-FR" dirty="0"/>
-          </a:p>
-        </p:txBody>
-      </p:sp>
-      <p:pic>
-        <p:nvPicPr>
-          <p:cNvPr id="1026" name="Picture 2"/>
-          <p:cNvPicPr>
-            <a:picLocks noChangeAspect="1" noChangeArrowheads="1"/>
-          </p:cNvPicPr>
-          <p:nvPr/>
-        </p:nvPicPr>
-        <p:blipFill>
-          <a:blip r:embed="rId2" cstate="print"/>
-          <a:srcRect/>
-          <a:stretch>
-            <a:fillRect/>
-          </a:stretch>
-        </p:blipFill>
-        <p:spPr bwMode="auto">
-          <a:xfrm>
-            <a:off x="5357818" y="3786190"/>
-            <a:ext cx="1000132" cy="1331060"/>
-          </a:xfrm>
-          <a:prstGeom prst="rect">
-            <a:avLst/>
-          </a:prstGeom>
-          <a:noFill/>
-          <a:ln w="9525">
-            <a:noFill/>
-            <a:miter lim="800000"/>
-            <a:headEnd/>
-            <a:tailEnd/>
-          </a:ln>
-          <a:effectLst/>
-        </p:spPr>
-      </p:pic>
-      <p:pic>
-        <p:nvPicPr>
-          <p:cNvPr id="5" name="Picture 3" descr="C:\Users\gress\Desktop\P4_gressier_gwenael\lighthouse sur index apres modif lang.PNG"/>
-          <p:cNvPicPr>
-            <a:picLocks noChangeAspect="1" noChangeArrowheads="1"/>
-          </p:cNvPicPr>
-          <p:nvPr/>
-        </p:nvPicPr>
-        <p:blipFill>
-          <a:blip r:embed="rId3" cstate="print"/>
-          <a:srcRect/>
-          <a:stretch>
-            <a:fillRect/>
-          </a:stretch>
-        </p:blipFill>
-        <p:spPr bwMode="auto">
-          <a:xfrm>
-            <a:off x="2071670" y="3786190"/>
-            <a:ext cx="1448311" cy="1285884"/>
-          </a:xfrm>
-          <a:prstGeom prst="rect">
-            <a:avLst/>
-          </a:prstGeom>
-          <a:noFill/>
-        </p:spPr>
-      </p:pic>
-      <p:sp>
-        <p:nvSpPr>
-          <p:cNvPr id="6" name="Flèche droite 5"/>
-          <p:cNvSpPr/>
-          <p:nvPr/>
-        </p:nvSpPr>
-        <p:spPr>
-          <a:xfrm>
-            <a:off x="3643306" y="4214818"/>
-            <a:ext cx="1571636" cy="357190"/>
-          </a:xfrm>
-          <a:prstGeom prst="rightArrow">
-            <a:avLst/>
-          </a:prstGeom>
-        </p:spPr>
-        <p:style>
-          <a:lnRef idx="2">
-            <a:schemeClr val="accent1">
-              <a:shade val="50000"/>
-            </a:schemeClr>
-          </a:lnRef>
-          <a:fillRef idx="1">
-            <a:schemeClr val="accent1"/>
-          </a:fillRef>
-          <a:effectRef idx="0">
-            <a:schemeClr val="accent1"/>
-          </a:effectRef>
-          <a:fontRef idx="minor">
-            <a:schemeClr val="lt1"/>
-          </a:fontRef>
-        </p:style>
-        <p:txBody>
-          <a:bodyPr rtlCol="0" anchor="ctr"/>
-          <a:lstStyle/>
-          <a:p>
-            <a:pPr algn="ctr"/>
-            <a:endParaRPr lang="fr-FR"/>
-          </a:p>
-        </p:txBody>
-      </p:sp>
-    </p:spTree>
-  </p:cSld>
-  <p:clrMapOvr>
-    <a:masterClrMapping/>
-  </p:clrMapOvr>
-</p:sld>
-</file>
-
-<file path=ppt/slides/slide13.xml><?xml version="1.0" encoding="utf-8"?>
-<p:sld xmlns:a="http://schemas.openxmlformats.org/drawingml/2006/main" xmlns:r="http://schemas.openxmlformats.org/officeDocument/2006/relationships" xmlns:p="http://schemas.openxmlformats.org/presentationml/2006/main">
-  <p:cSld>
-    <p:spTree>
-      <p:nvGrpSpPr>
-        <p:cNvPr id="1" name=""/>
-        <p:cNvGrpSpPr/>
-        <p:nvPr/>
-      </p:nvGrpSpPr>
-      <p:grpSpPr>
-        <a:xfrm>
-          <a:off x="0" y="0"/>
-          <a:ext cx="0" cy="0"/>
-          <a:chOff x="0" y="0"/>
-          <a:chExt cx="0" cy="0"/>
-        </a:xfrm>
-      </p:grpSpPr>
-      <p:sp>
-        <p:nvSpPr>
-          <p:cNvPr id="2" name="Espace réservé du contenu 1"/>
-          <p:cNvSpPr>
-            <a:spLocks noGrp="1"/>
-          </p:cNvSpPr>
-          <p:nvPr>
-            <p:ph idx="1"/>
-          </p:nvPr>
-        </p:nvSpPr>
-        <p:spPr>
-          <a:xfrm>
-            <a:off x="457200" y="1481329"/>
             <a:ext cx="8229600" cy="1304730"/>
           </a:xfrm>
         </p:spPr>
@@ -6028,7 +5821,7 @@
           <a:p>
             <a:r>
               <a:rPr lang="fr-FR" sz="1600" dirty="0" smtClean="0"/>
-              <a:t>L’ajout de balise title dans les balises a </a:t>
+              <a:t>L’ajout de attribut title dans les balises a </a:t>
             </a:r>
             <a:endParaRPr lang="fr-FR" sz="1600" dirty="0"/>
           </a:p>
@@ -6051,7 +5844,7 @@
           <a:p>
             <a:r>
               <a:rPr lang="fr-FR" dirty="0" smtClean="0"/>
-              <a:t>Balise title dans les a</a:t>
+              <a:t>Attribut title dans les a</a:t>
             </a:r>
             <a:endParaRPr lang="fr-FR" dirty="0"/>
           </a:p>
@@ -6409,6 +6202,192 @@
 </p:sld>
 </file>
 
+<file path=ppt/slides/slide13.xml><?xml version="1.0" encoding="utf-8"?>
+<p:sld xmlns:a="http://schemas.openxmlformats.org/drawingml/2006/main" xmlns:r="http://schemas.openxmlformats.org/officeDocument/2006/relationships" xmlns:p="http://schemas.openxmlformats.org/presentationml/2006/main">
+  <p:cSld>
+    <p:spTree>
+      <p:nvGrpSpPr>
+        <p:cNvPr id="1" name=""/>
+        <p:cNvGrpSpPr/>
+        <p:nvPr/>
+      </p:nvGrpSpPr>
+      <p:grpSpPr>
+        <a:xfrm>
+          <a:off x="0" y="0"/>
+          <a:ext cx="0" cy="0"/>
+          <a:chOff x="0" y="0"/>
+          <a:chExt cx="0" cy="0"/>
+        </a:xfrm>
+      </p:grpSpPr>
+      <p:sp>
+        <p:nvSpPr>
+          <p:cNvPr id="2" name="Espace réservé du contenu 1"/>
+          <p:cNvSpPr>
+            <a:spLocks noGrp="1"/>
+          </p:cNvSpPr>
+          <p:nvPr>
+            <p:ph idx="1"/>
+          </p:nvPr>
+        </p:nvSpPr>
+        <p:spPr/>
+        <p:txBody>
+          <a:bodyPr/>
+          <a:lstStyle/>
+          <a:p>
+            <a:pPr lvl="0"/>
+            <a:r>
+              <a:rPr lang="fr-FR" dirty="0" smtClean="0">
+                <a:cs typeface="Tahoma" pitchFamily="2"/>
+              </a:rPr>
+              <a:t>En optant sur du texte blanc sur fond noir, on supprime les erreurs lié au contraste de couleurs pour les malvoyants et l’accessibilité augmente sur les deux pages</a:t>
+            </a:r>
+          </a:p>
+          <a:p>
+            <a:endParaRPr lang="fr-FR" dirty="0"/>
+          </a:p>
+        </p:txBody>
+      </p:sp>
+      <p:sp>
+        <p:nvSpPr>
+          <p:cNvPr id="3" name="Titre 2"/>
+          <p:cNvSpPr>
+            <a:spLocks noGrp="1"/>
+          </p:cNvSpPr>
+          <p:nvPr>
+            <p:ph type="title"/>
+          </p:nvPr>
+        </p:nvSpPr>
+        <p:spPr/>
+        <p:txBody>
+          <a:bodyPr>
+            <a:normAutofit fontScale="90000"/>
+          </a:bodyPr>
+          <a:lstStyle/>
+          <a:p>
+            <a:r>
+              <a:rPr lang="fr-FR" dirty="0" smtClean="0">
+                <a:cs typeface="Tahoma" pitchFamily="2"/>
+              </a:rPr>
+              <a:t>Correction des erreurs de contraste</a:t>
+            </a:r>
+            <a:endParaRPr lang="fr-FR" dirty="0"/>
+          </a:p>
+        </p:txBody>
+      </p:sp>
+      <p:pic>
+        <p:nvPicPr>
+          <p:cNvPr id="4" name="Picture 2"/>
+          <p:cNvPicPr>
+            <a:picLocks noChangeAspect="1" noChangeArrowheads="1"/>
+          </p:cNvPicPr>
+          <p:nvPr/>
+        </p:nvPicPr>
+        <p:blipFill>
+          <a:blip r:embed="rId2" cstate="print"/>
+          <a:srcRect/>
+          <a:stretch>
+            <a:fillRect/>
+          </a:stretch>
+        </p:blipFill>
+        <p:spPr bwMode="auto">
+          <a:xfrm>
+            <a:off x="2143108" y="3714752"/>
+            <a:ext cx="1000132" cy="1298679"/>
+          </a:xfrm>
+          <a:prstGeom prst="rect">
+            <a:avLst/>
+          </a:prstGeom>
+          <a:noFill/>
+          <a:ln w="9525">
+            <a:noFill/>
+            <a:miter lim="800000"/>
+            <a:headEnd/>
+            <a:tailEnd/>
+          </a:ln>
+          <a:effectLst/>
+        </p:spPr>
+      </p:pic>
+      <p:sp>
+        <p:nvSpPr>
+          <p:cNvPr id="6" name="Flèche droite 5"/>
+          <p:cNvSpPr/>
+          <p:nvPr/>
+        </p:nvSpPr>
+        <p:spPr>
+          <a:xfrm>
+            <a:off x="3286116" y="4143380"/>
+            <a:ext cx="1571636" cy="357190"/>
+          </a:xfrm>
+          <a:prstGeom prst="rightArrow">
+            <a:avLst/>
+          </a:prstGeom>
+        </p:spPr>
+        <p:style>
+          <a:lnRef idx="2">
+            <a:schemeClr val="accent1">
+              <a:shade val="50000"/>
+            </a:schemeClr>
+          </a:lnRef>
+          <a:fillRef idx="1">
+            <a:schemeClr val="accent1"/>
+          </a:fillRef>
+          <a:effectRef idx="0">
+            <a:schemeClr val="accent1"/>
+          </a:effectRef>
+          <a:fontRef idx="minor">
+            <a:schemeClr val="lt1"/>
+          </a:fontRef>
+        </p:style>
+        <p:txBody>
+          <a:bodyPr rtlCol="0" anchor="ctr"/>
+          <a:lstStyle/>
+          <a:p>
+            <a:pPr algn="ctr"/>
+            <a:endParaRPr lang="fr-FR"/>
+          </a:p>
+        </p:txBody>
+      </p:sp>
+      <p:pic>
+        <p:nvPicPr>
+          <p:cNvPr id="3074" name="Picture 2"/>
+          <p:cNvPicPr>
+            <a:picLocks noChangeAspect="1" noChangeArrowheads="1"/>
+          </p:cNvPicPr>
+          <p:nvPr/>
+        </p:nvPicPr>
+        <p:blipFill>
+          <a:blip r:embed="rId3" cstate="print"/>
+          <a:srcRect/>
+          <a:stretch>
+            <a:fillRect/>
+          </a:stretch>
+        </p:blipFill>
+        <p:spPr bwMode="auto">
+          <a:xfrm>
+            <a:off x="5000628" y="3714752"/>
+            <a:ext cx="1015556" cy="1285884"/>
+          </a:xfrm>
+          <a:prstGeom prst="rect">
+            <a:avLst/>
+          </a:prstGeom>
+          <a:noFill/>
+          <a:ln w="9525">
+            <a:noFill/>
+            <a:miter lim="800000"/>
+            <a:headEnd/>
+            <a:tailEnd/>
+          </a:ln>
+          <a:effectLst/>
+        </p:spPr>
+      </p:pic>
+    </p:spTree>
+  </p:cSld>
+  <p:clrMapOvr>
+    <a:masterClrMapping/>
+  </p:clrMapOvr>
+</p:sld>
+</file>
+
 <file path=ppt/slides/slide14.xml><?xml version="1.0" encoding="utf-8"?>
 <p:sld xmlns:a="http://schemas.openxmlformats.org/drawingml/2006/main" xmlns:r="http://schemas.openxmlformats.org/officeDocument/2006/relationships" xmlns:p="http://schemas.openxmlformats.org/presentationml/2006/main">
   <p:cSld>
@@ -6443,10 +6422,57 @@
           <a:p>
             <a:pPr lvl="0"/>
             <a:r>
-              <a:rPr lang="fr-FR" dirty="0" smtClean="0">
+              <a:rPr lang="fr-FR" sz="1800" dirty="0" smtClean="0">
                 <a:cs typeface="Tahoma" pitchFamily="2"/>
               </a:rPr>
-              <a:t>En optant sur du texte blanc sur fond noir, on supprime les erreurs lié au contraste de couleurs pour les malvoyants et l’accessibilité augmente sur les deux pages</a:t>
+              <a:t>Le chemin original cherchait des fichiers </a:t>
+            </a:r>
+            <a:r>
+              <a:rPr lang="fr-FR" sz="1800" dirty="0" err="1" smtClean="0">
+                <a:cs typeface="Tahoma" pitchFamily="2"/>
+              </a:rPr>
+              <a:t>css</a:t>
+            </a:r>
+            <a:r>
+              <a:rPr lang="fr-FR" sz="1800" dirty="0" smtClean="0">
+                <a:cs typeface="Tahoma" pitchFamily="2"/>
+              </a:rPr>
+              <a:t>  et JS </a:t>
+            </a:r>
+            <a:r>
+              <a:rPr lang="fr-FR" sz="1800" dirty="0" err="1" smtClean="0">
+                <a:cs typeface="Tahoma" pitchFamily="2"/>
+              </a:rPr>
+              <a:t>minifié</a:t>
+            </a:r>
+            <a:r>
+              <a:rPr lang="fr-FR" sz="1800" dirty="0" smtClean="0">
+                <a:cs typeface="Tahoma" pitchFamily="2"/>
+              </a:rPr>
+              <a:t> qui n’existe pas, d’où toutes les erreurs d’affichage du menu, du formulaire ou du texte.</a:t>
+            </a:r>
+            <a:br>
+              <a:rPr lang="fr-FR" sz="1800" dirty="0" smtClean="0">
+                <a:cs typeface="Tahoma" pitchFamily="2"/>
+              </a:rPr>
+            </a:br>
+            <a:r>
+              <a:rPr lang="fr-FR" sz="1800" dirty="0" smtClean="0">
+                <a:cs typeface="Tahoma" pitchFamily="2"/>
+              </a:rPr>
+              <a:t>En mettant le bon fichier, c’est réglé, mais à terme il faudrait importer des fichiers </a:t>
+            </a:r>
+            <a:r>
+              <a:rPr lang="fr-FR" sz="1800" dirty="0" err="1" smtClean="0">
+                <a:cs typeface="Tahoma" pitchFamily="2"/>
+              </a:rPr>
+              <a:t>minifié</a:t>
+            </a:r>
+            <a:r>
+              <a:rPr lang="fr-FR" sz="1800" dirty="0" smtClean="0">
+                <a:cs typeface="Tahoma" pitchFamily="2"/>
+              </a:rPr>
+              <a:t> pour améliorer les performances.</a:t>
             </a:r>
           </a:p>
           <a:p>
@@ -6475,7 +6501,31 @@
               <a:rPr lang="fr-FR" dirty="0" smtClean="0">
                 <a:cs typeface="Tahoma" pitchFamily="2"/>
               </a:rPr>
-              <a:t>Correction des erreurs de contraste</a:t>
+              <a:t>Correction du chemin du fichier .</a:t>
+            </a:r>
+            <a:r>
+              <a:rPr lang="fr-FR" dirty="0" err="1" smtClean="0">
+                <a:cs typeface="Tahoma" pitchFamily="2"/>
+              </a:rPr>
+              <a:t>css</a:t>
+            </a:r>
+            <a:r>
+              <a:rPr lang="fr-FR" dirty="0" smtClean="0">
+                <a:cs typeface="Tahoma" pitchFamily="2"/>
+              </a:rPr>
+              <a:t> et .</a:t>
+            </a:r>
+            <a:r>
+              <a:rPr lang="fr-FR" dirty="0" err="1" smtClean="0">
+                <a:cs typeface="Tahoma" pitchFamily="2"/>
+              </a:rPr>
+              <a:t>js</a:t>
+            </a:r>
+            <a:r>
+              <a:rPr lang="fr-FR" dirty="0" smtClean="0">
+                <a:cs typeface="Tahoma" pitchFamily="2"/>
+              </a:rPr>
+              <a:t> pour la page contact</a:t>
             </a:r>
             <a:endParaRPr lang="fr-FR" dirty="0"/>
           </a:p>
@@ -6498,8 +6548,8 @@
         </p:blipFill>
         <p:spPr bwMode="auto">
           <a:xfrm>
-            <a:off x="2143108" y="3714752"/>
-            <a:ext cx="1000132" cy="1298679"/>
+            <a:off x="2428860" y="4714884"/>
+            <a:ext cx="1000125" cy="1276350"/>
           </a:xfrm>
           <a:prstGeom prst="rect">
             <a:avLst/>
@@ -6516,13 +6566,13 @@
       </p:pic>
       <p:sp>
         <p:nvSpPr>
-          <p:cNvPr id="6" name="Flèche droite 5"/>
+          <p:cNvPr id="5" name="Flèche droite 4"/>
           <p:cNvSpPr/>
           <p:nvPr/>
         </p:nvSpPr>
         <p:spPr>
           <a:xfrm>
-            <a:off x="3286116" y="4143380"/>
+            <a:off x="3643306" y="5143512"/>
             <a:ext cx="1571636" cy="357190"/>
           </a:xfrm>
           <a:prstGeom prst="rightArrow">
@@ -6556,7 +6606,7 @@
       </p:sp>
       <p:pic>
         <p:nvPicPr>
-          <p:cNvPr id="3074" name="Picture 2"/>
+          <p:cNvPr id="2050" name="Picture 2"/>
           <p:cNvPicPr>
             <a:picLocks noChangeAspect="1" noChangeArrowheads="1"/>
           </p:cNvPicPr>
@@ -6571,8 +6621,8 @@
         </p:blipFill>
         <p:spPr bwMode="auto">
           <a:xfrm>
-            <a:off x="5000628" y="3714752"/>
-            <a:ext cx="1015556" cy="1285884"/>
+            <a:off x="5429256" y="4714884"/>
+            <a:ext cx="990600" cy="1304925"/>
           </a:xfrm>
           <a:prstGeom prst="rect">
             <a:avLst/>
@@ -6627,62 +6677,26 @@
           <a:bodyPr/>
           <a:lstStyle/>
           <a:p>
-            <a:pPr lvl="0"/>
-            <a:r>
-              <a:rPr lang="fr-FR" sz="1800" dirty="0" smtClean="0">
-                <a:cs typeface="Tahoma" pitchFamily="2"/>
-              </a:rPr>
-              <a:t>Le chemin original cherchait des fichiers </a:t>
-            </a:r>
-            <a:r>
-              <a:rPr lang="fr-FR" sz="1800" dirty="0" err="1" smtClean="0">
-                <a:cs typeface="Tahoma" pitchFamily="2"/>
-              </a:rPr>
-              <a:t>css</a:t>
-            </a:r>
-            <a:r>
-              <a:rPr lang="fr-FR" sz="1800" dirty="0" smtClean="0">
-                <a:cs typeface="Tahoma" pitchFamily="2"/>
-              </a:rPr>
-              <a:t>  et JS </a:t>
-            </a:r>
-            <a:r>
-              <a:rPr lang="fr-FR" sz="1800" dirty="0" err="1" smtClean="0">
-                <a:cs typeface="Tahoma" pitchFamily="2"/>
-              </a:rPr>
-              <a:t>minifié</a:t>
-            </a:r>
-            <a:r>
-              <a:rPr lang="fr-FR" sz="1800" dirty="0" smtClean="0">
-                <a:cs typeface="Tahoma" pitchFamily="2"/>
-              </a:rPr>
-              <a:t> qui n’existe pas, d’où toutes les erreurs d’affichage du menu, du formulaire ou du texte.</a:t>
-            </a:r>
-            <a:br>
-              <a:rPr lang="fr-FR" sz="1800" dirty="0" smtClean="0">
-                <a:cs typeface="Tahoma" pitchFamily="2"/>
-              </a:rPr>
-            </a:br>
-            <a:r>
-              <a:rPr lang="fr-FR" sz="1800" dirty="0" smtClean="0">
-                <a:cs typeface="Tahoma" pitchFamily="2"/>
-              </a:rPr>
-              <a:t>En mettant le bon fichier, c’est réglé, mais à terme il faudrait importer des fichiers </a:t>
-            </a:r>
-            <a:r>
-              <a:rPr lang="fr-FR" sz="1800" dirty="0" err="1" smtClean="0">
-                <a:cs typeface="Tahoma" pitchFamily="2"/>
-              </a:rPr>
-              <a:t>minifié</a:t>
-            </a:r>
-            <a:r>
-              <a:rPr lang="fr-FR" sz="1800" dirty="0" smtClean="0">
-                <a:cs typeface="Tahoma" pitchFamily="2"/>
-              </a:rPr>
-              <a:t> pour améliorer les performances.</a:t>
-            </a:r>
-          </a:p>
-          <a:p>
+            <a:r>
+              <a:rPr lang="fr-FR" dirty="0" smtClean="0"/>
+              <a:t>J’ai modifier l’</a:t>
+            </a:r>
+            <a:r>
+              <a:rPr lang="fr-FR" dirty="0" err="1" smtClean="0"/>
+              <a:t>element</a:t>
+            </a:r>
+            <a:r>
+              <a:rPr lang="fr-FR" dirty="0" smtClean="0"/>
+              <a:t> a en i car il ni a pas besoin de </a:t>
+            </a:r>
+            <a:r>
+              <a:rPr lang="fr-FR" dirty="0" err="1" smtClean="0"/>
+              <a:t>href</a:t>
+            </a:r>
+            <a:r>
+              <a:rPr lang="fr-FR" dirty="0" smtClean="0"/>
+              <a:t> pour se dernier.</a:t>
+            </a:r>
             <a:endParaRPr lang="fr-FR" dirty="0"/>
           </a:p>
         </p:txBody>
@@ -6705,81 +6719,26 @@
           <a:lstStyle/>
           <a:p>
             <a:r>
-              <a:rPr lang="fr-FR" dirty="0" smtClean="0">
-                <a:cs typeface="Tahoma" pitchFamily="2"/>
-              </a:rPr>
-              <a:t>Correction du chemin du fichier .</a:t>
-            </a:r>
-            <a:r>
-              <a:rPr lang="fr-FR" dirty="0" err="1" smtClean="0">
-                <a:cs typeface="Tahoma" pitchFamily="2"/>
-              </a:rPr>
-              <a:t>css</a:t>
-            </a:r>
-            <a:r>
-              <a:rPr lang="fr-FR" dirty="0" smtClean="0">
-                <a:cs typeface="Tahoma" pitchFamily="2"/>
-              </a:rPr>
-              <a:t> et .</a:t>
-            </a:r>
-            <a:r>
-              <a:rPr lang="fr-FR" dirty="0" err="1" smtClean="0">
-                <a:cs typeface="Tahoma" pitchFamily="2"/>
-              </a:rPr>
-              <a:t>js</a:t>
-            </a:r>
-            <a:r>
-              <a:rPr lang="fr-FR" dirty="0" smtClean="0">
-                <a:cs typeface="Tahoma" pitchFamily="2"/>
-              </a:rPr>
-              <a:t> pour la page contact</a:t>
+              <a:rPr lang="fr-FR" dirty="0" smtClean="0"/>
+              <a:t>Modification de la balise pour le bouton </a:t>
+            </a:r>
+            <a:r>
+              <a:rPr lang="fr-FR" dirty="0" err="1" smtClean="0"/>
+              <a:t>scrolltotop</a:t>
             </a:r>
             <a:endParaRPr lang="fr-FR" dirty="0"/>
           </a:p>
         </p:txBody>
       </p:sp>
-      <p:pic>
-        <p:nvPicPr>
-          <p:cNvPr id="4" name="Picture 2"/>
-          <p:cNvPicPr>
-            <a:picLocks noChangeAspect="1" noChangeArrowheads="1"/>
-          </p:cNvPicPr>
-          <p:nvPr/>
-        </p:nvPicPr>
-        <p:blipFill>
-          <a:blip r:embed="rId2" cstate="print"/>
-          <a:srcRect/>
-          <a:stretch>
-            <a:fillRect/>
-          </a:stretch>
-        </p:blipFill>
-        <p:spPr bwMode="auto">
-          <a:xfrm>
-            <a:off x="2428860" y="4714884"/>
-            <a:ext cx="1000125" cy="1276350"/>
-          </a:xfrm>
-          <a:prstGeom prst="rect">
-            <a:avLst/>
-          </a:prstGeom>
-          <a:noFill/>
-          <a:ln w="9525">
-            <a:noFill/>
-            <a:miter lim="800000"/>
-            <a:headEnd/>
-            <a:tailEnd/>
-          </a:ln>
-          <a:effectLst/>
-        </p:spPr>
-      </p:pic>
-      <p:sp>
-        <p:nvSpPr>
-          <p:cNvPr id="5" name="Flèche droite 4"/>
+      <p:sp>
+        <p:nvSpPr>
+          <p:cNvPr id="4" name="Flèche droite 3"/>
           <p:cNvSpPr/>
           <p:nvPr/>
         </p:nvSpPr>
         <p:spPr>
           <a:xfrm>
-            <a:off x="3643306" y="5143512"/>
+            <a:off x="3714744" y="4214818"/>
             <a:ext cx="1571636" cy="357190"/>
           </a:xfrm>
           <a:prstGeom prst="rightArrow">
@@ -6813,7 +6772,40 @@
       </p:sp>
       <p:pic>
         <p:nvPicPr>
-          <p:cNvPr id="2050" name="Picture 2"/>
+          <p:cNvPr id="5" name="Picture 2"/>
+          <p:cNvPicPr>
+            <a:picLocks noChangeAspect="1" noChangeArrowheads="1"/>
+          </p:cNvPicPr>
+          <p:nvPr/>
+        </p:nvPicPr>
+        <p:blipFill>
+          <a:blip r:embed="rId2" cstate="print"/>
+          <a:srcRect/>
+          <a:stretch>
+            <a:fillRect/>
+          </a:stretch>
+        </p:blipFill>
+        <p:spPr bwMode="auto">
+          <a:xfrm>
+            <a:off x="2500298" y="3786190"/>
+            <a:ext cx="990600" cy="1304925"/>
+          </a:xfrm>
+          <a:prstGeom prst="rect">
+            <a:avLst/>
+          </a:prstGeom>
+          <a:noFill/>
+          <a:ln w="9525">
+            <a:noFill/>
+            <a:miter lim="800000"/>
+            <a:headEnd/>
+            <a:tailEnd/>
+          </a:ln>
+          <a:effectLst/>
+        </p:spPr>
+      </p:pic>
+      <p:pic>
+        <p:nvPicPr>
+          <p:cNvPr id="3074" name="Picture 2"/>
           <p:cNvPicPr>
             <a:picLocks noChangeAspect="1" noChangeArrowheads="1"/>
           </p:cNvPicPr>
@@ -6828,8 +6820,8 @@
         </p:blipFill>
         <p:spPr bwMode="auto">
           <a:xfrm>
-            <a:off x="5429256" y="4714884"/>
-            <a:ext cx="990600" cy="1304925"/>
+            <a:off x="5643570" y="3714752"/>
+            <a:ext cx="981075" cy="1343025"/>
           </a:xfrm>
           <a:prstGeom prst="rect">
             <a:avLst/>
@@ -6885,26 +6877,32 @@
           <a:lstStyle/>
           <a:p>
             <a:r>
-              <a:rPr lang="fr-FR" dirty="0" smtClean="0"/>
-              <a:t>J’ai modifier l’</a:t>
-            </a:r>
-            <a:r>
-              <a:rPr lang="fr-FR" dirty="0" err="1" smtClean="0"/>
-              <a:t>element</a:t>
-            </a:r>
-            <a:r>
-              <a:rPr lang="fr-FR" dirty="0" smtClean="0"/>
-              <a:t> a en i car il ni a pas besoin de </a:t>
-            </a:r>
-            <a:r>
-              <a:rPr lang="fr-FR" dirty="0" err="1" smtClean="0"/>
-              <a:t>href</a:t>
-            </a:r>
-            <a:r>
-              <a:rPr lang="fr-FR" dirty="0" smtClean="0"/>
-              <a:t> pour se dernier.</a:t>
-            </a:r>
-            <a:endParaRPr lang="fr-FR" dirty="0"/>
+              <a:rPr lang="fr-FR" sz="1600" dirty="0" smtClean="0"/>
+              <a:t>En imbriquant les balise </a:t>
+            </a:r>
+            <a:r>
+              <a:rPr lang="fr-FR" sz="1600" dirty="0" err="1" smtClean="0"/>
+              <a:t>inpute</a:t>
+            </a:r>
+            <a:r>
+              <a:rPr lang="fr-FR" sz="1600" dirty="0" smtClean="0"/>
+              <a:t> et </a:t>
+            </a:r>
+            <a:r>
+              <a:rPr lang="fr-FR" sz="1600" dirty="0" err="1" smtClean="0"/>
+              <a:t>textarea</a:t>
+            </a:r>
+            <a:r>
+              <a:rPr lang="fr-FR" sz="1600" dirty="0" smtClean="0"/>
+              <a:t> dans la balise label.</a:t>
+            </a:r>
+          </a:p>
+          <a:p>
+            <a:r>
+              <a:rPr lang="fr-FR" sz="1600" dirty="0" smtClean="0"/>
+              <a:t>Ou on aurais aussi pu utiliser l’attribut « for »</a:t>
+            </a:r>
+            <a:endParaRPr lang="fr-FR" sz="1600" dirty="0"/>
           </a:p>
         </p:txBody>
       </p:sp>
@@ -6927,11 +6925,7 @@
           <a:p>
             <a:r>
               <a:rPr lang="fr-FR" dirty="0" smtClean="0"/>
-              <a:t>Modification de la balise pour le bouton </a:t>
-            </a:r>
-            <a:r>
-              <a:rPr lang="fr-FR" dirty="0" err="1" smtClean="0"/>
-              <a:t>scrolltotop</a:t>
+              <a:t>Modification de la fin des balises label sur la page 2</a:t>
             </a:r>
             <a:endParaRPr lang="fr-FR" dirty="0"/>
           </a:p>
@@ -6945,7 +6939,7 @@
         </p:nvSpPr>
         <p:spPr>
           <a:xfrm>
-            <a:off x="3714744" y="4214818"/>
+            <a:off x="3643306" y="3286124"/>
             <a:ext cx="1571636" cy="357190"/>
           </a:xfrm>
           <a:prstGeom prst="rightArrow">
@@ -6994,8 +6988,8 @@
         </p:blipFill>
         <p:spPr bwMode="auto">
           <a:xfrm>
-            <a:off x="2500298" y="3786190"/>
-            <a:ext cx="990600" cy="1304925"/>
+            <a:off x="2571736" y="2928934"/>
+            <a:ext cx="928693" cy="1111256"/>
           </a:xfrm>
           <a:prstGeom prst="rect">
             <a:avLst/>
@@ -7012,7 +7006,7 @@
       </p:pic>
       <p:pic>
         <p:nvPicPr>
-          <p:cNvPr id="3074" name="Picture 2"/>
+          <p:cNvPr id="5122" name="Picture 2"/>
           <p:cNvPicPr>
             <a:picLocks noChangeAspect="1" noChangeArrowheads="1"/>
           </p:cNvPicPr>
@@ -7027,8 +7021,8 @@
         </p:blipFill>
         <p:spPr bwMode="auto">
           <a:xfrm>
-            <a:off x="5643570" y="3714752"/>
-            <a:ext cx="981075" cy="1343025"/>
+            <a:off x="5357818" y="2857496"/>
+            <a:ext cx="906242" cy="1143008"/>
           </a:xfrm>
           <a:prstGeom prst="rect">
             <a:avLst/>
@@ -7080,38 +7074,14 @@
         </p:nvSpPr>
         <p:spPr/>
         <p:txBody>
-          <a:bodyPr/>
+          <a:bodyPr>
+            <a:normAutofit/>
+          </a:bodyPr>
           <a:lstStyle/>
           <a:p>
             <a:r>
               <a:rPr lang="fr-FR" sz="1600" dirty="0" smtClean="0"/>
-              <a:t>En imbriquant les balise </a:t>
-            </a:r>
-            <a:r>
-              <a:rPr lang="fr-FR" sz="1600" dirty="0" err="1" smtClean="0"/>
-              <a:t>inpute</a:t>
-            </a:r>
-            <a:r>
-              <a:rPr lang="fr-FR" sz="1600" dirty="0" smtClean="0"/>
-              <a:t> et </a:t>
-            </a:r>
-            <a:r>
-              <a:rPr lang="fr-FR" sz="1600" dirty="0" err="1" smtClean="0"/>
-              <a:t>textarea</a:t>
-            </a:r>
-            <a:r>
-              <a:rPr lang="fr-FR" sz="1600" dirty="0" smtClean="0"/>
-              <a:t> dans la balise label.</a:t>
-            </a:r>
-          </a:p>
-          <a:p>
-            <a:r>
-              <a:rPr lang="fr-FR" sz="1600" dirty="0" smtClean="0"/>
-              <a:t>Ou on aurais aussi pu utiliser l’attribut « for </a:t>
-            </a:r>
-            <a:r>
-              <a:rPr lang="fr-FR" sz="1600" dirty="0" smtClean="0"/>
-              <a:t>»</a:t>
+              <a:t>Pour des question évidente de lisibilité j’ai passer le texte en noir</a:t>
             </a:r>
             <a:endParaRPr lang="fr-FR" sz="1600" dirty="0"/>
           </a:p>
@@ -7136,7 +7106,7 @@
           <a:p>
             <a:r>
               <a:rPr lang="fr-FR" dirty="0" smtClean="0"/>
-              <a:t>Modification de la fin des balises label sur la page 2</a:t>
+              <a:t>Modification de la couleur du texte </a:t>
             </a:r>
             <a:endParaRPr lang="fr-FR" dirty="0"/>
           </a:p>
@@ -7150,7 +7120,7 @@
         </p:nvSpPr>
         <p:spPr>
           <a:xfrm>
-            <a:off x="3643306" y="3286124"/>
+            <a:off x="3500430" y="3786190"/>
             <a:ext cx="1571636" cy="357190"/>
           </a:xfrm>
           <a:prstGeom prst="rightArrow">
@@ -7199,8 +7169,8 @@
         </p:blipFill>
         <p:spPr bwMode="auto">
           <a:xfrm>
-            <a:off x="2571736" y="2928934"/>
-            <a:ext cx="928693" cy="1111256"/>
+            <a:off x="2428860" y="3429000"/>
+            <a:ext cx="906242" cy="1143008"/>
           </a:xfrm>
           <a:prstGeom prst="rect">
             <a:avLst/>
@@ -7217,7 +7187,7 @@
       </p:pic>
       <p:pic>
         <p:nvPicPr>
-          <p:cNvPr id="5122" name="Picture 2"/>
+          <p:cNvPr id="6146" name="Picture 2"/>
           <p:cNvPicPr>
             <a:picLocks noChangeAspect="1" noChangeArrowheads="1"/>
           </p:cNvPicPr>
@@ -7232,8 +7202,8 @@
         </p:blipFill>
         <p:spPr bwMode="auto">
           <a:xfrm>
-            <a:off x="5357818" y="2857496"/>
-            <a:ext cx="906242" cy="1143008"/>
+            <a:off x="5214942" y="3357562"/>
+            <a:ext cx="1133475" cy="1295400"/>
           </a:xfrm>
           <a:prstGeom prst="rect">
             <a:avLst/>
@@ -7283,18 +7253,52 @@
             <p:ph idx="1"/>
           </p:nvPr>
         </p:nvSpPr>
-        <p:spPr/>
+        <p:spPr>
+          <a:xfrm>
+            <a:off x="457200" y="1481329"/>
+            <a:ext cx="8229600" cy="661788"/>
+          </a:xfrm>
+        </p:spPr>
         <p:txBody>
           <a:bodyPr>
             <a:normAutofit/>
           </a:bodyPr>
           <a:lstStyle/>
           <a:p>
-            <a:r>
-              <a:rPr lang="fr-FR" sz="1600" dirty="0" smtClean="0"/>
-              <a:t>Pour des question évidente de lisibilité j’ai passer le texte en noir</a:t>
-            </a:r>
-            <a:endParaRPr lang="fr-FR" sz="1600" dirty="0"/>
+            <a:pPr lvl="0"/>
+            <a:r>
+              <a:rPr lang="fr-FR" sz="1600" dirty="0" smtClean="0">
+                <a:cs typeface="Tahoma" pitchFamily="2"/>
+              </a:rPr>
+              <a:t>toute les images les images on </a:t>
+            </a:r>
+            <a:r>
+              <a:rPr lang="fr-FR" sz="1600" dirty="0" err="1" smtClean="0">
+                <a:cs typeface="Tahoma" pitchFamily="2"/>
+              </a:rPr>
+              <a:t>etais</a:t>
+            </a:r>
+            <a:r>
+              <a:rPr lang="fr-FR" sz="1600" dirty="0" smtClean="0">
+                <a:cs typeface="Tahoma" pitchFamily="2"/>
+              </a:rPr>
+              <a:t> converti en .</a:t>
+            </a:r>
+            <a:r>
+              <a:rPr lang="fr-FR" sz="1600" dirty="0" err="1" smtClean="0">
+                <a:cs typeface="Tahoma" pitchFamily="2"/>
+              </a:rPr>
+              <a:t>webp</a:t>
+            </a:r>
+            <a:r>
+              <a:rPr lang="fr-FR" sz="1600" dirty="0" smtClean="0">
+                <a:cs typeface="Tahoma" pitchFamily="2"/>
+              </a:rPr>
+              <a:t> pour les rendre plus légères.</a:t>
+            </a:r>
+            <a:endParaRPr lang="fr-FR" sz="1600" dirty="0">
+              <a:cs typeface="Tahoma" pitchFamily="2"/>
+            </a:endParaRPr>
           </a:p>
         </p:txBody>
       </p:sp>
@@ -7316,119 +7320,15 @@
           <a:lstStyle/>
           <a:p>
             <a:r>
-              <a:rPr lang="fr-FR" dirty="0" smtClean="0"/>
-              <a:t>Modification de la couleur du texte </a:t>
+              <a:rPr lang="fr-FR" dirty="0" smtClean="0">
+                <a:cs typeface="Tahoma" pitchFamily="2"/>
+              </a:rPr>
+              <a:t>Modification du format des images</a:t>
             </a:r>
             <a:endParaRPr lang="fr-FR" dirty="0"/>
           </a:p>
         </p:txBody>
       </p:sp>
-      <p:sp>
-        <p:nvSpPr>
-          <p:cNvPr id="4" name="Flèche droite 3"/>
-          <p:cNvSpPr/>
-          <p:nvPr/>
-        </p:nvSpPr>
-        <p:spPr>
-          <a:xfrm>
-            <a:off x="3500430" y="3786190"/>
-            <a:ext cx="1571636" cy="357190"/>
-          </a:xfrm>
-          <a:prstGeom prst="rightArrow">
-            <a:avLst/>
-          </a:prstGeom>
-        </p:spPr>
-        <p:style>
-          <a:lnRef idx="2">
-            <a:schemeClr val="accent1">
-              <a:shade val="50000"/>
-            </a:schemeClr>
-          </a:lnRef>
-          <a:fillRef idx="1">
-            <a:schemeClr val="accent1"/>
-          </a:fillRef>
-          <a:effectRef idx="0">
-            <a:schemeClr val="accent1"/>
-          </a:effectRef>
-          <a:fontRef idx="minor">
-            <a:schemeClr val="lt1"/>
-          </a:fontRef>
-        </p:style>
-        <p:txBody>
-          <a:bodyPr rtlCol="0" anchor="ctr"/>
-          <a:lstStyle/>
-          <a:p>
-            <a:pPr algn="ctr"/>
-            <a:endParaRPr lang="fr-FR"/>
-          </a:p>
-        </p:txBody>
-      </p:sp>
-      <p:pic>
-        <p:nvPicPr>
-          <p:cNvPr id="5" name="Picture 2"/>
-          <p:cNvPicPr>
-            <a:picLocks noChangeAspect="1" noChangeArrowheads="1"/>
-          </p:cNvPicPr>
-          <p:nvPr/>
-        </p:nvPicPr>
-        <p:blipFill>
-          <a:blip r:embed="rId2" cstate="print"/>
-          <a:srcRect/>
-          <a:stretch>
-            <a:fillRect/>
-          </a:stretch>
-        </p:blipFill>
-        <p:spPr bwMode="auto">
-          <a:xfrm>
-            <a:off x="2428860" y="3429000"/>
-            <a:ext cx="906242" cy="1143008"/>
-          </a:xfrm>
-          <a:prstGeom prst="rect">
-            <a:avLst/>
-          </a:prstGeom>
-          <a:noFill/>
-          <a:ln w="9525">
-            <a:noFill/>
-            <a:miter lim="800000"/>
-            <a:headEnd/>
-            <a:tailEnd/>
-          </a:ln>
-          <a:effectLst/>
-        </p:spPr>
-      </p:pic>
-      <p:pic>
-        <p:nvPicPr>
-          <p:cNvPr id="6146" name="Picture 2"/>
-          <p:cNvPicPr>
-            <a:picLocks noChangeAspect="1" noChangeArrowheads="1"/>
-          </p:cNvPicPr>
-          <p:nvPr/>
-        </p:nvPicPr>
-        <p:blipFill>
-          <a:blip r:embed="rId3" cstate="print"/>
-          <a:srcRect/>
-          <a:stretch>
-            <a:fillRect/>
-          </a:stretch>
-        </p:blipFill>
-        <p:spPr bwMode="auto">
-          <a:xfrm>
-            <a:off x="5214942" y="3357562"/>
-            <a:ext cx="1133475" cy="1295400"/>
-          </a:xfrm>
-          <a:prstGeom prst="rect">
-            <a:avLst/>
-          </a:prstGeom>
-          <a:noFill/>
-          <a:ln w="9525">
-            <a:noFill/>
-            <a:miter lim="800000"/>
-            <a:headEnd/>
-            <a:tailEnd/>
-          </a:ln>
-          <a:effectLst/>
-        </p:spPr>
-      </p:pic>
     </p:spTree>
   </p:cSld>
   <p:clrMapOvr>
@@ -7466,8 +7366,8 @@
         </p:nvSpPr>
         <p:spPr>
           <a:xfrm>
-            <a:off x="457200" y="1481329"/>
-            <a:ext cx="8229600" cy="661788"/>
+            <a:off x="457200" y="1481328"/>
+            <a:ext cx="8229600" cy="3090679"/>
           </a:xfrm>
         </p:spPr>
         <p:txBody>
@@ -7478,63 +7378,37 @@
           <a:p>
             <a:pPr lvl="0"/>
             <a:r>
-              <a:rPr lang="fr-FR" sz="1600" dirty="0" smtClean="0">
-                <a:cs typeface="Tahoma" pitchFamily="2"/>
-              </a:rPr>
-              <a:t>toute les images les images on </a:t>
-            </a:r>
-            <a:r>
-              <a:rPr lang="fr-FR" sz="1600" dirty="0" err="1" smtClean="0">
-                <a:cs typeface="Tahoma" pitchFamily="2"/>
-              </a:rPr>
-              <a:t>etais</a:t>
-            </a:r>
-            <a:r>
-              <a:rPr lang="fr-FR" sz="1600" dirty="0" smtClean="0">
-                <a:cs typeface="Tahoma" pitchFamily="2"/>
-              </a:rPr>
-              <a:t> converti en .</a:t>
-            </a:r>
-            <a:r>
-              <a:rPr lang="fr-FR" sz="1600" dirty="0" err="1" smtClean="0">
-                <a:cs typeface="Tahoma" pitchFamily="2"/>
-              </a:rPr>
-              <a:t>webp</a:t>
-            </a:r>
-            <a:r>
-              <a:rPr lang="fr-FR" sz="1600" dirty="0" smtClean="0">
-                <a:cs typeface="Tahoma" pitchFamily="2"/>
-              </a:rPr>
-              <a:t> pour les rendre plus légères.</a:t>
-            </a:r>
-            <a:endParaRPr lang="fr-FR" sz="1600" dirty="0">
-              <a:cs typeface="Tahoma" pitchFamily="2"/>
-            </a:endParaRPr>
-          </a:p>
-        </p:txBody>
-      </p:sp>
-      <p:sp>
-        <p:nvSpPr>
-          <p:cNvPr id="3" name="Titre 2"/>
-          <p:cNvSpPr>
-            <a:spLocks noGrp="1"/>
-          </p:cNvSpPr>
-          <p:nvPr>
-            <p:ph type="title"/>
-          </p:nvPr>
-        </p:nvSpPr>
-        <p:spPr/>
-        <p:txBody>
-          <a:bodyPr>
-            <a:normAutofit fontScale="90000"/>
-          </a:bodyPr>
-          <a:lstStyle/>
-          <a:p>
-            <a:r>
               <a:rPr lang="fr-FR" dirty="0" smtClean="0">
                 <a:cs typeface="Tahoma" pitchFamily="2"/>
               </a:rPr>
-              <a:t>Modification du format des images</a:t>
+              <a:t>Les balises Alt ont maintenant une description pertinente qui contient la descriptif de l’image ou des mots clé comme le nom de l’agence, son activité ou sa localisation. LightHouse améliore le score de Best Practices, mais cela à aussi un rôle sur le SEO.</a:t>
+            </a:r>
+          </a:p>
+          <a:p>
+            <a:endParaRPr lang="fr-FR" dirty="0"/>
+          </a:p>
+        </p:txBody>
+      </p:sp>
+      <p:sp>
+        <p:nvSpPr>
+          <p:cNvPr id="3" name="Titre 2"/>
+          <p:cNvSpPr>
+            <a:spLocks noGrp="1"/>
+          </p:cNvSpPr>
+          <p:nvPr>
+            <p:ph type="title"/>
+          </p:nvPr>
+        </p:nvSpPr>
+        <p:spPr/>
+        <p:txBody>
+          <a:bodyPr/>
+          <a:lstStyle/>
+          <a:p>
+            <a:r>
+              <a:rPr lang="fr-FR" dirty="0" smtClean="0">
+                <a:cs typeface="Tahoma" pitchFamily="2"/>
+              </a:rPr>
+              <a:t>Modification des balises Alt</a:t>
             </a:r>
             <a:endParaRPr lang="fr-FR" dirty="0"/>
           </a:p>
@@ -7711,33 +7585,6 @@
               <a:cs typeface="Arial" pitchFamily="34" charset="0"/>
             </a:endParaRPr>
           </a:p>
-          <a:p>
-            <a:pPr lvl="1"/>
-            <a:r>
-              <a:rPr lang="fr-FR" sz="1200" dirty="0" smtClean="0"/>
-              <a:t>Entreprise webdesign Lyon pour </a:t>
-            </a:r>
-            <a:r>
-              <a:rPr lang="fr-FR" sz="1200" dirty="0" err="1" smtClean="0"/>
-              <a:t>ameliorer</a:t>
-            </a:r>
-            <a:r>
-              <a:rPr lang="fr-FR" sz="1200" dirty="0" smtClean="0"/>
-              <a:t> le </a:t>
-            </a:r>
-            <a:r>
-              <a:rPr lang="fr-FR" sz="1200" dirty="0" err="1" smtClean="0"/>
-              <a:t>seo</a:t>
-            </a:r>
-            <a:endParaRPr lang="fr-FR" sz="1200" dirty="0">
-              <a:solidFill>
-                <a:srgbClr val="000000"/>
-              </a:solidFill>
-              <a:latin typeface="Arial" pitchFamily="34" charset="0"/>
-              <a:ea typeface="Microsoft YaHei" pitchFamily="2"/>
-              <a:cs typeface="Arial" pitchFamily="34" charset="0"/>
-            </a:endParaRPr>
-          </a:p>
         </p:txBody>
       </p:sp>
       <p:sp>
@@ -7802,69 +7649,58 @@
             <p:ph idx="1"/>
           </p:nvPr>
         </p:nvSpPr>
-        <p:spPr>
-          <a:xfrm>
-            <a:off x="457200" y="1481328"/>
-            <a:ext cx="8229600" cy="3090679"/>
-          </a:xfrm>
-        </p:spPr>
+        <p:spPr/>
+        <p:txBody>
+          <a:bodyPr/>
+          <a:lstStyle/>
+          <a:p>
+            <a:pPr lvl="0"/>
+            <a:r>
+              <a:rPr lang="fr-FR" sz="1600" dirty="0" smtClean="0">
+                <a:cs typeface="Tahoma" pitchFamily="2"/>
+              </a:rPr>
+              <a:t>En appliquant les autres conseils lié à la </a:t>
+            </a:r>
+            <a:r>
+              <a:rPr lang="fr-FR" sz="1600" dirty="0" err="1" smtClean="0">
+                <a:cs typeface="Tahoma" pitchFamily="2"/>
+              </a:rPr>
+              <a:t>checklist</a:t>
+            </a:r>
+            <a:r>
+              <a:rPr lang="fr-FR" sz="1600" dirty="0" smtClean="0">
+                <a:cs typeface="Tahoma" pitchFamily="2"/>
+              </a:rPr>
+              <a:t> MDN sur l’accessibilité, comme la présence d’un label pour chaque champs du formulaire, un texte alternatif pour les liens, le grossissement de certains boutons ou une meilleure structuration du site via les balises &lt;h.&gt;, on arrive à un score d’accessibilité de 100 % sur la page contact.</a:t>
+            </a:r>
+          </a:p>
+          <a:p>
+            <a:endParaRPr lang="fr-FR" dirty="0"/>
+          </a:p>
+        </p:txBody>
+      </p:sp>
+      <p:sp>
+        <p:nvSpPr>
+          <p:cNvPr id="3" name="Titre 2"/>
+          <p:cNvSpPr>
+            <a:spLocks noGrp="1"/>
+          </p:cNvSpPr>
+          <p:nvPr>
+            <p:ph type="title"/>
+          </p:nvPr>
+        </p:nvSpPr>
+        <p:spPr/>
         <p:txBody>
           <a:bodyPr>
-            <a:normAutofit fontScale="92500" lnSpcReduction="10000"/>
+            <a:normAutofit fontScale="90000"/>
           </a:bodyPr>
           <a:lstStyle/>
           <a:p>
-            <a:pPr lvl="0"/>
             <a:r>
               <a:rPr lang="fr-FR" dirty="0" smtClean="0">
                 <a:cs typeface="Tahoma" pitchFamily="2"/>
               </a:rPr>
-              <a:t>Les balises Alt ont maintenant une description pertinente qui contient le descriptif de l’image ou des mots clé comme le nom de l’agence, son activité ou sa localisation. LightHouse améliore le score de Best Practices, mais cela à aussi un rôle sur le SEO.</a:t>
-            </a:r>
-          </a:p>
-          <a:p>
-            <a:pPr lvl="0"/>
-            <a:r>
-              <a:rPr lang="fr-FR" dirty="0" smtClean="0">
-                <a:cs typeface="Tahoma" pitchFamily="2"/>
-              </a:rPr>
-              <a:t>Nous avons également améliorer l’accessibilité de la page d’accueil grâce à cette </a:t>
-            </a:r>
-            <a:r>
-              <a:rPr lang="fr-FR" dirty="0" err="1" smtClean="0">
-                <a:cs typeface="Tahoma" pitchFamily="2"/>
-              </a:rPr>
-              <a:t>checklist</a:t>
-            </a:r>
-            <a:endParaRPr lang="fr-FR" dirty="0" smtClean="0">
-              <a:cs typeface="Tahoma" pitchFamily="2"/>
-            </a:endParaRPr>
-          </a:p>
-          <a:p>
-            <a:endParaRPr lang="fr-FR" dirty="0"/>
-          </a:p>
-        </p:txBody>
-      </p:sp>
-      <p:sp>
-        <p:nvSpPr>
-          <p:cNvPr id="3" name="Titre 2"/>
-          <p:cNvSpPr>
-            <a:spLocks noGrp="1"/>
-          </p:cNvSpPr>
-          <p:nvPr>
-            <p:ph type="title"/>
-          </p:nvPr>
-        </p:nvSpPr>
-        <p:spPr/>
-        <p:txBody>
-          <a:bodyPr/>
-          <a:lstStyle/>
-          <a:p>
-            <a:r>
-              <a:rPr lang="fr-FR" dirty="0" smtClean="0">
-                <a:cs typeface="Tahoma" pitchFamily="2"/>
-              </a:rPr>
-              <a:t>Modification des balises Alt</a:t>
+              <a:t>Corrections mineures liées à la check-list sur l’accessibilités</a:t>
             </a:r>
             <a:endParaRPr lang="fr-FR" dirty="0"/>
           </a:p>
@@ -7897,71 +7733,156 @@
       </p:grpSpPr>
       <p:sp>
         <p:nvSpPr>
-          <p:cNvPr id="2" name="Espace réservé du contenu 1"/>
-          <p:cNvSpPr>
-            <a:spLocks noGrp="1"/>
-          </p:cNvSpPr>
-          <p:nvPr>
-            <p:ph idx="1"/>
+          <p:cNvPr id="3" name="Titre 2"/>
+          <p:cNvSpPr>
+            <a:spLocks noGrp="1"/>
+          </p:cNvSpPr>
+          <p:nvPr>
+            <p:ph type="title"/>
           </p:nvPr>
         </p:nvSpPr>
         <p:spPr/>
         <p:txBody>
           <a:bodyPr/>
-          <a:lstStyle/>
-          <a:p>
-            <a:pPr lvl="0"/>
-            <a:r>
-              <a:rPr lang="fr-FR" sz="1600" dirty="0" smtClean="0">
-                <a:cs typeface="Tahoma" pitchFamily="2"/>
-              </a:rPr>
-              <a:t>En appliquant les autres conseils lié à la </a:t>
-            </a:r>
-            <a:r>
-              <a:rPr lang="fr-FR" sz="1600" dirty="0" err="1" smtClean="0">
-                <a:cs typeface="Tahoma" pitchFamily="2"/>
-              </a:rPr>
-              <a:t>checklist</a:t>
-            </a:r>
-            <a:r>
-              <a:rPr lang="fr-FR" sz="1600" dirty="0" smtClean="0">
-                <a:cs typeface="Tahoma" pitchFamily="2"/>
-              </a:rPr>
-              <a:t> MDN sur l’accessibilité, comme la présence d’un label pour chaque champs du formulaire, un texte alternatif pour les liens, le grossissement de certains boutons ou une meilleure structuration du site via les balises &lt;h.&gt;, on arrive à un score d’accessibilité de 100 % sur la page contact.</a:t>
-            </a:r>
-          </a:p>
-          <a:p>
-            <a:endParaRPr lang="fr-FR" dirty="0"/>
-          </a:p>
-        </p:txBody>
-      </p:sp>
-      <p:sp>
-        <p:nvSpPr>
-          <p:cNvPr id="3" name="Titre 2"/>
-          <p:cNvSpPr>
-            <a:spLocks noGrp="1"/>
-          </p:cNvSpPr>
-          <p:nvPr>
-            <p:ph type="title"/>
-          </p:nvPr>
-        </p:nvSpPr>
-        <p:spPr/>
-        <p:txBody>
-          <a:bodyPr>
-            <a:normAutofit fontScale="90000"/>
-          </a:bodyPr>
           <a:lstStyle/>
           <a:p>
             <a:r>
               <a:rPr lang="fr-FR" dirty="0" smtClean="0">
                 <a:cs typeface="Tahoma" pitchFamily="2"/>
               </a:rPr>
-              <a:t>Corrections mineures liées à la check-list sur l’accessibilités</a:t>
+              <a:t>Résultats finaux, page d’accueil</a:t>
             </a:r>
             <a:endParaRPr lang="fr-FR" dirty="0"/>
           </a:p>
         </p:txBody>
       </p:sp>
+      <p:pic>
+        <p:nvPicPr>
+          <p:cNvPr id="5" name="Picture 2" descr="C:\Users\gress\Desktop\P4_gressier_gwenael\lighthouse sur index de base mini.png"/>
+          <p:cNvPicPr>
+            <a:picLocks noChangeAspect="1" noChangeArrowheads="1"/>
+          </p:cNvPicPr>
+          <p:nvPr/>
+        </p:nvPicPr>
+        <p:blipFill>
+          <a:blip r:embed="rId2" cstate="print"/>
+          <a:srcRect/>
+          <a:stretch>
+            <a:fillRect/>
+          </a:stretch>
+        </p:blipFill>
+        <p:spPr bwMode="auto">
+          <a:xfrm>
+            <a:off x="214282" y="1643050"/>
+            <a:ext cx="4429156" cy="785818"/>
+          </a:xfrm>
+          <a:prstGeom prst="rect">
+            <a:avLst/>
+          </a:prstGeom>
+          <a:noFill/>
+        </p:spPr>
+      </p:pic>
+      <p:pic>
+        <p:nvPicPr>
+          <p:cNvPr id="1027" name="Picture 3"/>
+          <p:cNvPicPr>
+            <a:picLocks noChangeAspect="1" noChangeArrowheads="1"/>
+          </p:cNvPicPr>
+          <p:nvPr/>
+        </p:nvPicPr>
+        <p:blipFill>
+          <a:blip r:embed="rId3" cstate="print"/>
+          <a:srcRect/>
+          <a:stretch>
+            <a:fillRect/>
+          </a:stretch>
+        </p:blipFill>
+        <p:spPr bwMode="auto">
+          <a:xfrm>
+            <a:off x="4286248" y="4429132"/>
+            <a:ext cx="4643470" cy="794120"/>
+          </a:xfrm>
+          <a:prstGeom prst="rect">
+            <a:avLst/>
+          </a:prstGeom>
+          <a:noFill/>
+          <a:ln w="9525">
+            <a:noFill/>
+            <a:miter lim="800000"/>
+            <a:headEnd/>
+            <a:tailEnd/>
+          </a:ln>
+          <a:effectLst/>
+        </p:spPr>
+      </p:pic>
+      <p:pic>
+        <p:nvPicPr>
+          <p:cNvPr id="1028" name="Picture 4"/>
+          <p:cNvPicPr>
+            <a:picLocks noGrp="1" noChangeAspect="1" noChangeArrowheads="1"/>
+          </p:cNvPicPr>
+          <p:nvPr>
+            <p:ph idx="1"/>
+          </p:nvPr>
+        </p:nvPicPr>
+        <p:blipFill>
+          <a:blip r:embed="rId4" cstate="print"/>
+          <a:srcRect/>
+          <a:stretch>
+            <a:fillRect/>
+          </a:stretch>
+        </p:blipFill>
+        <p:spPr bwMode="auto">
+          <a:xfrm>
+            <a:off x="4286248" y="5214950"/>
+            <a:ext cx="4643470" cy="1417697"/>
+          </a:xfrm>
+          <a:prstGeom prst="rect">
+            <a:avLst/>
+          </a:prstGeom>
+          <a:noFill/>
+          <a:ln w="9525">
+            <a:noFill/>
+            <a:miter lim="800000"/>
+            <a:headEnd/>
+            <a:tailEnd/>
+          </a:ln>
+          <a:effectLst/>
+        </p:spPr>
+      </p:pic>
+      <p:pic>
+        <p:nvPicPr>
+          <p:cNvPr id="1029" name="Picture 5"/>
+          <p:cNvPicPr>
+            <a:picLocks noChangeAspect="1" noChangeArrowheads="1"/>
+          </p:cNvPicPr>
+          <p:nvPr/>
+        </p:nvPicPr>
+        <p:blipFill>
+          <a:blip r:embed="rId5" cstate="print"/>
+          <a:srcRect/>
+          <a:stretch>
+            <a:fillRect/>
+          </a:stretch>
+        </p:blipFill>
+        <p:spPr bwMode="auto">
+          <a:xfrm>
+            <a:off x="214282" y="2428868"/>
+            <a:ext cx="4429156" cy="1473694"/>
+          </a:xfrm>
+          <a:prstGeom prst="rect">
+            <a:avLst/>
+          </a:prstGeom>
+          <a:noFill/>
+          <a:ln w="9525">
+            <a:noFill/>
+            <a:miter lim="800000"/>
+            <a:headEnd/>
+            <a:tailEnd/>
+          </a:ln>
+          <a:effectLst/>
+        </p:spPr>
+      </p:pic>
     </p:spTree>
   </p:cSld>
   <p:clrMapOvr>
@@ -7989,198 +7910,26 @@
       </p:grpSpPr>
       <p:sp>
         <p:nvSpPr>
-          <p:cNvPr id="2" name="Espace réservé du contenu 1"/>
-          <p:cNvSpPr>
-            <a:spLocks noGrp="1"/>
-          </p:cNvSpPr>
-          <p:nvPr>
-            <p:ph idx="1"/>
+          <p:cNvPr id="3" name="Titre 2"/>
+          <p:cNvSpPr>
+            <a:spLocks noGrp="1"/>
+          </p:cNvSpPr>
+          <p:nvPr>
+            <p:ph type="title"/>
           </p:nvPr>
         </p:nvSpPr>
         <p:spPr/>
         <p:txBody>
           <a:bodyPr>
-            <a:normAutofit/>
+            <a:normAutofit fontScale="90000"/>
           </a:bodyPr>
-          <a:lstStyle/>
-          <a:p>
-            <a:r>
-              <a:rPr lang="fr-FR" sz="1800" dirty="0" smtClean="0"/>
-              <a:t>La page 2 </a:t>
-            </a:r>
-          </a:p>
-          <a:p>
-            <a:r>
-              <a:rPr lang="fr-FR" sz="1800" dirty="0" smtClean="0"/>
-              <a:t> </a:t>
-            </a:r>
-            <a:r>
-              <a:rPr lang="en-US" sz="1800" dirty="0" smtClean="0"/>
-              <a:t>Error: </a:t>
-            </a:r>
-          </a:p>
-          <a:p>
-            <a:r>
-              <a:rPr lang="en-US" sz="1800" dirty="0" smtClean="0"/>
-              <a:t>Attribute success-</a:t>
-            </a:r>
-            <a:r>
-              <a:rPr lang="en-US" sz="1800" dirty="0" err="1" smtClean="0"/>
-              <a:t>msg</a:t>
-            </a:r>
-            <a:r>
-              <a:rPr lang="en-US" sz="1800" dirty="0" smtClean="0"/>
-              <a:t> not allowed on element </a:t>
-            </a:r>
-            <a:r>
-              <a:rPr lang="en-US" sz="1800" dirty="0" smtClean="0">
-                <a:hlinkClick r:id="rId2"/>
-              </a:rPr>
-              <a:t>form</a:t>
-            </a:r>
-            <a:r>
-              <a:rPr lang="en-US" sz="1800" dirty="0" smtClean="0"/>
-              <a:t> at this point.</a:t>
-            </a:r>
-          </a:p>
-          <a:p>
-            <a:endParaRPr lang="en-US" sz="1800" dirty="0" smtClean="0"/>
-          </a:p>
-          <a:p>
-            <a:r>
-              <a:rPr lang="en-US" sz="1800" dirty="0" smtClean="0"/>
-              <a:t> Attribute fail-</a:t>
-            </a:r>
-            <a:r>
-              <a:rPr lang="en-US" sz="1800" dirty="0" err="1" smtClean="0"/>
-              <a:t>msg</a:t>
-            </a:r>
-            <a:r>
-              <a:rPr lang="en-US" sz="1800" dirty="0" smtClean="0"/>
-              <a:t> not allowed on element </a:t>
-            </a:r>
-            <a:r>
-              <a:rPr lang="en-US" sz="1800" dirty="0" smtClean="0">
-                <a:hlinkClick r:id="rId2"/>
-              </a:rPr>
-              <a:t>form</a:t>
-            </a:r>
-            <a:r>
-              <a:rPr lang="en-US" sz="1800" dirty="0" smtClean="0"/>
-              <a:t> at this point.</a:t>
-            </a:r>
-          </a:p>
-          <a:p>
-            <a:pPr>
-              <a:buNone/>
-            </a:pPr>
-            <a:endParaRPr lang="en-US" sz="1800" dirty="0" smtClean="0"/>
-          </a:p>
-          <a:p>
-            <a:r>
-              <a:rPr lang="en-US" sz="1800" dirty="0" smtClean="0"/>
-              <a:t>Et </a:t>
-            </a:r>
-            <a:r>
-              <a:rPr lang="en-US" sz="1800" dirty="0" err="1" smtClean="0"/>
-              <a:t>encor</a:t>
-            </a:r>
-            <a:r>
-              <a:rPr lang="en-US" sz="1800" dirty="0" smtClean="0"/>
-              <a:t> plus de </a:t>
-            </a:r>
-            <a:r>
-              <a:rPr lang="en-US" sz="1800" dirty="0" err="1" smtClean="0"/>
-              <a:t>probleme</a:t>
-            </a:r>
-            <a:r>
-              <a:rPr lang="en-US" sz="1800" dirty="0" smtClean="0"/>
-              <a:t> </a:t>
-            </a:r>
-            <a:r>
-              <a:rPr lang="en-US" sz="1800" dirty="0" err="1" smtClean="0"/>
-              <a:t>lier</a:t>
-            </a:r>
-            <a:r>
-              <a:rPr lang="en-US" sz="1800" dirty="0" smtClean="0"/>
-              <a:t> au </a:t>
-            </a:r>
-            <a:r>
-              <a:rPr lang="en-US" sz="1800" dirty="0" err="1" smtClean="0"/>
-              <a:t>css</a:t>
-            </a:r>
-            <a:endParaRPr lang="fr-FR" sz="1800" dirty="0"/>
-          </a:p>
-        </p:txBody>
-      </p:sp>
-      <p:sp>
-        <p:nvSpPr>
-          <p:cNvPr id="3" name="Titre 2"/>
-          <p:cNvSpPr>
-            <a:spLocks noGrp="1"/>
-          </p:cNvSpPr>
-          <p:nvPr>
-            <p:ph type="title"/>
-          </p:nvPr>
-        </p:nvSpPr>
-        <p:spPr/>
-        <p:txBody>
-          <a:bodyPr/>
-          <a:lstStyle/>
-          <a:p>
-            <a:r>
-              <a:rPr lang="fr-FR" dirty="0" smtClean="0"/>
-              <a:t>Ne passe pas au validateur w3c</a:t>
-            </a:r>
-            <a:endParaRPr lang="fr-FR" dirty="0"/>
-          </a:p>
-        </p:txBody>
-      </p:sp>
-    </p:spTree>
-  </p:cSld>
-  <p:clrMapOvr>
-    <a:masterClrMapping/>
-  </p:clrMapOvr>
-</p:sld>
-</file>
-
-<file path=ppt/slides/slide23.xml><?xml version="1.0" encoding="utf-8"?>
-<p:sld xmlns:a="http://schemas.openxmlformats.org/drawingml/2006/main" xmlns:r="http://schemas.openxmlformats.org/officeDocument/2006/relationships" xmlns:p="http://schemas.openxmlformats.org/presentationml/2006/main">
-  <p:cSld>
-    <p:spTree>
-      <p:nvGrpSpPr>
-        <p:cNvPr id="1" name=""/>
-        <p:cNvGrpSpPr/>
-        <p:nvPr/>
-      </p:nvGrpSpPr>
-      <p:grpSpPr>
-        <a:xfrm>
-          <a:off x="0" y="0"/>
-          <a:ext cx="0" cy="0"/>
-          <a:chOff x="0" y="0"/>
-          <a:chExt cx="0" cy="0"/>
-        </a:xfrm>
-      </p:grpSpPr>
-      <p:sp>
-        <p:nvSpPr>
-          <p:cNvPr id="3" name="Titre 2"/>
-          <p:cNvSpPr>
-            <a:spLocks noGrp="1"/>
-          </p:cNvSpPr>
-          <p:nvPr>
-            <p:ph type="title"/>
-          </p:nvPr>
-        </p:nvSpPr>
-        <p:spPr/>
-        <p:txBody>
-          <a:bodyPr/>
           <a:lstStyle/>
           <a:p>
             <a:r>
               <a:rPr lang="fr-FR" dirty="0" smtClean="0">
                 <a:cs typeface="Tahoma" pitchFamily="2"/>
               </a:rPr>
-              <a:t>Résultats finaux, page d’accueil</a:t>
+              <a:t>Résultats finaux : page de contact</a:t>
             </a:r>
             <a:endParaRPr lang="fr-FR" dirty="0"/>
           </a:p>
@@ -8188,7 +7937,7 @@
       </p:sp>
       <p:pic>
         <p:nvPicPr>
-          <p:cNvPr id="8194" name="Picture 2"/>
+          <p:cNvPr id="2050" name="Picture 2"/>
           <p:cNvPicPr>
             <a:picLocks noGrp="1" noChangeAspect="1" noChangeArrowheads="1"/>
           </p:cNvPicPr>
@@ -8205,8 +7954,8 @@
         </p:blipFill>
         <p:spPr bwMode="auto">
           <a:xfrm>
-            <a:off x="2143108" y="4857760"/>
-            <a:ext cx="5324475" cy="800100"/>
+            <a:off x="4143372" y="4357694"/>
+            <a:ext cx="4857784" cy="830791"/>
           </a:xfrm>
           <a:prstGeom prst="rect">
             <a:avLst/>
@@ -8223,7 +7972,7 @@
       </p:pic>
       <p:pic>
         <p:nvPicPr>
-          <p:cNvPr id="5" name="Picture 2" descr="C:\Users\gress\Desktop\P4_gressier_gwenael\lighthouse sur index de base mini.png"/>
+          <p:cNvPr id="2052" name="Picture 4"/>
           <p:cNvPicPr>
             <a:picLocks noChangeAspect="1" noChangeArrowheads="1"/>
           </p:cNvPicPr>
@@ -8238,77 +7987,32 @@
         </p:blipFill>
         <p:spPr bwMode="auto">
           <a:xfrm>
-            <a:off x="357158" y="2643182"/>
-            <a:ext cx="5715040" cy="1006348"/>
+            <a:off x="4143372" y="5143512"/>
+            <a:ext cx="4857783" cy="1571636"/>
           </a:xfrm>
           <a:prstGeom prst="rect">
             <a:avLst/>
           </a:prstGeom>
           <a:noFill/>
+          <a:ln w="9525">
+            <a:noFill/>
+            <a:miter lim="800000"/>
+            <a:headEnd/>
+            <a:tailEnd/>
+          </a:ln>
+          <a:effectLst/>
         </p:spPr>
       </p:pic>
-    </p:spTree>
-  </p:cSld>
-  <p:clrMapOvr>
-    <a:masterClrMapping/>
-  </p:clrMapOvr>
-</p:sld>
-</file>
-
-<file path=ppt/slides/slide24.xml><?xml version="1.0" encoding="utf-8"?>
-<p:sld xmlns:a="http://schemas.openxmlformats.org/drawingml/2006/main" xmlns:r="http://schemas.openxmlformats.org/officeDocument/2006/relationships" xmlns:p="http://schemas.openxmlformats.org/presentationml/2006/main">
-  <p:cSld>
-    <p:spTree>
-      <p:nvGrpSpPr>
-        <p:cNvPr id="1" name=""/>
-        <p:cNvGrpSpPr/>
-        <p:nvPr/>
-      </p:nvGrpSpPr>
-      <p:grpSpPr>
-        <a:xfrm>
-          <a:off x="0" y="0"/>
-          <a:ext cx="0" cy="0"/>
-          <a:chOff x="0" y="0"/>
-          <a:chExt cx="0" cy="0"/>
-        </a:xfrm>
-      </p:grpSpPr>
-      <p:sp>
-        <p:nvSpPr>
-          <p:cNvPr id="3" name="Titre 2"/>
-          <p:cNvSpPr>
-            <a:spLocks noGrp="1"/>
-          </p:cNvSpPr>
-          <p:nvPr>
-            <p:ph type="title"/>
-          </p:nvPr>
-        </p:nvSpPr>
-        <p:spPr/>
-        <p:txBody>
-          <a:bodyPr>
-            <a:normAutofit fontScale="90000"/>
-          </a:bodyPr>
-          <a:lstStyle/>
-          <a:p>
-            <a:r>
-              <a:rPr lang="fr-FR" dirty="0" smtClean="0">
-                <a:cs typeface="Tahoma" pitchFamily="2"/>
-              </a:rPr>
-              <a:t>Résultats finaux : page de contact</a:t>
-            </a:r>
-            <a:endParaRPr lang="fr-FR" dirty="0"/>
-          </a:p>
-        </p:txBody>
-      </p:sp>
       <p:pic>
         <p:nvPicPr>
-          <p:cNvPr id="5" name="Picture 3" descr="C:\Users\gress\Desktop\P4_gressier_gwenael\lighthouse sur page2 de base.png"/>
+          <p:cNvPr id="2053" name="Picture 5"/>
           <p:cNvPicPr>
             <a:picLocks noChangeAspect="1" noChangeArrowheads="1"/>
           </p:cNvPicPr>
           <p:nvPr/>
         </p:nvPicPr>
         <p:blipFill>
-          <a:blip r:embed="rId2" cstate="print"/>
+          <a:blip r:embed="rId4" cstate="print"/>
           <a:srcRect/>
           <a:stretch>
             <a:fillRect/>
@@ -8316,27 +8020,32 @@
         </p:blipFill>
         <p:spPr bwMode="auto">
           <a:xfrm>
-            <a:off x="2071670" y="2857496"/>
-            <a:ext cx="4857785" cy="874402"/>
+            <a:off x="357158" y="2428867"/>
+            <a:ext cx="4857784" cy="1562059"/>
           </a:xfrm>
           <a:prstGeom prst="rect">
             <a:avLst/>
           </a:prstGeom>
           <a:noFill/>
+          <a:ln w="9525">
+            <a:noFill/>
+            <a:miter lim="800000"/>
+            <a:headEnd/>
+            <a:tailEnd/>
+          </a:ln>
+          <a:effectLst/>
         </p:spPr>
       </p:pic>
       <p:pic>
         <p:nvPicPr>
-          <p:cNvPr id="7171" name="Picture 3"/>
+          <p:cNvPr id="2054" name="Picture 6"/>
           <p:cNvPicPr>
-            <a:picLocks noGrp="1" noChangeAspect="1" noChangeArrowheads="1"/>
+            <a:picLocks noChangeAspect="1" noChangeArrowheads="1"/>
           </p:cNvPicPr>
-          <p:nvPr>
-            <p:ph idx="1"/>
-          </p:nvPr>
+          <p:nvPr/>
         </p:nvPicPr>
         <p:blipFill>
-          <a:blip r:embed="rId3" cstate="print"/>
+          <a:blip r:embed="rId5" cstate="print"/>
           <a:srcRect/>
           <a:stretch>
             <a:fillRect/>
@@ -8344,8 +8053,8 @@
         </p:blipFill>
         <p:spPr bwMode="auto">
           <a:xfrm>
-            <a:off x="2071670" y="4143380"/>
-            <a:ext cx="4857785" cy="719023"/>
+            <a:off x="357158" y="1571612"/>
+            <a:ext cx="4857783" cy="857256"/>
           </a:xfrm>
           <a:prstGeom prst="rect">
             <a:avLst/>
@@ -8403,13 +8112,13 @@
         </p:spPr>
         <p:txBody>
           <a:bodyPr>
-            <a:normAutofit fontScale="92500"/>
+            <a:normAutofit/>
           </a:bodyPr>
           <a:lstStyle/>
           <a:p>
             <a:pPr lvl="0"/>
             <a:r>
-              <a:rPr lang="fr-FR" sz="2900" dirty="0" smtClean="0">
+              <a:rPr lang="fr-FR" sz="1600" dirty="0" smtClean="0">
                 <a:cs typeface="Tahoma" pitchFamily="2"/>
               </a:rPr>
               <a:t>Voici la page d’index et page 2 sur la version</a:t>
@@ -8420,7 +8129,7 @@
               <a:buNone/>
             </a:pPr>
             <a:r>
-              <a:rPr lang="fr-FR" sz="2900" dirty="0" smtClean="0">
+              <a:rPr lang="fr-FR" sz="1600" dirty="0" smtClean="0">
                 <a:cs typeface="Tahoma" pitchFamily="2"/>
               </a:rPr>
               <a:t>	actuelle du site, sans modification.</a:t>
@@ -8430,7 +8139,7 @@
             <a:pPr lvl="0">
               <a:buNone/>
             </a:pPr>
-            <a:endParaRPr lang="fr-FR" sz="2900" dirty="0" smtClean="0">
+            <a:endParaRPr lang="fr-FR" sz="1600" dirty="0" smtClean="0">
               <a:cs typeface="Tahoma" pitchFamily="2"/>
             </a:endParaRPr>
           </a:p>
@@ -8438,7 +8147,7 @@
             <a:pPr lvl="0">
               <a:buNone/>
             </a:pPr>
-            <a:endParaRPr lang="fr-FR" sz="2900" dirty="0" smtClean="0">
+            <a:endParaRPr lang="fr-FR" sz="1600" dirty="0" smtClean="0">
               <a:cs typeface="Tahoma" pitchFamily="2"/>
             </a:endParaRPr>
           </a:p>
@@ -8446,7 +8155,7 @@
             <a:pPr lvl="0">
               <a:buNone/>
             </a:pPr>
-            <a:endParaRPr lang="fr-FR" sz="2900" dirty="0" smtClean="0">
+            <a:endParaRPr lang="fr-FR" sz="1600" dirty="0" smtClean="0">
               <a:cs typeface="Tahoma" pitchFamily="2"/>
             </a:endParaRPr>
           </a:p>
@@ -8454,7 +8163,7 @@
             <a:pPr lvl="0">
               <a:buNone/>
             </a:pPr>
-            <a:endParaRPr lang="fr-FR" sz="2900" dirty="0" smtClean="0">
+            <a:endParaRPr lang="fr-FR" sz="1600" dirty="0" smtClean="0">
               <a:cs typeface="Tahoma" pitchFamily="2"/>
             </a:endParaRPr>
           </a:p>
@@ -8462,7 +8171,7 @@
             <a:pPr lvl="0">
               <a:buNone/>
             </a:pPr>
-            <a:endParaRPr lang="fr-FR" sz="2900" dirty="0" smtClean="0">
+            <a:endParaRPr lang="fr-FR" sz="1600" dirty="0" smtClean="0">
               <a:cs typeface="Tahoma" pitchFamily="2"/>
             </a:endParaRPr>
           </a:p>
@@ -8470,7 +8179,47 @@
             <a:pPr lvl="0">
               <a:buNone/>
             </a:pPr>
-            <a:endParaRPr lang="fr-FR" sz="2900" dirty="0" smtClean="0">
+            <a:endParaRPr lang="fr-FR" sz="1600" dirty="0" smtClean="0">
+              <a:cs typeface="Tahoma" pitchFamily="2"/>
+            </a:endParaRPr>
+          </a:p>
+          <a:p>
+            <a:pPr lvl="0">
+              <a:buNone/>
+            </a:pPr>
+            <a:endParaRPr lang="fr-FR" sz="1600" dirty="0" smtClean="0">
+              <a:cs typeface="Tahoma" pitchFamily="2"/>
+            </a:endParaRPr>
+          </a:p>
+          <a:p>
+            <a:pPr lvl="0">
+              <a:buNone/>
+            </a:pPr>
+            <a:endParaRPr lang="fr-FR" sz="1600" dirty="0" smtClean="0">
+              <a:cs typeface="Tahoma" pitchFamily="2"/>
+            </a:endParaRPr>
+          </a:p>
+          <a:p>
+            <a:pPr lvl="0">
+              <a:buNone/>
+            </a:pPr>
+            <a:endParaRPr lang="fr-FR" sz="1600" dirty="0" smtClean="0">
+              <a:cs typeface="Tahoma" pitchFamily="2"/>
+            </a:endParaRPr>
+          </a:p>
+          <a:p>
+            <a:pPr lvl="0">
+              <a:buNone/>
+            </a:pPr>
+            <a:endParaRPr lang="fr-FR" sz="1600" dirty="0" smtClean="0">
+              <a:cs typeface="Tahoma" pitchFamily="2"/>
+            </a:endParaRPr>
+          </a:p>
+          <a:p>
+            <a:pPr lvl="0">
+              <a:buNone/>
+            </a:pPr>
+            <a:endParaRPr lang="fr-FR" sz="1600" dirty="0" smtClean="0">
               <a:cs typeface="Tahoma" pitchFamily="2"/>
             </a:endParaRPr>
           </a:p>
@@ -8479,7 +8228,7 @@
               <a:defRPr/>
             </a:pPr>
             <a:r>
-              <a:rPr lang="fr-FR" sz="2900" dirty="0" smtClean="0">
+              <a:rPr lang="fr-FR" sz="1600" dirty="0" smtClean="0">
                 <a:cs typeface="Tahoma" pitchFamily="2"/>
               </a:rPr>
               <a:t>Une fois l’audit fini, ces scores auront</a:t>
@@ -8491,7 +8240,7 @@
               <a:defRPr/>
             </a:pPr>
             <a:r>
-              <a:rPr lang="fr-FR" sz="2900" dirty="0" smtClean="0">
+              <a:rPr lang="fr-FR" sz="1600" dirty="0" smtClean="0">
                 <a:cs typeface="Tahoma" pitchFamily="2"/>
               </a:rPr>
               <a:t>	tous été améliorés.</a:t>
@@ -8770,31 +8519,31 @@
           <a:p>
             <a:pPr lvl="0"/>
             <a:r>
-              <a:rPr lang="fr-FR" dirty="0" smtClean="0">
+              <a:rPr lang="fr-FR" sz="1600" dirty="0" smtClean="0">
                 <a:cs typeface="Tahoma" pitchFamily="2"/>
               </a:rPr>
               <a:t>La balise </a:t>
             </a:r>
             <a:r>
-              <a:rPr lang="fr-FR" dirty="0" err="1" smtClean="0">
+              <a:rPr lang="fr-FR" sz="1600" dirty="0" err="1" smtClean="0">
                 <a:cs typeface="Tahoma" pitchFamily="2"/>
               </a:rPr>
               <a:t>lang</a:t>
             </a:r>
             <a:r>
-              <a:rPr lang="fr-FR" dirty="0" smtClean="0">
+              <a:rPr lang="fr-FR" sz="1600" dirty="0" smtClean="0">
                 <a:cs typeface="Tahoma" pitchFamily="2"/>
               </a:rPr>
-              <a:t> à une valeur default qui est invalide. En remplaçant la valeur par « </a:t>
-            </a:r>
-            <a:r>
-              <a:rPr lang="fr-FR" dirty="0" err="1" smtClean="0">
+              <a:t> à une valeur « default » qui est invalide. En remplaçant la valeur par « </a:t>
+            </a:r>
+            <a:r>
+              <a:rPr lang="fr-FR" sz="1600" dirty="0" err="1" smtClean="0">
                 <a:cs typeface="Tahoma" pitchFamily="2"/>
               </a:rPr>
               <a:t>fr</a:t>
             </a:r>
             <a:r>
-              <a:rPr lang="fr-FR" dirty="0" smtClean="0">
+              <a:rPr lang="fr-FR" sz="1600" dirty="0" smtClean="0">
                 <a:cs typeface="Tahoma" pitchFamily="2"/>
               </a:rPr>
               <a:t> », le score d’accessibilité passe de 84 à 88 pour la page index et de 76 à 80 pour la page2.</a:t>
@@ -9299,7 +9048,36 @@
                 <a:ea typeface="Microsoft YaHei" pitchFamily="2"/>
                 <a:cs typeface="Arial" pitchFamily="34" charset="0"/>
               </a:rPr>
-              <a:t>« nous contacter » pour la page 2.</a:t>
+              <a:t>« nous contacter - </a:t>
+            </a:r>
+            <a:r>
+              <a:rPr lang="fr-FR" sz="1600" dirty="0" smtClean="0">
+                <a:cs typeface="Arial" pitchFamily="34" charset="0"/>
+              </a:rPr>
+              <a:t>La </a:t>
+            </a:r>
+            <a:r>
+              <a:rPr lang="fr-FR" sz="1600" dirty="0" err="1" smtClean="0">
+                <a:cs typeface="Arial" pitchFamily="34" charset="0"/>
+              </a:rPr>
+              <a:t>panthére</a:t>
+            </a:r>
+            <a:r>
+              <a:rPr lang="fr-FR" sz="1600" dirty="0" smtClean="0">
+                <a:cs typeface="Arial" pitchFamily="34" charset="0"/>
+              </a:rPr>
+              <a:t> agence web design </a:t>
+            </a:r>
+            <a:r>
+              <a:rPr lang="fr-FR" sz="1600" dirty="0" smtClean="0">
+                <a:solidFill>
+                  <a:srgbClr val="000000"/>
+                </a:solidFill>
+                <a:latin typeface="+mj-lt"/>
+                <a:ea typeface="Microsoft YaHei" pitchFamily="2"/>
+                <a:cs typeface="Arial" pitchFamily="34" charset="0"/>
+              </a:rPr>
+              <a:t> » pour la page 2.</a:t>
             </a:r>
           </a:p>
           <a:p>
@@ -9706,215 +9484,6 @@
             <p:ph idx="1"/>
           </p:nvPr>
         </p:nvSpPr>
-        <p:spPr>
-          <a:xfrm>
-            <a:off x="457200" y="1481328"/>
-            <a:ext cx="8229600" cy="5090943"/>
-          </a:xfrm>
-        </p:spPr>
-        <p:txBody>
-          <a:bodyPr>
-            <a:normAutofit/>
-          </a:bodyPr>
-          <a:lstStyle/>
-          <a:p>
-            <a:pPr lvl="0"/>
-            <a:r>
-              <a:rPr lang="fr-FR" sz="1600" dirty="0" smtClean="0">
-                <a:cs typeface="Tahoma" pitchFamily="2"/>
-              </a:rPr>
-              <a:t>Cette balise sera au mieux ignorée par les moteurs de recherche, au pire sanctionnée. Les outils comme LightHouse ne prennent pas en compte cette balise, donc pas de différence au niveau du score SEO, mais voici un article d’un site spécialisé en SEO qui explique clairement l’inutilité / dangerosité de cette balise. (lien complet dans le tableau </a:t>
-            </a:r>
-            <a:r>
-              <a:rPr lang="fr-FR" sz="1600" dirty="0" err="1" smtClean="0">
-                <a:cs typeface="Tahoma" pitchFamily="2"/>
-              </a:rPr>
-              <a:t>excel</a:t>
-            </a:r>
-            <a:r>
-              <a:rPr lang="fr-FR" sz="1600" dirty="0" smtClean="0">
-                <a:cs typeface="Tahoma" pitchFamily="2"/>
-              </a:rPr>
-              <a:t>)</a:t>
-            </a:r>
-          </a:p>
-          <a:p>
-            <a:r>
-              <a:rPr lang="fr-FR" sz="1600" dirty="0" smtClean="0"/>
-              <a:t>Ne change pas le score de </a:t>
-            </a:r>
-            <a:r>
-              <a:rPr lang="fr-FR" sz="1600" dirty="0" err="1" smtClean="0"/>
-              <a:t>seo</a:t>
-            </a:r>
-            <a:r>
-              <a:rPr lang="fr-FR" sz="1600" dirty="0" smtClean="0"/>
-              <a:t>.</a:t>
-            </a:r>
-          </a:p>
-          <a:p>
-            <a:endParaRPr lang="fr-FR" dirty="0" smtClean="0"/>
-          </a:p>
-          <a:p>
-            <a:endParaRPr lang="fr-FR" dirty="0" smtClean="0"/>
-          </a:p>
-          <a:p>
-            <a:endParaRPr lang="fr-FR" dirty="0" smtClean="0"/>
-          </a:p>
-          <a:p>
-            <a:pPr>
-              <a:buNone/>
-            </a:pPr>
-            <a:endParaRPr lang="fr-FR" sz="800" dirty="0" smtClean="0"/>
-          </a:p>
-          <a:p>
-            <a:r>
-              <a:rPr lang="fr-FR" sz="800" dirty="0" err="1" smtClean="0"/>
-              <a:t>Source:https://optimiz.me/la-balise-meta-keywords/</a:t>
-            </a:r>
-            <a:endParaRPr lang="fr-FR" sz="800" dirty="0"/>
-          </a:p>
-        </p:txBody>
-      </p:sp>
-      <p:sp>
-        <p:nvSpPr>
-          <p:cNvPr id="3" name="Titre 2"/>
-          <p:cNvSpPr>
-            <a:spLocks noGrp="1"/>
-          </p:cNvSpPr>
-          <p:nvPr>
-            <p:ph type="title"/>
-          </p:nvPr>
-        </p:nvSpPr>
-        <p:spPr/>
-        <p:txBody>
-          <a:bodyPr>
-            <a:normAutofit fontScale="90000"/>
-          </a:bodyPr>
-          <a:lstStyle/>
-          <a:p>
-            <a:r>
-              <a:rPr lang="fr-FR" dirty="0" smtClean="0">
-                <a:cs typeface="Tahoma" pitchFamily="2"/>
-              </a:rPr>
-              <a:t>Suppression de la balise </a:t>
-            </a:r>
-            <a:r>
-              <a:rPr lang="fr-FR" dirty="0" err="1" smtClean="0">
-                <a:cs typeface="Tahoma" pitchFamily="2"/>
-              </a:rPr>
-              <a:t>meta</a:t>
-            </a:r>
-            <a:r>
-              <a:rPr lang="fr-FR" dirty="0" smtClean="0">
-                <a:cs typeface="Tahoma" pitchFamily="2"/>
-              </a:rPr>
-              <a:t> keywords	</a:t>
-            </a:r>
-            <a:endParaRPr lang="fr-FR" dirty="0"/>
-          </a:p>
-        </p:txBody>
-      </p:sp>
-      <p:pic>
-        <p:nvPicPr>
-          <p:cNvPr id="4" name="Image 3"/>
-          <p:cNvPicPr>
-            <a:picLocks noChangeAspect="1"/>
-          </p:cNvPicPr>
-          <p:nvPr/>
-        </p:nvPicPr>
-        <p:blipFill>
-          <a:blip r:embed="rId2" cstate="print">
-            <a:alphaModFix/>
-            <a:lum/>
-          </a:blip>
-          <a:srcRect/>
-          <a:stretch>
-            <a:fillRect/>
-          </a:stretch>
-        </p:blipFill>
-        <p:spPr>
-          <a:xfrm>
-            <a:off x="142844" y="3286124"/>
-            <a:ext cx="8572560" cy="1287158"/>
-          </a:xfrm>
-          <a:prstGeom prst="rect">
-            <a:avLst/>
-          </a:prstGeom>
-          <a:noFill/>
-          <a:ln>
-            <a:noFill/>
-          </a:ln>
-        </p:spPr>
-      </p:pic>
-      <p:pic>
-        <p:nvPicPr>
-          <p:cNvPr id="1027" name="Picture 3"/>
-          <p:cNvPicPr>
-            <a:picLocks noChangeAspect="1" noChangeArrowheads="1"/>
-          </p:cNvPicPr>
-          <p:nvPr/>
-        </p:nvPicPr>
-        <p:blipFill>
-          <a:blip r:embed="rId3" cstate="print"/>
-          <a:srcRect/>
-          <a:stretch>
-            <a:fillRect/>
-          </a:stretch>
-        </p:blipFill>
-        <p:spPr bwMode="auto">
-          <a:xfrm>
-            <a:off x="3857620" y="4500570"/>
-            <a:ext cx="4929222" cy="1739130"/>
-          </a:xfrm>
-          <a:prstGeom prst="rect">
-            <a:avLst/>
-          </a:prstGeom>
-          <a:noFill/>
-          <a:ln w="9525">
-            <a:noFill/>
-            <a:miter lim="800000"/>
-            <a:headEnd/>
-            <a:tailEnd/>
-          </a:ln>
-          <a:effectLst/>
-        </p:spPr>
-      </p:pic>
-    </p:spTree>
-  </p:cSld>
-  <p:clrMapOvr>
-    <a:masterClrMapping/>
-  </p:clrMapOvr>
-</p:sld>
-</file>
-
-<file path=ppt/slides/slide7.xml><?xml version="1.0" encoding="utf-8"?>
-<p:sld xmlns:a="http://schemas.openxmlformats.org/drawingml/2006/main" xmlns:r="http://schemas.openxmlformats.org/officeDocument/2006/relationships" xmlns:p="http://schemas.openxmlformats.org/presentationml/2006/main">
-  <p:cSld>
-    <p:spTree>
-      <p:nvGrpSpPr>
-        <p:cNvPr id="1" name=""/>
-        <p:cNvGrpSpPr/>
-        <p:nvPr/>
-      </p:nvGrpSpPr>
-      <p:grpSpPr>
-        <a:xfrm>
-          <a:off x="0" y="0"/>
-          <a:ext cx="0" cy="0"/>
-          <a:chOff x="0" y="0"/>
-          <a:chExt cx="0" cy="0"/>
-        </a:xfrm>
-      </p:grpSpPr>
-      <p:sp>
-        <p:nvSpPr>
-          <p:cNvPr id="2" name="Espace réservé du contenu 1"/>
-          <p:cNvSpPr>
-            <a:spLocks noGrp="1"/>
-          </p:cNvSpPr>
-          <p:nvPr>
-            <p:ph idx="1"/>
-          </p:nvPr>
-        </p:nvSpPr>
         <p:spPr/>
         <p:txBody>
           <a:bodyPr/>
@@ -9939,6 +9508,36 @@
               </a:rPr>
               <a:t> description. le score de SEO passe de 78 à 86 pour la page index et de 72 à 81 pour la page2.</a:t>
             </a:r>
+          </a:p>
+          <a:p>
+            <a:pPr lvl="0"/>
+            <a:r>
+              <a:rPr lang="fr-FR" sz="1600" dirty="0" smtClean="0">
+                <a:cs typeface="Tahoma" pitchFamily="2"/>
+              </a:rPr>
+              <a:t>Remplis avec:</a:t>
+            </a:r>
+          </a:p>
+          <a:p>
+            <a:pPr lvl="1"/>
+            <a:r>
+              <a:rPr lang="fr-FR" sz="1200" dirty="0" smtClean="0"/>
+              <a:t>"L'agence La Panthère est une agence de webdesign de Lyon qui aide les entreprise à devenir attractive et visibles sur internet."</a:t>
+            </a:r>
+          </a:p>
+          <a:p>
+            <a:pPr lvl="1"/>
+            <a:endParaRPr lang="fr-FR" sz="1200" dirty="0" smtClean="0"/>
+          </a:p>
+          <a:p>
+            <a:pPr lvl="1"/>
+            <a:endParaRPr lang="fr-FR" sz="1200" dirty="0" smtClean="0"/>
+          </a:p>
+          <a:p>
+            <a:pPr lvl="0"/>
+            <a:endParaRPr lang="fr-FR" sz="1600" dirty="0" smtClean="0">
+              <a:cs typeface="Tahoma" pitchFamily="2"/>
+            </a:endParaRPr>
           </a:p>
           <a:p>
             <a:pPr lvl="0">
@@ -10320,6 +9919,115 @@
 </p:sld>
 </file>
 
+<file path=ppt/slides/slide7.xml><?xml version="1.0" encoding="utf-8"?>
+<p:sld xmlns:a="http://schemas.openxmlformats.org/drawingml/2006/main" xmlns:r="http://schemas.openxmlformats.org/officeDocument/2006/relationships" xmlns:p="http://schemas.openxmlformats.org/presentationml/2006/main">
+  <p:cSld>
+    <p:spTree>
+      <p:nvGrpSpPr>
+        <p:cNvPr id="1" name=""/>
+        <p:cNvGrpSpPr/>
+        <p:nvPr/>
+      </p:nvGrpSpPr>
+      <p:grpSpPr>
+        <a:xfrm>
+          <a:off x="0" y="0"/>
+          <a:ext cx="0" cy="0"/>
+          <a:chOff x="0" y="0"/>
+          <a:chExt cx="0" cy="0"/>
+        </a:xfrm>
+      </p:grpSpPr>
+      <p:sp>
+        <p:nvSpPr>
+          <p:cNvPr id="2" name="Espace réservé du contenu 1"/>
+          <p:cNvSpPr>
+            <a:spLocks noGrp="1"/>
+          </p:cNvSpPr>
+          <p:nvPr>
+            <p:ph idx="1"/>
+          </p:nvPr>
+        </p:nvSpPr>
+        <p:spPr>
+          <a:xfrm>
+            <a:off x="457200" y="1481329"/>
+            <a:ext cx="8229600" cy="1376168"/>
+          </a:xfrm>
+        </p:spPr>
+        <p:txBody>
+          <a:bodyPr/>
+          <a:lstStyle/>
+          <a:p>
+            <a:pPr lvl="0"/>
+            <a:r>
+              <a:rPr lang="fr-FR" sz="1600" dirty="0" smtClean="0">
+                <a:cs typeface="Tahoma" pitchFamily="2"/>
+              </a:rPr>
+              <a:t>Utiliser du texte tout petit et/ou transparent pour spammer les mots clés est une mauvaise idée : c’est une technique « black </a:t>
+            </a:r>
+            <a:r>
+              <a:rPr lang="fr-FR" sz="1600" dirty="0" err="1" smtClean="0">
+                <a:cs typeface="Tahoma" pitchFamily="2"/>
+              </a:rPr>
+              <a:t>hat</a:t>
+            </a:r>
+            <a:r>
+              <a:rPr lang="fr-FR" sz="1600" dirty="0" smtClean="0">
+                <a:cs typeface="Tahoma" pitchFamily="2"/>
+              </a:rPr>
+              <a:t> »  très grossière et Google la repère très rapidement. Ensuite, vous êtes pénalisé. LightHouse ne prend pas ce paramètre en compte, les notes ne changent donc pas mais il est primordial de les supprimer.</a:t>
+            </a:r>
+          </a:p>
+          <a:p>
+            <a:endParaRPr lang="fr-FR" dirty="0"/>
+          </a:p>
+        </p:txBody>
+      </p:sp>
+      <p:sp>
+        <p:nvSpPr>
+          <p:cNvPr id="3" name="Titre 2"/>
+          <p:cNvSpPr>
+            <a:spLocks noGrp="1"/>
+          </p:cNvSpPr>
+          <p:nvPr>
+            <p:ph type="title"/>
+          </p:nvPr>
+        </p:nvSpPr>
+        <p:spPr/>
+        <p:txBody>
+          <a:bodyPr>
+            <a:normAutofit fontScale="90000"/>
+          </a:bodyPr>
+          <a:lstStyle/>
+          <a:p>
+            <a:r>
+              <a:rPr lang="fr-FR" dirty="0" smtClean="0">
+                <a:cs typeface="Tahoma" pitchFamily="2"/>
+              </a:rPr>
+              <a:t>Suppression des </a:t>
+            </a:r>
+            <a:r>
+              <a:rPr lang="fr-FR" dirty="0" err="1" smtClean="0">
+                <a:cs typeface="Tahoma" pitchFamily="2"/>
+              </a:rPr>
+              <a:t>divs</a:t>
+            </a:r>
+            <a:r>
+              <a:rPr lang="fr-FR" dirty="0" smtClean="0">
+                <a:cs typeface="Tahoma" pitchFamily="2"/>
+              </a:rPr>
+              <a:t> « keywords »</a:t>
+            </a:r>
+            <a:endParaRPr lang="fr-FR" dirty="0"/>
+          </a:p>
+        </p:txBody>
+      </p:sp>
+    </p:spTree>
+  </p:cSld>
+  <p:clrMapOvr>
+    <a:masterClrMapping/>
+  </p:clrMapOvr>
+</p:sld>
+</file>
+
 <file path=ppt/slides/slide8.xml><?xml version="1.0" encoding="utf-8"?>
 <p:sld xmlns:a="http://schemas.openxmlformats.org/drawingml/2006/main" xmlns:r="http://schemas.openxmlformats.org/officeDocument/2006/relationships" xmlns:p="http://schemas.openxmlformats.org/presentationml/2006/main">
   <p:cSld>
@@ -10349,35 +10057,95 @@
         </p:nvSpPr>
         <p:spPr>
           <a:xfrm>
-            <a:off x="457200" y="1481329"/>
-            <a:ext cx="8229600" cy="1376168"/>
-          </a:xfrm>
-        </p:spPr>
-        <p:txBody>
-          <a:bodyPr/>
+            <a:off x="457200" y="1481328"/>
+            <a:ext cx="8229600" cy="1590481"/>
+          </a:xfrm>
+        </p:spPr>
+        <p:txBody>
+          <a:bodyPr>
+            <a:normAutofit fontScale="62500" lnSpcReduction="20000"/>
+          </a:bodyPr>
           <a:lstStyle/>
           <a:p>
             <a:pPr lvl="0"/>
             <a:r>
-              <a:rPr lang="fr-FR" sz="1600" dirty="0" smtClean="0">
+              <a:rPr lang="fr-FR" sz="1900" dirty="0" smtClean="0">
                 <a:cs typeface="Tahoma" pitchFamily="2"/>
               </a:rPr>
-              <a:t>Utiliser du texte tout petit et/ou transparent pour spammer les mots clés est une mauvaise idée : c’est une technique « black </a:t>
-            </a:r>
-            <a:r>
-              <a:rPr lang="fr-FR" sz="1600" dirty="0" err="1" smtClean="0">
+              <a:t>Le terme « Page2 » est présent en tant que nom de fichier, balise title de la page, et en format texte dans le menu en tant que lien hypertexte.</a:t>
+            </a:r>
+          </a:p>
+          <a:p>
+            <a:pPr lvl="0"/>
+            <a:endParaRPr lang="fr-FR" sz="1900" dirty="0" smtClean="0">
+              <a:cs typeface="Tahoma" pitchFamily="2"/>
+            </a:endParaRPr>
+          </a:p>
+          <a:p>
+            <a:pPr lvl="0"/>
+            <a:r>
+              <a:rPr lang="fr-FR" sz="1900" dirty="0" smtClean="0">
                 <a:cs typeface="Tahoma" pitchFamily="2"/>
               </a:rPr>
-              <a:t>hat</a:t>
-            </a:r>
-            <a:r>
-              <a:rPr lang="fr-FR" sz="1600" dirty="0" smtClean="0">
+              <a:t> Le terme « Page2 » sera remplacées par « Contact » pour que ce soit plus clair à la fois pour les moteurs de recherche, et les utilisateurs</a:t>
+            </a:r>
+          </a:p>
+          <a:p>
+            <a:pPr lvl="0"/>
+            <a:endParaRPr lang="fr-FR" sz="1900" dirty="0" smtClean="0">
+              <a:cs typeface="Tahoma" pitchFamily="2"/>
+            </a:endParaRPr>
+          </a:p>
+          <a:p>
+            <a:pPr lvl="0"/>
+            <a:r>
+              <a:rPr lang="fr-FR" sz="1900" dirty="0" smtClean="0">
                 <a:cs typeface="Tahoma" pitchFamily="2"/>
               </a:rPr>
-              <a:t> »  très grossière et Google la repère très rapidement. Ensuite, vous êtes pénalisé. LightHouse ne prend pas ce paramètre en compte, les notes ne changent donc pas mais il est primordial de les supprimer.</a:t>
-            </a:r>
-          </a:p>
-          <a:p>
+              <a:t>Cela n’affecte pas le score de </a:t>
+            </a:r>
+            <a:r>
+              <a:rPr lang="fr-FR" sz="1900" dirty="0" err="1" smtClean="0">
+                <a:cs typeface="Tahoma" pitchFamily="2"/>
+              </a:rPr>
+              <a:t>seo</a:t>
+            </a:r>
+            <a:r>
+              <a:rPr lang="fr-FR" sz="1900" dirty="0" smtClean="0">
+                <a:cs typeface="Tahoma" pitchFamily="2"/>
+              </a:rPr>
+              <a:t> de LightHouse </a:t>
+            </a:r>
+          </a:p>
+          <a:p>
+            <a:pPr lvl="0"/>
+            <a:r>
+              <a:rPr lang="fr-FR" sz="1900" dirty="0" smtClean="0">
+                <a:cs typeface="Tahoma" pitchFamily="2"/>
+              </a:rPr>
+              <a:t>Mais cela affecte le SEO de </a:t>
+            </a:r>
+            <a:r>
+              <a:rPr lang="fr-FR" sz="1900" dirty="0" err="1" smtClean="0">
+                <a:cs typeface="Tahoma" pitchFamily="2"/>
+              </a:rPr>
+              <a:t>google</a:t>
+            </a:r>
+            <a:r>
+              <a:rPr lang="fr-FR" sz="1900" dirty="0" smtClean="0">
+                <a:cs typeface="Tahoma" pitchFamily="2"/>
+              </a:rPr>
+              <a:t>.</a:t>
+            </a:r>
+          </a:p>
+          <a:p>
+            <a:pPr lvl="0"/>
+            <a:endParaRPr lang="fr-FR" sz="1900" dirty="0" smtClean="0">
+              <a:cs typeface="Tahoma" pitchFamily="2"/>
+            </a:endParaRPr>
+          </a:p>
+          <a:p>
+            <a:pPr lvl="0"/>
             <a:endParaRPr lang="fr-FR" dirty="0"/>
           </a:p>
         </p:txBody>
@@ -10395,29 +10163,17 @@
         <p:spPr/>
         <p:txBody>
           <a:bodyPr>
-            <a:normAutofit fontScale="90000"/>
+            <a:normAutofit/>
           </a:bodyPr>
           <a:lstStyle/>
           <a:p>
             <a:r>
-              <a:rPr lang="fr-FR" dirty="0" smtClean="0">
+              <a:rPr lang="fr-FR" sz="3200" dirty="0" smtClean="0">
                 <a:cs typeface="Tahoma" pitchFamily="2"/>
               </a:rPr>
-              <a:t>Suppression des </a:t>
-            </a:r>
-            <a:r>
-              <a:rPr lang="fr-FR" dirty="0" err="1" smtClean="0">
-                <a:cs typeface="Tahoma" pitchFamily="2"/>
-              </a:rPr>
-              <a:t>divs</a:t>
-            </a:r>
-            <a:r>
-              <a:rPr lang="fr-FR" dirty="0" smtClean="0">
-                <a:cs typeface="Tahoma" pitchFamily="2"/>
-              </a:rPr>
-              <a:t> « keywords »</a:t>
-            </a:r>
-            <a:endParaRPr lang="fr-FR" dirty="0"/>
+              <a:t>Modifier les occurrences « page2 » par « contact »</a:t>
+            </a:r>
+            <a:endParaRPr lang="fr-FR" sz="3200" dirty="0"/>
           </a:p>
         </p:txBody>
       </p:sp>
@@ -10456,98 +10212,161 @@
             <p:ph idx="1"/>
           </p:nvPr>
         </p:nvSpPr>
-        <p:spPr>
-          <a:xfrm>
-            <a:off x="457200" y="1481328"/>
-            <a:ext cx="8229600" cy="1590481"/>
-          </a:xfrm>
-        </p:spPr>
+        <p:spPr/>
+        <p:txBody>
+          <a:bodyPr/>
+          <a:lstStyle/>
+          <a:p>
+            <a:pPr lvl="0"/>
+            <a:r>
+              <a:rPr lang="fr-FR" sz="1600" dirty="0" smtClean="0">
+                <a:cs typeface="Tahoma" pitchFamily="2"/>
+              </a:rPr>
+              <a:t>Il vaut mieux privilégier la qualité à la quantité, c’est partenaires et </a:t>
+            </a:r>
+            <a:r>
+              <a:rPr lang="fr-FR" sz="1600" dirty="0" err="1" smtClean="0">
+                <a:cs typeface="Tahoma" pitchFamily="2"/>
+              </a:rPr>
+              <a:t>backlinks</a:t>
+            </a:r>
+            <a:r>
+              <a:rPr lang="fr-FR" sz="1600" dirty="0" smtClean="0">
+                <a:cs typeface="Tahoma" pitchFamily="2"/>
+              </a:rPr>
+              <a:t> ne sont pas pertinents pour votre entreprise car</a:t>
+            </a:r>
+          </a:p>
+          <a:p>
+            <a:pPr lvl="0"/>
+            <a:r>
+              <a:rPr lang="fr-FR" sz="1600" dirty="0" smtClean="0">
+                <a:cs typeface="Tahoma" pitchFamily="2"/>
+              </a:rPr>
+              <a:t>ils sont de mauvaise qualité ou hors sujet. Ils ont même un impact négatif car cela s’apparente à du spam.</a:t>
+            </a:r>
+          </a:p>
+          <a:p>
+            <a:endParaRPr lang="fr-FR" dirty="0"/>
+          </a:p>
+        </p:txBody>
+      </p:sp>
+      <p:sp>
+        <p:nvSpPr>
+          <p:cNvPr id="3" name="Titre 2"/>
+          <p:cNvSpPr>
+            <a:spLocks noGrp="1"/>
+          </p:cNvSpPr>
+          <p:nvPr>
+            <p:ph type="title"/>
+          </p:nvPr>
+        </p:nvSpPr>
+        <p:spPr/>
         <p:txBody>
           <a:bodyPr>
-            <a:normAutofit fontScale="77500" lnSpcReduction="20000"/>
+            <a:normAutofit fontScale="90000"/>
           </a:bodyPr>
           <a:lstStyle/>
           <a:p>
-            <a:pPr lvl="0"/>
-            <a:r>
-              <a:rPr lang="fr-FR" sz="1900" dirty="0" smtClean="0">
+            <a:r>
+              <a:rPr lang="fr-FR" dirty="0" smtClean="0">
                 <a:cs typeface="Tahoma" pitchFamily="2"/>
               </a:rPr>
-              <a:t>Le terme « Page2 » est présent en tant que nom de fichier, balise title de la page, et en format texte dans le menu en tant que lien hypertexte.</a:t>
-            </a:r>
-          </a:p>
-          <a:p>
-            <a:pPr lvl="0"/>
-            <a:endParaRPr lang="fr-FR" sz="1900" dirty="0" smtClean="0">
-              <a:cs typeface="Tahoma" pitchFamily="2"/>
-            </a:endParaRPr>
-          </a:p>
-          <a:p>
-            <a:pPr lvl="0"/>
-            <a:r>
-              <a:rPr lang="fr-FR" sz="1900" dirty="0" smtClean="0">
-                <a:cs typeface="Tahoma" pitchFamily="2"/>
-              </a:rPr>
-              <a:t> Le terme « Page2 » sera remplacées par « Contact » pour que ce soit plus clair à la fois pour les moteurs de recherche, et les utilisateurs</a:t>
-            </a:r>
-          </a:p>
-          <a:p>
-            <a:pPr lvl="0"/>
-            <a:endParaRPr lang="fr-FR" sz="1900" dirty="0" smtClean="0">
-              <a:cs typeface="Tahoma" pitchFamily="2"/>
-            </a:endParaRPr>
-          </a:p>
-          <a:p>
-            <a:pPr lvl="0"/>
-            <a:r>
-              <a:rPr lang="fr-FR" sz="1900" dirty="0" smtClean="0">
-                <a:cs typeface="Tahoma" pitchFamily="2"/>
-              </a:rPr>
-              <a:t>Cela n’affecte pas le score de </a:t>
-            </a:r>
-            <a:r>
-              <a:rPr lang="fr-FR" sz="1900" dirty="0" err="1" smtClean="0">
-                <a:cs typeface="Tahoma" pitchFamily="2"/>
-              </a:rPr>
-              <a:t>seo</a:t>
-            </a:r>
-            <a:r>
-              <a:rPr lang="fr-FR" sz="1900" dirty="0" smtClean="0">
-                <a:cs typeface="Tahoma" pitchFamily="2"/>
-              </a:rPr>
-              <a:t> de LightHouse </a:t>
-            </a:r>
-          </a:p>
-          <a:p>
-            <a:pPr lvl="0"/>
+              <a:t>Suppression de l’annuaire et des partenaires</a:t>
+            </a:r>
             <a:endParaRPr lang="fr-FR" dirty="0"/>
           </a:p>
         </p:txBody>
       </p:sp>
-      <p:sp>
-        <p:nvSpPr>
-          <p:cNvPr id="3" name="Titre 2"/>
-          <p:cNvSpPr>
-            <a:spLocks noGrp="1"/>
-          </p:cNvSpPr>
-          <p:nvPr>
-            <p:ph type="title"/>
-          </p:nvPr>
-        </p:nvSpPr>
-        <p:spPr/>
-        <p:txBody>
-          <a:bodyPr>
-            <a:normAutofit/>
-          </a:bodyPr>
+      <p:pic>
+        <p:nvPicPr>
+          <p:cNvPr id="2050" name="Picture 2" descr="C:\Users\gress\Desktop\P4_gressier_gwenael\seo page 2 apres modif footer.PNG"/>
+          <p:cNvPicPr>
+            <a:picLocks noChangeAspect="1" noChangeArrowheads="1"/>
+          </p:cNvPicPr>
+          <p:nvPr/>
+        </p:nvPicPr>
+        <p:blipFill>
+          <a:blip r:embed="rId2" cstate="print"/>
+          <a:srcRect/>
+          <a:stretch>
+            <a:fillRect/>
+          </a:stretch>
+        </p:blipFill>
+        <p:spPr bwMode="auto">
+          <a:xfrm>
+            <a:off x="5715008" y="4572008"/>
+            <a:ext cx="1058862" cy="1333500"/>
+          </a:xfrm>
+          <a:prstGeom prst="rect">
+            <a:avLst/>
+          </a:prstGeom>
+          <a:noFill/>
+        </p:spPr>
+      </p:pic>
+      <p:pic>
+        <p:nvPicPr>
+          <p:cNvPr id="2051" name="Picture 3" descr="C:\Users\gress\Desktop\P4_gressier_gwenael\lighthouse sur index apres modif description.PNG"/>
+          <p:cNvPicPr>
+            <a:picLocks noChangeAspect="1" noChangeArrowheads="1"/>
+          </p:cNvPicPr>
+          <p:nvPr/>
+        </p:nvPicPr>
+        <p:blipFill>
+          <a:blip r:embed="rId3" cstate="print"/>
+          <a:srcRect/>
+          <a:stretch>
+            <a:fillRect/>
+          </a:stretch>
+        </p:blipFill>
+        <p:spPr bwMode="auto">
+          <a:xfrm>
+            <a:off x="2571736" y="4572008"/>
+            <a:ext cx="1082675" cy="1341437"/>
+          </a:xfrm>
+          <a:prstGeom prst="rect">
+            <a:avLst/>
+          </a:prstGeom>
+          <a:noFill/>
+        </p:spPr>
+      </p:pic>
+      <p:sp>
+        <p:nvSpPr>
+          <p:cNvPr id="6" name="Flèche droite 5"/>
+          <p:cNvSpPr/>
+          <p:nvPr/>
+        </p:nvSpPr>
+        <p:spPr>
+          <a:xfrm>
+            <a:off x="3929058" y="5214950"/>
+            <a:ext cx="1500198" cy="142876"/>
+          </a:xfrm>
+          <a:prstGeom prst="rightArrow">
+            <a:avLst/>
+          </a:prstGeom>
+        </p:spPr>
+        <p:style>
+          <a:lnRef idx="2">
+            <a:schemeClr val="accent1">
+              <a:shade val="50000"/>
+            </a:schemeClr>
+          </a:lnRef>
+          <a:fillRef idx="1">
+            <a:schemeClr val="accent1"/>
+          </a:fillRef>
+          <a:effectRef idx="0">
+            <a:schemeClr val="accent1"/>
+          </a:effectRef>
+          <a:fontRef idx="minor">
+            <a:schemeClr val="lt1"/>
+          </a:fontRef>
+        </p:style>
+        <p:txBody>
+          <a:bodyPr rtlCol="0" anchor="ctr"/>
           <a:lstStyle/>
           <a:p>
-            <a:r>
-              <a:rPr lang="fr-FR" sz="3200" dirty="0" smtClean="0">
-                <a:cs typeface="Tahoma" pitchFamily="2"/>
-              </a:rPr>
-              <a:t>Modifier les occurrences « page2 » par « contact »</a:t>
-            </a:r>
-            <a:endParaRPr lang="fr-FR" sz="3200" dirty="0"/>
+            <a:pPr algn="ctr"/>
+            <a:endParaRPr lang="fr-FR"/>
           </a:p>
         </p:txBody>
       </p:sp>

</xml_diff>

<commit_message>
modification apporter suite a la soutenance
</commit_message>
<xml_diff>
--- a/Rapport audit.pptx
+++ b/Rapport audit.pptx
@@ -5,31 +5,32 @@
     <p:sldMasterId id="2147483660" r:id="rId1"/>
   </p:sldMasterIdLst>
   <p:notesMasterIdLst>
-    <p:notesMasterId r:id="rId24"/>
+    <p:notesMasterId r:id="rId25"/>
   </p:notesMasterIdLst>
   <p:sldIdLst>
     <p:sldId id="256" r:id="rId2"/>
-    <p:sldId id="257" r:id="rId3"/>
-    <p:sldId id="258" r:id="rId4"/>
-    <p:sldId id="261" r:id="rId5"/>
-    <p:sldId id="259" r:id="rId6"/>
-    <p:sldId id="260" r:id="rId7"/>
-    <p:sldId id="264" r:id="rId8"/>
-    <p:sldId id="262" r:id="rId9"/>
-    <p:sldId id="266" r:id="rId10"/>
-    <p:sldId id="268" r:id="rId11"/>
-    <p:sldId id="267" r:id="rId12"/>
-    <p:sldId id="277" r:id="rId13"/>
-    <p:sldId id="271" r:id="rId14"/>
-    <p:sldId id="270" r:id="rId15"/>
-    <p:sldId id="278" r:id="rId16"/>
-    <p:sldId id="279" r:id="rId17"/>
-    <p:sldId id="280" r:id="rId18"/>
-    <p:sldId id="265" r:id="rId19"/>
-    <p:sldId id="269" r:id="rId20"/>
-    <p:sldId id="273" r:id="rId21"/>
-    <p:sldId id="275" r:id="rId22"/>
-    <p:sldId id="276" r:id="rId23"/>
+    <p:sldId id="281" r:id="rId3"/>
+    <p:sldId id="257" r:id="rId4"/>
+    <p:sldId id="258" r:id="rId5"/>
+    <p:sldId id="261" r:id="rId6"/>
+    <p:sldId id="259" r:id="rId7"/>
+    <p:sldId id="260" r:id="rId8"/>
+    <p:sldId id="264" r:id="rId9"/>
+    <p:sldId id="262" r:id="rId10"/>
+    <p:sldId id="266" r:id="rId11"/>
+    <p:sldId id="268" r:id="rId12"/>
+    <p:sldId id="267" r:id="rId13"/>
+    <p:sldId id="277" r:id="rId14"/>
+    <p:sldId id="271" r:id="rId15"/>
+    <p:sldId id="270" r:id="rId16"/>
+    <p:sldId id="278" r:id="rId17"/>
+    <p:sldId id="279" r:id="rId18"/>
+    <p:sldId id="280" r:id="rId19"/>
+    <p:sldId id="265" r:id="rId20"/>
+    <p:sldId id="269" r:id="rId21"/>
+    <p:sldId id="273" r:id="rId22"/>
+    <p:sldId id="275" r:id="rId23"/>
+    <p:sldId id="276" r:id="rId24"/>
   </p:sldIdLst>
   <p:sldSz cx="9144000" cy="6858000" type="screen4x3"/>
   <p:notesSz cx="6858000" cy="9144000"/>
@@ -214,7 +215,7 @@
             <a:fld id="{14D24793-A503-4F90-ABDF-E673D6CE5CC6}" type="datetimeFigureOut">
               <a:rPr lang="fr-FR" smtClean="0"/>
               <a:pPr/>
-              <a:t>27/04/2022</a:t>
+              <a:t>03/05/2022</a:t>
             </a:fld>
             <a:endParaRPr lang="fr-FR"/>
           </a:p>
@@ -548,7 +549,7 @@
             <a:fld id="{2A651DC8-2098-43C4-98FA-F1051C851578}" type="slidenum">
               <a:rPr lang="fr-FR" smtClean="0"/>
               <a:pPr/>
-              <a:t>3</a:t>
+              <a:t>4</a:t>
             </a:fld>
             <a:endParaRPr lang="fr-FR"/>
           </a:p>
@@ -1188,7 +1189,7 @@
             <a:fld id="{46424B8A-6F70-4E04-A385-B9478C8C335B}" type="datetimeFigureOut">
               <a:rPr lang="fr-FR" smtClean="0"/>
               <a:pPr/>
-              <a:t>27/04/2022</a:t>
+              <a:t>03/05/2022</a:t>
             </a:fld>
             <a:endParaRPr lang="fr-FR"/>
           </a:p>
@@ -1386,7 +1387,7 @@
             <a:fld id="{46424B8A-6F70-4E04-A385-B9478C8C335B}" type="datetimeFigureOut">
               <a:rPr lang="fr-FR" smtClean="0"/>
               <a:pPr/>
-              <a:t>27/04/2022</a:t>
+              <a:t>03/05/2022</a:t>
             </a:fld>
             <a:endParaRPr lang="fr-FR"/>
           </a:p>
@@ -1573,7 +1574,7 @@
             <a:fld id="{46424B8A-6F70-4E04-A385-B9478C8C335B}" type="datetimeFigureOut">
               <a:rPr lang="fr-FR" smtClean="0"/>
               <a:pPr/>
-              <a:t>27/04/2022</a:t>
+              <a:t>03/05/2022</a:t>
             </a:fld>
             <a:endParaRPr lang="fr-FR"/>
           </a:p>
@@ -1725,7 +1726,7 @@
             <a:fld id="{46424B8A-6F70-4E04-A385-B9478C8C335B}" type="datetimeFigureOut">
               <a:rPr lang="fr-FR" smtClean="0"/>
               <a:pPr/>
-              <a:t>27/04/2022</a:t>
+              <a:t>03/05/2022</a:t>
             </a:fld>
             <a:endParaRPr lang="fr-FR"/>
           </a:p>
@@ -1982,7 +1983,7 @@
             <a:fld id="{46424B8A-6F70-4E04-A385-B9478C8C335B}" type="datetimeFigureOut">
               <a:rPr lang="fr-FR" smtClean="0"/>
               <a:pPr/>
-              <a:t>27/04/2022</a:t>
+              <a:t>03/05/2022</a:t>
             </a:fld>
             <a:endParaRPr lang="fr-FR"/>
           </a:p>
@@ -2393,7 +2394,7 @@
             <a:fld id="{46424B8A-6F70-4E04-A385-B9478C8C335B}" type="datetimeFigureOut">
               <a:rPr lang="fr-FR" smtClean="0"/>
               <a:pPr/>
-              <a:t>27/04/2022</a:t>
+              <a:t>03/05/2022</a:t>
             </a:fld>
             <a:endParaRPr lang="fr-FR"/>
           </a:p>
@@ -2841,7 +2842,7 @@
             <a:fld id="{46424B8A-6F70-4E04-A385-B9478C8C335B}" type="datetimeFigureOut">
               <a:rPr lang="fr-FR" smtClean="0"/>
               <a:pPr/>
-              <a:t>27/04/2022</a:t>
+              <a:t>03/05/2022</a:t>
             </a:fld>
             <a:endParaRPr lang="fr-FR"/>
           </a:p>
@@ -2944,7 +2945,7 @@
             <a:fld id="{46424B8A-6F70-4E04-A385-B9478C8C335B}" type="datetimeFigureOut">
               <a:rPr lang="fr-FR" smtClean="0"/>
               <a:pPr/>
-              <a:t>27/04/2022</a:t>
+              <a:t>03/05/2022</a:t>
             </a:fld>
             <a:endParaRPr lang="fr-FR"/>
           </a:p>
@@ -3067,7 +3068,7 @@
             <a:fld id="{46424B8A-6F70-4E04-A385-B9478C8C335B}" type="datetimeFigureOut">
               <a:rPr lang="fr-FR" smtClean="0"/>
               <a:pPr/>
-              <a:t>27/04/2022</a:t>
+              <a:t>03/05/2022</a:t>
             </a:fld>
             <a:endParaRPr lang="fr-FR"/>
           </a:p>
@@ -3343,7 +3344,7 @@
             <a:fld id="{46424B8A-6F70-4E04-A385-B9478C8C335B}" type="datetimeFigureOut">
               <a:rPr lang="fr-FR" smtClean="0"/>
               <a:pPr/>
-              <a:t>27/04/2022</a:t>
+              <a:t>03/05/2022</a:t>
             </a:fld>
             <a:endParaRPr lang="fr-FR"/>
           </a:p>
@@ -3550,7 +3551,7 @@
             <a:fld id="{46424B8A-6F70-4E04-A385-B9478C8C335B}" type="datetimeFigureOut">
               <a:rPr lang="fr-FR" smtClean="0"/>
               <a:pPr/>
-              <a:t>27/04/2022</a:t>
+              <a:t>03/05/2022</a:t>
             </a:fld>
             <a:endParaRPr lang="fr-FR"/>
           </a:p>
@@ -4661,7 +4662,7 @@
             <a:fld id="{46424B8A-6F70-4E04-A385-B9478C8C335B}" type="datetimeFigureOut">
               <a:rPr lang="fr-FR" smtClean="0"/>
               <a:pPr/>
-              <a:t>27/04/2022</a:t>
+              <a:t>03/05/2022</a:t>
             </a:fld>
             <a:endParaRPr lang="fr-FR"/>
           </a:p>
@@ -5129,7 +5130,15 @@
           <a:p>
             <a:r>
               <a:rPr lang="fr-FR" dirty="0" smtClean="0"/>
-              <a:t>Gwenaël GRESSIER - 01/03/2022</a:t>
+              <a:t>Gwenaël GRESSIER </a:t>
+            </a:r>
+            <a:r>
+              <a:rPr lang="fr-FR" smtClean="0"/>
+              <a:t>- </a:t>
+            </a:r>
+            <a:r>
+              <a:rPr lang="fr-FR" smtClean="0"/>
+              <a:t>03/05/2022</a:t>
             </a:r>
             <a:endParaRPr lang="fr-FR" dirty="0"/>
           </a:p>
@@ -5170,6 +5179,199 @@
 </file>
 
 <file path=ppt/slides/slide10.xml><?xml version="1.0" encoding="utf-8"?>
+<p:sld xmlns:a="http://schemas.openxmlformats.org/drawingml/2006/main" xmlns:r="http://schemas.openxmlformats.org/officeDocument/2006/relationships" xmlns:p="http://schemas.openxmlformats.org/presentationml/2006/main">
+  <p:cSld>
+    <p:spTree>
+      <p:nvGrpSpPr>
+        <p:cNvPr id="1" name=""/>
+        <p:cNvGrpSpPr/>
+        <p:nvPr/>
+      </p:nvGrpSpPr>
+      <p:grpSpPr>
+        <a:xfrm>
+          <a:off x="0" y="0"/>
+          <a:ext cx="0" cy="0"/>
+          <a:chOff x="0" y="0"/>
+          <a:chExt cx="0" cy="0"/>
+        </a:xfrm>
+      </p:grpSpPr>
+      <p:sp>
+        <p:nvSpPr>
+          <p:cNvPr id="2" name="Espace réservé du contenu 1"/>
+          <p:cNvSpPr>
+            <a:spLocks noGrp="1"/>
+          </p:cNvSpPr>
+          <p:nvPr>
+            <p:ph idx="1"/>
+          </p:nvPr>
+        </p:nvSpPr>
+        <p:spPr/>
+        <p:txBody>
+          <a:bodyPr/>
+          <a:lstStyle/>
+          <a:p>
+            <a:pPr lvl="0"/>
+            <a:r>
+              <a:rPr lang="fr-FR" sz="1600" dirty="0" smtClean="0">
+                <a:cs typeface="Tahoma" pitchFamily="2"/>
+              </a:rPr>
+              <a:t>Il vaut mieux privilégier la qualité à la quantité, c’est partenaires et </a:t>
+            </a:r>
+            <a:r>
+              <a:rPr lang="fr-FR" sz="1600" dirty="0" err="1" smtClean="0">
+                <a:cs typeface="Tahoma" pitchFamily="2"/>
+              </a:rPr>
+              <a:t>backlinks</a:t>
+            </a:r>
+            <a:r>
+              <a:rPr lang="fr-FR" sz="1600" dirty="0" smtClean="0">
+                <a:cs typeface="Tahoma" pitchFamily="2"/>
+              </a:rPr>
+              <a:t> ne sont pas pertinents pour votre entreprise car</a:t>
+            </a:r>
+          </a:p>
+          <a:p>
+            <a:pPr lvl="0"/>
+            <a:r>
+              <a:rPr lang="fr-FR" sz="1600" dirty="0" smtClean="0">
+                <a:cs typeface="Tahoma" pitchFamily="2"/>
+              </a:rPr>
+              <a:t>ils sont de mauvaise qualité ou hors sujet. Ils ont même un impact négatif car cela s’apparente à du spam.</a:t>
+            </a:r>
+          </a:p>
+          <a:p>
+            <a:endParaRPr lang="fr-FR" dirty="0"/>
+          </a:p>
+        </p:txBody>
+      </p:sp>
+      <p:sp>
+        <p:nvSpPr>
+          <p:cNvPr id="3" name="Titre 2"/>
+          <p:cNvSpPr>
+            <a:spLocks noGrp="1"/>
+          </p:cNvSpPr>
+          <p:nvPr>
+            <p:ph type="title"/>
+          </p:nvPr>
+        </p:nvSpPr>
+        <p:spPr/>
+        <p:txBody>
+          <a:bodyPr>
+            <a:normAutofit fontScale="90000"/>
+          </a:bodyPr>
+          <a:lstStyle/>
+          <a:p>
+            <a:r>
+              <a:rPr lang="fr-FR" dirty="0" smtClean="0">
+                <a:cs typeface="Tahoma" pitchFamily="2"/>
+              </a:rPr>
+              <a:t>Suppression de l’annuaire et des partenaires</a:t>
+            </a:r>
+            <a:endParaRPr lang="fr-FR" dirty="0"/>
+          </a:p>
+        </p:txBody>
+      </p:sp>
+      <p:pic>
+        <p:nvPicPr>
+          <p:cNvPr id="2050" name="Picture 2" descr="C:\Users\gress\Desktop\P4_gressier_gwenael\seo page 2 apres modif footer.PNG"/>
+          <p:cNvPicPr>
+            <a:picLocks noChangeAspect="1" noChangeArrowheads="1"/>
+          </p:cNvPicPr>
+          <p:nvPr/>
+        </p:nvPicPr>
+        <p:blipFill>
+          <a:blip r:embed="rId2" cstate="print"/>
+          <a:srcRect/>
+          <a:stretch>
+            <a:fillRect/>
+          </a:stretch>
+        </p:blipFill>
+        <p:spPr bwMode="auto">
+          <a:xfrm>
+            <a:off x="5715008" y="4572008"/>
+            <a:ext cx="1058862" cy="1333500"/>
+          </a:xfrm>
+          <a:prstGeom prst="rect">
+            <a:avLst/>
+          </a:prstGeom>
+          <a:noFill/>
+        </p:spPr>
+      </p:pic>
+      <p:pic>
+        <p:nvPicPr>
+          <p:cNvPr id="2051" name="Picture 3" descr="C:\Users\gress\Desktop\P4_gressier_gwenael\lighthouse sur index apres modif description.PNG"/>
+          <p:cNvPicPr>
+            <a:picLocks noChangeAspect="1" noChangeArrowheads="1"/>
+          </p:cNvPicPr>
+          <p:nvPr/>
+        </p:nvPicPr>
+        <p:blipFill>
+          <a:blip r:embed="rId3" cstate="print"/>
+          <a:srcRect/>
+          <a:stretch>
+            <a:fillRect/>
+          </a:stretch>
+        </p:blipFill>
+        <p:spPr bwMode="auto">
+          <a:xfrm>
+            <a:off x="2571736" y="4572008"/>
+            <a:ext cx="1082675" cy="1341437"/>
+          </a:xfrm>
+          <a:prstGeom prst="rect">
+            <a:avLst/>
+          </a:prstGeom>
+          <a:noFill/>
+        </p:spPr>
+      </p:pic>
+      <p:sp>
+        <p:nvSpPr>
+          <p:cNvPr id="6" name="Flèche droite 5"/>
+          <p:cNvSpPr/>
+          <p:nvPr/>
+        </p:nvSpPr>
+        <p:spPr>
+          <a:xfrm>
+            <a:off x="3929058" y="5214950"/>
+            <a:ext cx="1500198" cy="142876"/>
+          </a:xfrm>
+          <a:prstGeom prst="rightArrow">
+            <a:avLst/>
+          </a:prstGeom>
+        </p:spPr>
+        <p:style>
+          <a:lnRef idx="2">
+            <a:schemeClr val="accent1">
+              <a:shade val="50000"/>
+            </a:schemeClr>
+          </a:lnRef>
+          <a:fillRef idx="1">
+            <a:schemeClr val="accent1"/>
+          </a:fillRef>
+          <a:effectRef idx="0">
+            <a:schemeClr val="accent1"/>
+          </a:effectRef>
+          <a:fontRef idx="minor">
+            <a:schemeClr val="lt1"/>
+          </a:fontRef>
+        </p:style>
+        <p:txBody>
+          <a:bodyPr rtlCol="0" anchor="ctr"/>
+          <a:lstStyle/>
+          <a:p>
+            <a:pPr algn="ctr"/>
+            <a:endParaRPr lang="fr-FR"/>
+          </a:p>
+        </p:txBody>
+      </p:sp>
+    </p:spTree>
+  </p:cSld>
+  <p:clrMapOvr>
+    <a:masterClrMapping/>
+  </p:clrMapOvr>
+</p:sld>
+</file>
+
+<file path=ppt/slides/slide11.xml><?xml version="1.0" encoding="utf-8"?>
 <p:sld xmlns:a="http://schemas.openxmlformats.org/drawingml/2006/main" xmlns:r="http://schemas.openxmlformats.org/officeDocument/2006/relationships" xmlns:p="http://schemas.openxmlformats.org/presentationml/2006/main">
   <p:cSld>
     <p:spTree>
@@ -5579,7 +5781,7 @@
 </p:sld>
 </file>
 
-<file path=ppt/slides/slide11.xml><?xml version="1.0" encoding="utf-8"?>
+<file path=ppt/slides/slide12.xml><?xml version="1.0" encoding="utf-8"?>
 <p:sld xmlns:a="http://schemas.openxmlformats.org/drawingml/2006/main" xmlns:r="http://schemas.openxmlformats.org/officeDocument/2006/relationships" xmlns:p="http://schemas.openxmlformats.org/presentationml/2006/main">
   <p:cSld>
     <p:spTree>
@@ -5780,7 +5982,7 @@
 </p:sld>
 </file>
 
-<file path=ppt/slides/slide12.xml><?xml version="1.0" encoding="utf-8"?>
+<file path=ppt/slides/slide13.xml><?xml version="1.0" encoding="utf-8"?>
 <p:sld xmlns:a="http://schemas.openxmlformats.org/drawingml/2006/main" xmlns:r="http://schemas.openxmlformats.org/officeDocument/2006/relationships" xmlns:p="http://schemas.openxmlformats.org/presentationml/2006/main">
   <p:cSld>
     <p:spTree>
@@ -5821,7 +6023,19 @@
           <a:p>
             <a:r>
               <a:rPr lang="fr-FR" sz="1600" dirty="0" smtClean="0"/>
-              <a:t>L’ajout de attribut title dans les balises a </a:t>
+              <a:t>L’ajout de attribut title dans les balises </a:t>
+            </a:r>
+            <a:r>
+              <a:rPr lang="fr-FR" sz="1600" dirty="0" smtClean="0"/>
+              <a:t>a est important pour les </a:t>
+            </a:r>
+            <a:r>
+              <a:rPr lang="fr-FR" sz="1600" dirty="0" err="1" smtClean="0"/>
+              <a:t>syntetiseurs</a:t>
+            </a:r>
+            <a:r>
+              <a:rPr lang="fr-FR" sz="1600" dirty="0" smtClean="0"/>
+              <a:t> vocaux </a:t>
             </a:r>
             <a:endParaRPr lang="fr-FR" sz="1600" dirty="0"/>
           </a:p>
@@ -6202,7 +6416,7 @@
 </p:sld>
 </file>
 
-<file path=ppt/slides/slide13.xml><?xml version="1.0" encoding="utf-8"?>
+<file path=ppt/slides/slide14.xml><?xml version="1.0" encoding="utf-8"?>
 <p:sld xmlns:a="http://schemas.openxmlformats.org/drawingml/2006/main" xmlns:r="http://schemas.openxmlformats.org/officeDocument/2006/relationships" xmlns:p="http://schemas.openxmlformats.org/presentationml/2006/main">
   <p:cSld>
     <p:spTree>
@@ -6388,7 +6602,7 @@
 </p:sld>
 </file>
 
-<file path=ppt/slides/slide14.xml><?xml version="1.0" encoding="utf-8"?>
+<file path=ppt/slides/slide15.xml><?xml version="1.0" encoding="utf-8"?>
 <p:sld xmlns:a="http://schemas.openxmlformats.org/drawingml/2006/main" xmlns:r="http://schemas.openxmlformats.org/officeDocument/2006/relationships" xmlns:p="http://schemas.openxmlformats.org/presentationml/2006/main">
   <p:cSld>
     <p:spTree>
@@ -6645,7 +6859,7 @@
 </p:sld>
 </file>
 
-<file path=ppt/slides/slide15.xml><?xml version="1.0" encoding="utf-8"?>
+<file path=ppt/slides/slide16.xml><?xml version="1.0" encoding="utf-8"?>
 <p:sld xmlns:a="http://schemas.openxmlformats.org/drawingml/2006/main" xmlns:r="http://schemas.openxmlformats.org/officeDocument/2006/relationships" xmlns:p="http://schemas.openxmlformats.org/presentationml/2006/main">
   <p:cSld>
     <p:spTree>
@@ -6844,7 +7058,7 @@
 </p:sld>
 </file>
 
-<file path=ppt/slides/slide16.xml><?xml version="1.0" encoding="utf-8"?>
+<file path=ppt/slides/slide17.xml><?xml version="1.0" encoding="utf-8"?>
 <p:sld xmlns:a="http://schemas.openxmlformats.org/drawingml/2006/main" xmlns:r="http://schemas.openxmlformats.org/officeDocument/2006/relationships" xmlns:p="http://schemas.openxmlformats.org/presentationml/2006/main">
   <p:cSld>
     <p:spTree>
@@ -7045,7 +7259,7 @@
 </p:sld>
 </file>
 
-<file path=ppt/slides/slide17.xml><?xml version="1.0" encoding="utf-8"?>
+<file path=ppt/slides/slide18.xml><?xml version="1.0" encoding="utf-8"?>
 <p:sld xmlns:a="http://schemas.openxmlformats.org/drawingml/2006/main" xmlns:r="http://schemas.openxmlformats.org/officeDocument/2006/relationships" xmlns:p="http://schemas.openxmlformats.org/presentationml/2006/main">
   <p:cSld>
     <p:spTree>
@@ -7226,117 +7440,6 @@
 </p:sld>
 </file>
 
-<file path=ppt/slides/slide18.xml><?xml version="1.0" encoding="utf-8"?>
-<p:sld xmlns:a="http://schemas.openxmlformats.org/drawingml/2006/main" xmlns:r="http://schemas.openxmlformats.org/officeDocument/2006/relationships" xmlns:p="http://schemas.openxmlformats.org/presentationml/2006/main">
-  <p:cSld>
-    <p:spTree>
-      <p:nvGrpSpPr>
-        <p:cNvPr id="1" name=""/>
-        <p:cNvGrpSpPr/>
-        <p:nvPr/>
-      </p:nvGrpSpPr>
-      <p:grpSpPr>
-        <a:xfrm>
-          <a:off x="0" y="0"/>
-          <a:ext cx="0" cy="0"/>
-          <a:chOff x="0" y="0"/>
-          <a:chExt cx="0" cy="0"/>
-        </a:xfrm>
-      </p:grpSpPr>
-      <p:sp>
-        <p:nvSpPr>
-          <p:cNvPr id="2" name="Espace réservé du contenu 1"/>
-          <p:cNvSpPr>
-            <a:spLocks noGrp="1"/>
-          </p:cNvSpPr>
-          <p:nvPr>
-            <p:ph idx="1"/>
-          </p:nvPr>
-        </p:nvSpPr>
-        <p:spPr>
-          <a:xfrm>
-            <a:off x="457200" y="1481329"/>
-            <a:ext cx="8229600" cy="661788"/>
-          </a:xfrm>
-        </p:spPr>
-        <p:txBody>
-          <a:bodyPr>
-            <a:normAutofit/>
-          </a:bodyPr>
-          <a:lstStyle/>
-          <a:p>
-            <a:pPr lvl="0"/>
-            <a:r>
-              <a:rPr lang="fr-FR" sz="1600" dirty="0" smtClean="0">
-                <a:cs typeface="Tahoma" pitchFamily="2"/>
-              </a:rPr>
-              <a:t>toute les images les images on </a:t>
-            </a:r>
-            <a:r>
-              <a:rPr lang="fr-FR" sz="1600" dirty="0" err="1" smtClean="0">
-                <a:cs typeface="Tahoma" pitchFamily="2"/>
-              </a:rPr>
-              <a:t>etais</a:t>
-            </a:r>
-            <a:r>
-              <a:rPr lang="fr-FR" sz="1600" dirty="0" smtClean="0">
-                <a:cs typeface="Tahoma" pitchFamily="2"/>
-              </a:rPr>
-              <a:t> converti en .</a:t>
-            </a:r>
-            <a:r>
-              <a:rPr lang="fr-FR" sz="1600" dirty="0" err="1" smtClean="0">
-                <a:cs typeface="Tahoma" pitchFamily="2"/>
-              </a:rPr>
-              <a:t>webp</a:t>
-            </a:r>
-            <a:r>
-              <a:rPr lang="fr-FR" sz="1600" dirty="0" smtClean="0">
-                <a:cs typeface="Tahoma" pitchFamily="2"/>
-              </a:rPr>
-              <a:t> pour les rendre plus légères.</a:t>
-            </a:r>
-            <a:endParaRPr lang="fr-FR" sz="1600" dirty="0">
-              <a:cs typeface="Tahoma" pitchFamily="2"/>
-            </a:endParaRPr>
-          </a:p>
-        </p:txBody>
-      </p:sp>
-      <p:sp>
-        <p:nvSpPr>
-          <p:cNvPr id="3" name="Titre 2"/>
-          <p:cNvSpPr>
-            <a:spLocks noGrp="1"/>
-          </p:cNvSpPr>
-          <p:nvPr>
-            <p:ph type="title"/>
-          </p:nvPr>
-        </p:nvSpPr>
-        <p:spPr/>
-        <p:txBody>
-          <a:bodyPr>
-            <a:normAutofit fontScale="90000"/>
-          </a:bodyPr>
-          <a:lstStyle/>
-          <a:p>
-            <a:r>
-              <a:rPr lang="fr-FR" dirty="0" smtClean="0">
-                <a:cs typeface="Tahoma" pitchFamily="2"/>
-              </a:rPr>
-              <a:t>Modification du format des images</a:t>
-            </a:r>
-            <a:endParaRPr lang="fr-FR" dirty="0"/>
-          </a:p>
-        </p:txBody>
-      </p:sp>
-    </p:spTree>
-  </p:cSld>
-  <p:clrMapOvr>
-    <a:masterClrMapping/>
-  </p:clrMapOvr>
-</p:sld>
-</file>
-
 <file path=ppt/slides/slide19.xml><?xml version="1.0" encoding="utf-8"?>
 <p:sld xmlns:a="http://schemas.openxmlformats.org/drawingml/2006/main" xmlns:r="http://schemas.openxmlformats.org/officeDocument/2006/relationships" xmlns:p="http://schemas.openxmlformats.org/presentationml/2006/main">
   <p:cSld>
@@ -7366,8 +7469,8 @@
         </p:nvSpPr>
         <p:spPr>
           <a:xfrm>
-            <a:off x="457200" y="1481328"/>
-            <a:ext cx="8229600" cy="3090679"/>
+            <a:off x="357158" y="1428736"/>
+            <a:ext cx="8229600" cy="661788"/>
           </a:xfrm>
         </p:spPr>
         <p:txBody>
@@ -7378,37 +7481,75 @@
           <a:p>
             <a:pPr lvl="0"/>
             <a:r>
+              <a:rPr lang="fr-FR" sz="1600" dirty="0" smtClean="0">
+                <a:cs typeface="Tahoma" pitchFamily="2"/>
+              </a:rPr>
+              <a:t>toute les images les images on </a:t>
+            </a:r>
+            <a:r>
+              <a:rPr lang="fr-FR" sz="1600" dirty="0" smtClean="0">
+                <a:cs typeface="Tahoma" pitchFamily="2"/>
+              </a:rPr>
+              <a:t>étais </a:t>
+            </a:r>
+            <a:r>
+              <a:rPr lang="fr-FR" sz="1600" dirty="0" smtClean="0">
+                <a:cs typeface="Tahoma" pitchFamily="2"/>
+              </a:rPr>
+              <a:t>converti en .</a:t>
+            </a:r>
+            <a:r>
+              <a:rPr lang="fr-FR" sz="1600" dirty="0" err="1" smtClean="0">
+                <a:cs typeface="Tahoma" pitchFamily="2"/>
+              </a:rPr>
+              <a:t>webp</a:t>
+            </a:r>
+            <a:r>
+              <a:rPr lang="fr-FR" sz="1600" dirty="0" smtClean="0">
+                <a:cs typeface="Tahoma" pitchFamily="2"/>
+              </a:rPr>
+              <a:t> pour les rendre plus légères</a:t>
+            </a:r>
+            <a:r>
+              <a:rPr lang="fr-FR" sz="1600" dirty="0" smtClean="0">
+                <a:cs typeface="Tahoma" pitchFamily="2"/>
+              </a:rPr>
+              <a:t>. </a:t>
+            </a:r>
+            <a:r>
+              <a:rPr lang="fr-FR" sz="1600" dirty="0" smtClean="0">
+                <a:cs typeface="Tahoma" pitchFamily="2"/>
+              </a:rPr>
+              <a:t>De se fait augmente les performance du site</a:t>
+            </a:r>
+            <a:endParaRPr lang="fr-FR" sz="1600" dirty="0">
+              <a:cs typeface="Tahoma" pitchFamily="2"/>
+            </a:endParaRPr>
+          </a:p>
+        </p:txBody>
+      </p:sp>
+      <p:sp>
+        <p:nvSpPr>
+          <p:cNvPr id="3" name="Titre 2"/>
+          <p:cNvSpPr>
+            <a:spLocks noGrp="1"/>
+          </p:cNvSpPr>
+          <p:nvPr>
+            <p:ph type="title"/>
+          </p:nvPr>
+        </p:nvSpPr>
+        <p:spPr/>
+        <p:txBody>
+          <a:bodyPr>
+            <a:normAutofit fontScale="90000"/>
+          </a:bodyPr>
+          <a:lstStyle/>
+          <a:p>
+            <a:r>
               <a:rPr lang="fr-FR" dirty="0" smtClean="0">
                 <a:cs typeface="Tahoma" pitchFamily="2"/>
               </a:rPr>
-              <a:t>Les balises Alt ont maintenant une description pertinente qui contient la descriptif de l’image ou des mots clé comme le nom de l’agence, son activité ou sa localisation. LightHouse améliore le score de Best Practices, mais cela à aussi un rôle sur le SEO.</a:t>
-            </a:r>
-          </a:p>
-          <a:p>
-            <a:endParaRPr lang="fr-FR" dirty="0"/>
-          </a:p>
-        </p:txBody>
-      </p:sp>
-      <p:sp>
-        <p:nvSpPr>
-          <p:cNvPr id="3" name="Titre 2"/>
-          <p:cNvSpPr>
-            <a:spLocks noGrp="1"/>
-          </p:cNvSpPr>
-          <p:nvPr>
-            <p:ph type="title"/>
-          </p:nvPr>
-        </p:nvSpPr>
-        <p:spPr/>
-        <p:txBody>
-          <a:bodyPr/>
-          <a:lstStyle/>
-          <a:p>
-            <a:r>
-              <a:rPr lang="fr-FR" dirty="0" smtClean="0">
-                <a:cs typeface="Tahoma" pitchFamily="2"/>
-              </a:rPr>
-              <a:t>Modification des balises Alt</a:t>
+              <a:t>Modification du format des images</a:t>
             </a:r>
             <a:endParaRPr lang="fr-FR" dirty="0"/>
           </a:p>
@@ -7451,166 +7592,107 @@
         </p:nvSpPr>
         <p:spPr/>
         <p:txBody>
-          <a:bodyPr/>
-          <a:lstStyle/>
-          <a:p>
-            <a:pPr lvl="0"/>
-            <a:endParaRPr lang="fr-FR" sz="1600" dirty="0" smtClean="0">
-              <a:solidFill>
-                <a:srgbClr val="000000"/>
-              </a:solidFill>
-              <a:latin typeface="Arial"/>
-              <a:ea typeface="Microsoft YaHei" pitchFamily="2"/>
-              <a:cs typeface="Arial"/>
-            </a:endParaRPr>
-          </a:p>
-          <a:p>
-            <a:pPr lvl="0"/>
-            <a:r>
-              <a:rPr lang="fr-FR" sz="1600" dirty="0" smtClean="0">
-                <a:solidFill>
-                  <a:srgbClr val="000000"/>
-                </a:solidFill>
-                <a:latin typeface="Arial"/>
-                <a:ea typeface="Microsoft YaHei" pitchFamily="2"/>
-                <a:cs typeface="Arial"/>
-              </a:rPr>
-              <a:t>L’outil que j’utiliserais pour comparer les performances techniques du sites sera LightHouse.</a:t>
-            </a:r>
-          </a:p>
-          <a:p>
-            <a:pPr lvl="0"/>
-            <a:endParaRPr lang="fr-FR" sz="1600" dirty="0" smtClean="0">
-              <a:solidFill>
-                <a:srgbClr val="000000"/>
-              </a:solidFill>
-              <a:latin typeface="Arial"/>
-              <a:ea typeface="Microsoft YaHei" pitchFamily="2"/>
-              <a:cs typeface="Arial"/>
-            </a:endParaRPr>
-          </a:p>
-          <a:p>
-            <a:pPr lvl="0"/>
-            <a:r>
-              <a:rPr lang="fr-FR" sz="1600" dirty="0" smtClean="0">
-                <a:solidFill>
-                  <a:srgbClr val="000000"/>
-                </a:solidFill>
-                <a:latin typeface="Arial"/>
-                <a:ea typeface="Microsoft YaHei" pitchFamily="2"/>
-                <a:cs typeface="Arial"/>
-              </a:rPr>
-              <a:t>Afin d'effectuer un A / B testing, j'effectuerai une capture d’écran des résultats avant / après chaque modifications pour isoler les conséquences de chaque modification</a:t>
-            </a:r>
-          </a:p>
-          <a:p>
-            <a:endParaRPr lang="fr-FR" dirty="0" smtClean="0"/>
-          </a:p>
-          <a:p>
-            <a:r>
-              <a:rPr lang="fr-FR" sz="1600" dirty="0" smtClean="0">
-                <a:solidFill>
-                  <a:srgbClr val="000000"/>
-                </a:solidFill>
-                <a:latin typeface="Arial"/>
-                <a:ea typeface="Microsoft YaHei" pitchFamily="2"/>
-                <a:cs typeface="Arial"/>
-              </a:rPr>
-              <a:t>les site sont hébergé sur :</a:t>
-            </a:r>
-          </a:p>
-          <a:p>
-            <a:pPr lvl="1"/>
-            <a:r>
-              <a:rPr lang="fr-FR" sz="1200" dirty="0" smtClean="0">
-                <a:solidFill>
-                  <a:srgbClr val="000000"/>
-                </a:solidFill>
-                <a:latin typeface="Arial" pitchFamily="34" charset="0"/>
-                <a:ea typeface="Microsoft YaHei" pitchFamily="2"/>
-                <a:cs typeface="Arial" pitchFamily="34" charset="0"/>
-                <a:hlinkClick r:id="rId2"/>
-              </a:rPr>
-              <a:t>ttps://gwenaelgressier.github.io/panthere-original/</a:t>
-            </a:r>
-            <a:r>
-              <a:rPr lang="fr-FR" sz="1200" dirty="0" smtClean="0">
-                <a:solidFill>
-                  <a:srgbClr val="000000"/>
-                </a:solidFill>
-                <a:latin typeface="Arial" pitchFamily="34" charset="0"/>
-                <a:ea typeface="Microsoft YaHei" pitchFamily="2"/>
-                <a:cs typeface="Arial" pitchFamily="34" charset="0"/>
-              </a:rPr>
-              <a:t>.   Pour le site non retouché</a:t>
-            </a:r>
-          </a:p>
-          <a:p>
-            <a:pPr lvl="1"/>
-            <a:r>
-              <a:rPr lang="fr-FR" sz="1200" u="sng" dirty="0" smtClean="0">
-                <a:latin typeface="Arial" pitchFamily="34" charset="0"/>
-                <a:cs typeface="Arial" pitchFamily="34" charset="0"/>
-                <a:hlinkClick r:id="rId3"/>
-              </a:rPr>
-              <a:t>https://gwenaelgressier.github.io/GwenaelGressier_04_28022022/</a:t>
-            </a:r>
-            <a:r>
-              <a:rPr lang="fr-FR" sz="1200" dirty="0" smtClean="0">
-                <a:latin typeface="Arial" pitchFamily="34" charset="0"/>
-                <a:cs typeface="Arial" pitchFamily="34" charset="0"/>
-              </a:rPr>
-              <a:t>.</a:t>
-            </a:r>
-            <a:r>
-              <a:rPr lang="fr-FR" sz="1200" dirty="0" smtClean="0">
-                <a:solidFill>
-                  <a:srgbClr val="000000"/>
-                </a:solidFill>
-                <a:latin typeface="Arial" pitchFamily="34" charset="0"/>
-                <a:ea typeface="Microsoft YaHei" pitchFamily="2"/>
-                <a:cs typeface="Arial" pitchFamily="34" charset="0"/>
-              </a:rPr>
-              <a:t>Pour le site retouché</a:t>
-            </a:r>
-          </a:p>
-          <a:p>
-            <a:pPr lvl="1"/>
-            <a:endParaRPr lang="fr-FR" sz="1200" dirty="0" smtClean="0">
-              <a:solidFill>
-                <a:srgbClr val="000000"/>
-              </a:solidFill>
-              <a:latin typeface="Arial" pitchFamily="34" charset="0"/>
-              <a:ea typeface="Microsoft YaHei" pitchFamily="2"/>
-              <a:cs typeface="Arial" pitchFamily="34" charset="0"/>
-            </a:endParaRPr>
-          </a:p>
-        </p:txBody>
-      </p:sp>
-      <p:sp>
-        <p:nvSpPr>
-          <p:cNvPr id="3" name="Titre 2"/>
-          <p:cNvSpPr>
-            <a:spLocks noGrp="1"/>
-          </p:cNvSpPr>
-          <p:nvPr>
-            <p:ph type="title"/>
-          </p:nvPr>
-        </p:nvSpPr>
-        <p:spPr/>
-        <p:txBody>
           <a:bodyPr>
             <a:normAutofit/>
           </a:bodyPr>
           <a:lstStyle/>
           <a:p>
             <a:r>
-              <a:rPr lang="fr-FR" sz="3600" dirty="0" smtClean="0">
-                <a:cs typeface="Tahoma" pitchFamily="2"/>
-              </a:rPr>
-              <a:t>Rapport d’optimisation</a:t>
-            </a:r>
-            <a:endParaRPr lang="fr-FR" sz="3600" dirty="0"/>
+              <a:rPr lang="fr-FR" sz="2000" dirty="0" smtClean="0"/>
+              <a:t>Bonjours ,pour </a:t>
+            </a:r>
+            <a:r>
+              <a:rPr lang="fr-FR" sz="2000" dirty="0" smtClean="0"/>
+              <a:t>se projet </a:t>
+            </a:r>
+            <a:r>
+              <a:rPr lang="fr-FR" sz="2000" dirty="0" smtClean="0"/>
+              <a:t>j’incarnerais </a:t>
+            </a:r>
+            <a:r>
+              <a:rPr lang="fr-FR" sz="2000" dirty="0" smtClean="0"/>
+              <a:t>un employer de l'agence La Panthère, une grande agence de web design basée à Lyon. L’activité de l’entreprise a bien démarré mais aujourd’hui, elle est en perte de vitesse. </a:t>
+            </a:r>
+          </a:p>
+          <a:p>
+            <a:r>
+              <a:rPr lang="fr-FR" sz="2000" dirty="0" smtClean="0"/>
+              <a:t>La fondatrice de l’entreprise, Sophie, cherche une solution pour faire repartir l’activité. En tapant “Entreprise web design Lyon” sur Internet, elle s’aperçoit que le site de l’agence apparaît seulement en deuxième page des moteurs de recherche. Par chance, un de mes collègues, lui a dit que </a:t>
+            </a:r>
+            <a:r>
+              <a:rPr lang="fr-FR" sz="2000" dirty="0" smtClean="0"/>
+              <a:t>j’</a:t>
+            </a:r>
+            <a:r>
+              <a:rPr lang="fr-FR" sz="2000" dirty="0" smtClean="0"/>
+              <a:t>é</a:t>
+            </a:r>
+            <a:r>
+              <a:rPr lang="fr-FR" sz="2000" dirty="0" smtClean="0"/>
+              <a:t>tais </a:t>
+            </a:r>
+            <a:r>
+              <a:rPr lang="fr-FR" sz="2000" dirty="0" smtClean="0"/>
+              <a:t>un spécialiste en référencement</a:t>
+            </a:r>
+            <a:r>
+              <a:rPr lang="fr-FR" sz="2000" dirty="0" smtClean="0"/>
+              <a:t>. Du coup nous allons voire ensemble se que nous pourrons faire.</a:t>
+            </a:r>
+          </a:p>
+          <a:p>
+            <a:r>
+              <a:rPr lang="fr-FR" sz="2000" dirty="0" smtClean="0"/>
+              <a:t>Dans un 1</a:t>
+            </a:r>
+            <a:r>
+              <a:rPr lang="fr-FR" sz="2000" baseline="30000" dirty="0" smtClean="0"/>
+              <a:t>er</a:t>
+            </a:r>
+            <a:r>
+              <a:rPr lang="fr-FR" sz="2000" dirty="0" smtClean="0"/>
+              <a:t> </a:t>
+            </a:r>
+            <a:r>
+              <a:rPr lang="fr-FR" sz="2000" dirty="0" err="1" smtClean="0"/>
+              <a:t>temp</a:t>
+            </a:r>
+            <a:r>
+              <a:rPr lang="fr-FR" sz="2000" dirty="0" smtClean="0"/>
+              <a:t> je vous propose de regarder mon rapport d’</a:t>
+            </a:r>
+            <a:r>
+              <a:rPr lang="fr-FR" sz="2000" dirty="0" err="1" smtClean="0"/>
+              <a:t>analise</a:t>
+            </a:r>
+            <a:r>
+              <a:rPr lang="fr-FR" sz="2000" dirty="0" smtClean="0"/>
+              <a:t> </a:t>
+            </a:r>
+            <a:endParaRPr lang="fr-FR" sz="2000" dirty="0"/>
+          </a:p>
+        </p:txBody>
+      </p:sp>
+      <p:sp>
+        <p:nvSpPr>
+          <p:cNvPr id="3" name="Titre 2"/>
+          <p:cNvSpPr>
+            <a:spLocks noGrp="1"/>
+          </p:cNvSpPr>
+          <p:nvPr>
+            <p:ph type="title"/>
+          </p:nvPr>
+        </p:nvSpPr>
+        <p:spPr/>
+        <p:txBody>
+          <a:bodyPr/>
+          <a:lstStyle/>
+          <a:p>
+            <a:r>
+              <a:rPr lang="fr-FR" b="0" dirty="0" smtClean="0"/>
+              <a:t>Présentation du projet</a:t>
+            </a:r>
+            <a:endParaRPr lang="fr-FR" dirty="0"/>
           </a:p>
         </p:txBody>
       </p:sp>
@@ -7649,58 +7731,51 @@
             <p:ph idx="1"/>
           </p:nvPr>
         </p:nvSpPr>
-        <p:spPr/>
-        <p:txBody>
-          <a:bodyPr/>
-          <a:lstStyle/>
-          <a:p>
-            <a:pPr lvl="0"/>
-            <a:r>
-              <a:rPr lang="fr-FR" sz="1600" dirty="0" smtClean="0">
-                <a:cs typeface="Tahoma" pitchFamily="2"/>
-              </a:rPr>
-              <a:t>En appliquant les autres conseils lié à la </a:t>
-            </a:r>
-            <a:r>
-              <a:rPr lang="fr-FR" sz="1600" dirty="0" err="1" smtClean="0">
-                <a:cs typeface="Tahoma" pitchFamily="2"/>
-              </a:rPr>
-              <a:t>checklist</a:t>
-            </a:r>
-            <a:r>
-              <a:rPr lang="fr-FR" sz="1600" dirty="0" smtClean="0">
-                <a:cs typeface="Tahoma" pitchFamily="2"/>
-              </a:rPr>
-              <a:t> MDN sur l’accessibilité, comme la présence d’un label pour chaque champs du formulaire, un texte alternatif pour les liens, le grossissement de certains boutons ou une meilleure structuration du site via les balises &lt;h.&gt;, on arrive à un score d’accessibilité de 100 % sur la page contact.</a:t>
-            </a:r>
-          </a:p>
-          <a:p>
-            <a:endParaRPr lang="fr-FR" dirty="0"/>
-          </a:p>
-        </p:txBody>
-      </p:sp>
-      <p:sp>
-        <p:nvSpPr>
-          <p:cNvPr id="3" name="Titre 2"/>
-          <p:cNvSpPr>
-            <a:spLocks noGrp="1"/>
-          </p:cNvSpPr>
-          <p:nvPr>
-            <p:ph type="title"/>
-          </p:nvPr>
-        </p:nvSpPr>
-        <p:spPr/>
+        <p:spPr>
+          <a:xfrm>
+            <a:off x="457200" y="1481328"/>
+            <a:ext cx="8229600" cy="3090679"/>
+          </a:xfrm>
+        </p:spPr>
         <p:txBody>
           <a:bodyPr>
-            <a:normAutofit fontScale="90000"/>
+            <a:normAutofit/>
           </a:bodyPr>
           <a:lstStyle/>
           <a:p>
+            <a:pPr lvl="0"/>
             <a:r>
               <a:rPr lang="fr-FR" dirty="0" smtClean="0">
                 <a:cs typeface="Tahoma" pitchFamily="2"/>
               </a:rPr>
-              <a:t>Corrections mineures liées à la check-list sur l’accessibilités</a:t>
+              <a:t>Les balises Alt ont maintenant une description pertinente qui contient la descriptif de l’image ou des mots clé comme le nom de l’agence, son activité ou sa localisation. LightHouse améliore le score de Best Practices, mais cela à aussi un rôle sur le SEO.</a:t>
+            </a:r>
+          </a:p>
+          <a:p>
+            <a:endParaRPr lang="fr-FR" dirty="0"/>
+          </a:p>
+        </p:txBody>
+      </p:sp>
+      <p:sp>
+        <p:nvSpPr>
+          <p:cNvPr id="3" name="Titre 2"/>
+          <p:cNvSpPr>
+            <a:spLocks noGrp="1"/>
+          </p:cNvSpPr>
+          <p:nvPr>
+            <p:ph type="title"/>
+          </p:nvPr>
+        </p:nvSpPr>
+        <p:spPr/>
+        <p:txBody>
+          <a:bodyPr/>
+          <a:lstStyle/>
+          <a:p>
+            <a:r>
+              <a:rPr lang="fr-FR" dirty="0" smtClean="0">
+                <a:cs typeface="Tahoma" pitchFamily="2"/>
+              </a:rPr>
+              <a:t>Modification des balises Alt</a:t>
             </a:r>
             <a:endParaRPr lang="fr-FR" dirty="0"/>
           </a:p>
@@ -7715,6 +7790,98 @@
 </file>
 
 <file path=ppt/slides/slide21.xml><?xml version="1.0" encoding="utf-8"?>
+<p:sld xmlns:a="http://schemas.openxmlformats.org/drawingml/2006/main" xmlns:r="http://schemas.openxmlformats.org/officeDocument/2006/relationships" xmlns:p="http://schemas.openxmlformats.org/presentationml/2006/main">
+  <p:cSld>
+    <p:spTree>
+      <p:nvGrpSpPr>
+        <p:cNvPr id="1" name=""/>
+        <p:cNvGrpSpPr/>
+        <p:nvPr/>
+      </p:nvGrpSpPr>
+      <p:grpSpPr>
+        <a:xfrm>
+          <a:off x="0" y="0"/>
+          <a:ext cx="0" cy="0"/>
+          <a:chOff x="0" y="0"/>
+          <a:chExt cx="0" cy="0"/>
+        </a:xfrm>
+      </p:grpSpPr>
+      <p:sp>
+        <p:nvSpPr>
+          <p:cNvPr id="2" name="Espace réservé du contenu 1"/>
+          <p:cNvSpPr>
+            <a:spLocks noGrp="1"/>
+          </p:cNvSpPr>
+          <p:nvPr>
+            <p:ph idx="1"/>
+          </p:nvPr>
+        </p:nvSpPr>
+        <p:spPr/>
+        <p:txBody>
+          <a:bodyPr/>
+          <a:lstStyle/>
+          <a:p>
+            <a:pPr lvl="0"/>
+            <a:r>
+              <a:rPr lang="fr-FR" sz="1600" dirty="0" smtClean="0">
+                <a:cs typeface="Tahoma" pitchFamily="2"/>
+              </a:rPr>
+              <a:t>En appliquant les autres conseils lié à la </a:t>
+            </a:r>
+            <a:r>
+              <a:rPr lang="fr-FR" sz="1600" dirty="0" err="1" smtClean="0">
+                <a:cs typeface="Tahoma" pitchFamily="2"/>
+              </a:rPr>
+              <a:t>checklist</a:t>
+            </a:r>
+            <a:r>
+              <a:rPr lang="fr-FR" sz="1600" dirty="0" smtClean="0">
+                <a:cs typeface="Tahoma" pitchFamily="2"/>
+              </a:rPr>
+              <a:t> MDN sur l’accessibilité, comme la présence d’un label pour chaque champs du formulaire, un texte alternatif pour les liens, le grossissement de certains boutons ou une meilleure structuration du site via les balises &lt;h.&gt;, on arrive à un score d’accessibilité de 100 % sur la page contact.</a:t>
+            </a:r>
+          </a:p>
+          <a:p>
+            <a:endParaRPr lang="fr-FR" dirty="0"/>
+          </a:p>
+        </p:txBody>
+      </p:sp>
+      <p:sp>
+        <p:nvSpPr>
+          <p:cNvPr id="3" name="Titre 2"/>
+          <p:cNvSpPr>
+            <a:spLocks noGrp="1"/>
+          </p:cNvSpPr>
+          <p:nvPr>
+            <p:ph type="title"/>
+          </p:nvPr>
+        </p:nvSpPr>
+        <p:spPr/>
+        <p:txBody>
+          <a:bodyPr>
+            <a:normAutofit fontScale="90000"/>
+          </a:bodyPr>
+          <a:lstStyle/>
+          <a:p>
+            <a:r>
+              <a:rPr lang="fr-FR" dirty="0" smtClean="0">
+                <a:cs typeface="Tahoma" pitchFamily="2"/>
+              </a:rPr>
+              <a:t>Corrections mineures liées à la check-list sur l’accessibilités</a:t>
+            </a:r>
+            <a:endParaRPr lang="fr-FR" dirty="0"/>
+          </a:p>
+        </p:txBody>
+      </p:sp>
+    </p:spTree>
+  </p:cSld>
+  <p:clrMapOvr>
+    <a:masterClrMapping/>
+  </p:clrMapOvr>
+</p:sld>
+</file>
+
+<file path=ppt/slides/slide22.xml><?xml version="1.0" encoding="utf-8"?>
 <p:sld xmlns:a="http://schemas.openxmlformats.org/drawingml/2006/main" xmlns:r="http://schemas.openxmlformats.org/officeDocument/2006/relationships" xmlns:p="http://schemas.openxmlformats.org/presentationml/2006/main">
   <p:cSld>
     <p:spTree>
@@ -7891,7 +8058,7 @@
 </p:sld>
 </file>
 
-<file path=ppt/slides/slide22.xml><?xml version="1.0" encoding="utf-8"?>
+<file path=ppt/slides/slide23.xml><?xml version="1.0" encoding="utf-8"?>
 <p:sld xmlns:a="http://schemas.openxmlformats.org/drawingml/2006/main" xmlns:r="http://schemas.openxmlformats.org/officeDocument/2006/relationships" xmlns:p="http://schemas.openxmlformats.org/presentationml/2006/main">
   <p:cSld>
     <p:spTree>
@@ -8104,6 +8271,206 @@
             <p:ph idx="1"/>
           </p:nvPr>
         </p:nvSpPr>
+        <p:spPr/>
+        <p:txBody>
+          <a:bodyPr/>
+          <a:lstStyle/>
+          <a:p>
+            <a:pPr lvl="0"/>
+            <a:endParaRPr lang="fr-FR" sz="1600" dirty="0" smtClean="0">
+              <a:solidFill>
+                <a:srgbClr val="000000"/>
+              </a:solidFill>
+              <a:latin typeface="Arial"/>
+              <a:ea typeface="Microsoft YaHei" pitchFamily="2"/>
+              <a:cs typeface="Arial"/>
+            </a:endParaRPr>
+          </a:p>
+          <a:p>
+            <a:pPr lvl="0"/>
+            <a:r>
+              <a:rPr lang="fr-FR" sz="1600" dirty="0" smtClean="0">
+                <a:solidFill>
+                  <a:srgbClr val="000000"/>
+                </a:solidFill>
+                <a:latin typeface="Arial"/>
+                <a:ea typeface="Microsoft YaHei" pitchFamily="2"/>
+                <a:cs typeface="Arial"/>
+              </a:rPr>
+              <a:t>L’outil que j’utiliserais pour comparer les performances techniques du sites sera LightHouse.</a:t>
+            </a:r>
+          </a:p>
+          <a:p>
+            <a:pPr lvl="0"/>
+            <a:endParaRPr lang="fr-FR" sz="1600" dirty="0" smtClean="0">
+              <a:solidFill>
+                <a:srgbClr val="000000"/>
+              </a:solidFill>
+              <a:latin typeface="Arial"/>
+              <a:ea typeface="Microsoft YaHei" pitchFamily="2"/>
+              <a:cs typeface="Arial"/>
+            </a:endParaRPr>
+          </a:p>
+          <a:p>
+            <a:pPr lvl="0"/>
+            <a:r>
+              <a:rPr lang="fr-FR" sz="1600" dirty="0" smtClean="0">
+                <a:solidFill>
+                  <a:srgbClr val="000000"/>
+                </a:solidFill>
+                <a:latin typeface="Arial"/>
+                <a:ea typeface="Microsoft YaHei" pitchFamily="2"/>
+                <a:cs typeface="Arial"/>
+              </a:rPr>
+              <a:t>Afin d'effectuer un A / B testing, j'effectuerai une capture d’écran des résultats avant / après chaque modifications pour isoler les conséquences de chaque modification</a:t>
+            </a:r>
+          </a:p>
+          <a:p>
+            <a:endParaRPr lang="fr-FR" dirty="0" smtClean="0"/>
+          </a:p>
+          <a:p>
+            <a:r>
+              <a:rPr lang="fr-FR" sz="1600" dirty="0" smtClean="0">
+                <a:solidFill>
+                  <a:srgbClr val="000000"/>
+                </a:solidFill>
+                <a:latin typeface="Arial"/>
+                <a:ea typeface="Microsoft YaHei" pitchFamily="2"/>
+                <a:cs typeface="Arial"/>
+              </a:rPr>
+              <a:t>les site sont hébergé sur :</a:t>
+            </a:r>
+          </a:p>
+          <a:p>
+            <a:pPr lvl="1"/>
+            <a:r>
+              <a:rPr lang="fr-FR" sz="1200" dirty="0" smtClean="0">
+                <a:solidFill>
+                  <a:srgbClr val="000000"/>
+                </a:solidFill>
+                <a:latin typeface="Arial" pitchFamily="34" charset="0"/>
+                <a:ea typeface="Microsoft YaHei" pitchFamily="2"/>
+                <a:cs typeface="Arial" pitchFamily="34" charset="0"/>
+                <a:hlinkClick r:id="rId2"/>
+              </a:rPr>
+              <a:t>ttps://gwenaelgressier.github.io/panthere-original/</a:t>
+            </a:r>
+            <a:r>
+              <a:rPr lang="fr-FR" sz="1200" dirty="0" smtClean="0">
+                <a:solidFill>
+                  <a:srgbClr val="000000"/>
+                </a:solidFill>
+                <a:latin typeface="Arial" pitchFamily="34" charset="0"/>
+                <a:ea typeface="Microsoft YaHei" pitchFamily="2"/>
+                <a:cs typeface="Arial" pitchFamily="34" charset="0"/>
+              </a:rPr>
+              <a:t>.   Pour le site non retouché</a:t>
+            </a:r>
+          </a:p>
+          <a:p>
+            <a:pPr lvl="1"/>
+            <a:r>
+              <a:rPr lang="fr-FR" sz="1200" u="sng" dirty="0" smtClean="0">
+                <a:latin typeface="Arial" pitchFamily="34" charset="0"/>
+                <a:cs typeface="Arial" pitchFamily="34" charset="0"/>
+                <a:hlinkClick r:id="rId3"/>
+              </a:rPr>
+              <a:t>https://gwenaelgressier.github.io/GwenaelGressier_04_28022022/</a:t>
+            </a:r>
+            <a:r>
+              <a:rPr lang="fr-FR" sz="1200" dirty="0" smtClean="0">
+                <a:latin typeface="Arial" pitchFamily="34" charset="0"/>
+                <a:cs typeface="Arial" pitchFamily="34" charset="0"/>
+              </a:rPr>
+              <a:t>.</a:t>
+            </a:r>
+            <a:r>
+              <a:rPr lang="fr-FR" sz="1200" dirty="0" smtClean="0">
+                <a:solidFill>
+                  <a:srgbClr val="000000"/>
+                </a:solidFill>
+                <a:latin typeface="Arial" pitchFamily="34" charset="0"/>
+                <a:ea typeface="Microsoft YaHei" pitchFamily="2"/>
+                <a:cs typeface="Arial" pitchFamily="34" charset="0"/>
+              </a:rPr>
+              <a:t>Pour le site retouché</a:t>
+            </a:r>
+          </a:p>
+          <a:p>
+            <a:pPr lvl="1"/>
+            <a:endParaRPr lang="fr-FR" sz="1200" dirty="0" smtClean="0">
+              <a:solidFill>
+                <a:srgbClr val="000000"/>
+              </a:solidFill>
+              <a:latin typeface="Arial" pitchFamily="34" charset="0"/>
+              <a:ea typeface="Microsoft YaHei" pitchFamily="2"/>
+              <a:cs typeface="Arial" pitchFamily="34" charset="0"/>
+            </a:endParaRPr>
+          </a:p>
+        </p:txBody>
+      </p:sp>
+      <p:sp>
+        <p:nvSpPr>
+          <p:cNvPr id="3" name="Titre 2"/>
+          <p:cNvSpPr>
+            <a:spLocks noGrp="1"/>
+          </p:cNvSpPr>
+          <p:nvPr>
+            <p:ph type="title"/>
+          </p:nvPr>
+        </p:nvSpPr>
+        <p:spPr/>
+        <p:txBody>
+          <a:bodyPr>
+            <a:normAutofit/>
+          </a:bodyPr>
+          <a:lstStyle/>
+          <a:p>
+            <a:r>
+              <a:rPr lang="fr-FR" sz="3600" dirty="0" smtClean="0">
+                <a:cs typeface="Tahoma" pitchFamily="2"/>
+              </a:rPr>
+              <a:t>Rapport d’optimisation</a:t>
+            </a:r>
+            <a:endParaRPr lang="fr-FR" sz="3600" dirty="0"/>
+          </a:p>
+        </p:txBody>
+      </p:sp>
+    </p:spTree>
+  </p:cSld>
+  <p:clrMapOvr>
+    <a:masterClrMapping/>
+  </p:clrMapOvr>
+</p:sld>
+</file>
+
+<file path=ppt/slides/slide4.xml><?xml version="1.0" encoding="utf-8"?>
+<p:sld xmlns:a="http://schemas.openxmlformats.org/drawingml/2006/main" xmlns:r="http://schemas.openxmlformats.org/officeDocument/2006/relationships" xmlns:p="http://schemas.openxmlformats.org/presentationml/2006/main">
+  <p:cSld>
+    <p:spTree>
+      <p:nvGrpSpPr>
+        <p:cNvPr id="1" name=""/>
+        <p:cNvGrpSpPr/>
+        <p:nvPr/>
+      </p:nvGrpSpPr>
+      <p:grpSpPr>
+        <a:xfrm>
+          <a:off x="0" y="0"/>
+          <a:ext cx="0" cy="0"/>
+          <a:chOff x="0" y="0"/>
+          <a:chExt cx="0" cy="0"/>
+        </a:xfrm>
+      </p:grpSpPr>
+      <p:sp>
+        <p:nvSpPr>
+          <p:cNvPr id="2" name="Espace réservé du contenu 1"/>
+          <p:cNvSpPr>
+            <a:spLocks noGrp="1"/>
+          </p:cNvSpPr>
+          <p:nvPr>
+            <p:ph idx="1"/>
+          </p:nvPr>
+        </p:nvSpPr>
         <p:spPr>
           <a:xfrm>
             <a:off x="214282" y="1357298"/>
@@ -8289,7 +8656,11 @@
           <a:p>
             <a:r>
               <a:rPr lang="fr-FR" sz="3600" dirty="0" smtClean="0"/>
-              <a:t>Page index </a:t>
+              <a:t>Page </a:t>
+            </a:r>
+            <a:r>
+              <a:rPr lang="fr-FR" sz="3600" dirty="0" smtClean="0"/>
+              <a:t>index et page 2 </a:t>
             </a:r>
             <a:r>
               <a:rPr lang="fr-FR" sz="3600" dirty="0" smtClean="0">
@@ -8480,7 +8851,7 @@
 </p:sld>
 </file>
 
-<file path=ppt/slides/slide4.xml><?xml version="1.0" encoding="utf-8"?>
+<file path=ppt/slides/slide5.xml><?xml version="1.0" encoding="utf-8"?>
 <p:sld xmlns:a="http://schemas.openxmlformats.org/drawingml/2006/main" xmlns:r="http://schemas.openxmlformats.org/officeDocument/2006/relationships" xmlns:p="http://schemas.openxmlformats.org/presentationml/2006/main">
   <p:cSld>
     <p:spTree>
@@ -8918,7 +9289,7 @@
 </p:sld>
 </file>
 
-<file path=ppt/slides/slide5.xml><?xml version="1.0" encoding="utf-8"?>
+<file path=ppt/slides/slide6.xml><?xml version="1.0" encoding="utf-8"?>
 <p:sld xmlns:a="http://schemas.openxmlformats.org/drawingml/2006/main" xmlns:r="http://schemas.openxmlformats.org/officeDocument/2006/relationships" xmlns:p="http://schemas.openxmlformats.org/presentationml/2006/main">
   <p:cSld>
     <p:spTree>
@@ -9457,7 +9828,7 @@
 </p:sld>
 </file>
 
-<file path=ppt/slides/slide6.xml><?xml version="1.0" encoding="utf-8"?>
+<file path=ppt/slides/slide7.xml><?xml version="1.0" encoding="utf-8"?>
 <p:sld xmlns:a="http://schemas.openxmlformats.org/drawingml/2006/main" xmlns:r="http://schemas.openxmlformats.org/officeDocument/2006/relationships" xmlns:p="http://schemas.openxmlformats.org/presentationml/2006/main">
   <p:cSld>
     <p:spTree>
@@ -9919,115 +10290,6 @@
 </p:sld>
 </file>
 
-<file path=ppt/slides/slide7.xml><?xml version="1.0" encoding="utf-8"?>
-<p:sld xmlns:a="http://schemas.openxmlformats.org/drawingml/2006/main" xmlns:r="http://schemas.openxmlformats.org/officeDocument/2006/relationships" xmlns:p="http://schemas.openxmlformats.org/presentationml/2006/main">
-  <p:cSld>
-    <p:spTree>
-      <p:nvGrpSpPr>
-        <p:cNvPr id="1" name=""/>
-        <p:cNvGrpSpPr/>
-        <p:nvPr/>
-      </p:nvGrpSpPr>
-      <p:grpSpPr>
-        <a:xfrm>
-          <a:off x="0" y="0"/>
-          <a:ext cx="0" cy="0"/>
-          <a:chOff x="0" y="0"/>
-          <a:chExt cx="0" cy="0"/>
-        </a:xfrm>
-      </p:grpSpPr>
-      <p:sp>
-        <p:nvSpPr>
-          <p:cNvPr id="2" name="Espace réservé du contenu 1"/>
-          <p:cNvSpPr>
-            <a:spLocks noGrp="1"/>
-          </p:cNvSpPr>
-          <p:nvPr>
-            <p:ph idx="1"/>
-          </p:nvPr>
-        </p:nvSpPr>
-        <p:spPr>
-          <a:xfrm>
-            <a:off x="457200" y="1481329"/>
-            <a:ext cx="8229600" cy="1376168"/>
-          </a:xfrm>
-        </p:spPr>
-        <p:txBody>
-          <a:bodyPr/>
-          <a:lstStyle/>
-          <a:p>
-            <a:pPr lvl="0"/>
-            <a:r>
-              <a:rPr lang="fr-FR" sz="1600" dirty="0" smtClean="0">
-                <a:cs typeface="Tahoma" pitchFamily="2"/>
-              </a:rPr>
-              <a:t>Utiliser du texte tout petit et/ou transparent pour spammer les mots clés est une mauvaise idée : c’est une technique « black </a:t>
-            </a:r>
-            <a:r>
-              <a:rPr lang="fr-FR" sz="1600" dirty="0" err="1" smtClean="0">
-                <a:cs typeface="Tahoma" pitchFamily="2"/>
-              </a:rPr>
-              <a:t>hat</a:t>
-            </a:r>
-            <a:r>
-              <a:rPr lang="fr-FR" sz="1600" dirty="0" smtClean="0">
-                <a:cs typeface="Tahoma" pitchFamily="2"/>
-              </a:rPr>
-              <a:t> »  très grossière et Google la repère très rapidement. Ensuite, vous êtes pénalisé. LightHouse ne prend pas ce paramètre en compte, les notes ne changent donc pas mais il est primordial de les supprimer.</a:t>
-            </a:r>
-          </a:p>
-          <a:p>
-            <a:endParaRPr lang="fr-FR" dirty="0"/>
-          </a:p>
-        </p:txBody>
-      </p:sp>
-      <p:sp>
-        <p:nvSpPr>
-          <p:cNvPr id="3" name="Titre 2"/>
-          <p:cNvSpPr>
-            <a:spLocks noGrp="1"/>
-          </p:cNvSpPr>
-          <p:nvPr>
-            <p:ph type="title"/>
-          </p:nvPr>
-        </p:nvSpPr>
-        <p:spPr/>
-        <p:txBody>
-          <a:bodyPr>
-            <a:normAutofit fontScale="90000"/>
-          </a:bodyPr>
-          <a:lstStyle/>
-          <a:p>
-            <a:r>
-              <a:rPr lang="fr-FR" dirty="0" smtClean="0">
-                <a:cs typeface="Tahoma" pitchFamily="2"/>
-              </a:rPr>
-              <a:t>Suppression des </a:t>
-            </a:r>
-            <a:r>
-              <a:rPr lang="fr-FR" dirty="0" err="1" smtClean="0">
-                <a:cs typeface="Tahoma" pitchFamily="2"/>
-              </a:rPr>
-              <a:t>divs</a:t>
-            </a:r>
-            <a:r>
-              <a:rPr lang="fr-FR" dirty="0" smtClean="0">
-                <a:cs typeface="Tahoma" pitchFamily="2"/>
-              </a:rPr>
-              <a:t> « keywords »</a:t>
-            </a:r>
-            <a:endParaRPr lang="fr-FR" dirty="0"/>
-          </a:p>
-        </p:txBody>
-      </p:sp>
-    </p:spTree>
-  </p:cSld>
-  <p:clrMapOvr>
-    <a:masterClrMapping/>
-  </p:clrMapOvr>
-</p:sld>
-</file>
-
 <file path=ppt/slides/slide8.xml><?xml version="1.0" encoding="utf-8"?>
 <p:sld xmlns:a="http://schemas.openxmlformats.org/drawingml/2006/main" xmlns:r="http://schemas.openxmlformats.org/officeDocument/2006/relationships" xmlns:p="http://schemas.openxmlformats.org/presentationml/2006/main">
   <p:cSld>
@@ -10057,123 +10319,75 @@
         </p:nvSpPr>
         <p:spPr>
           <a:xfrm>
-            <a:off x="457200" y="1481328"/>
-            <a:ext cx="8229600" cy="1590481"/>
+            <a:off x="457200" y="1481329"/>
+            <a:ext cx="8229600" cy="1376168"/>
           </a:xfrm>
         </p:spPr>
         <p:txBody>
+          <a:bodyPr/>
+          <a:lstStyle/>
+          <a:p>
+            <a:pPr lvl="0"/>
+            <a:r>
+              <a:rPr lang="fr-FR" sz="1600" dirty="0" smtClean="0">
+                <a:cs typeface="Tahoma" pitchFamily="2"/>
+              </a:rPr>
+              <a:t>Utiliser du texte tout petit et/ou transparent pour spammer les mots clés est une mauvaise idée : c’est une technique « black </a:t>
+            </a:r>
+            <a:r>
+              <a:rPr lang="fr-FR" sz="1600" dirty="0" err="1" smtClean="0">
+                <a:cs typeface="Tahoma" pitchFamily="2"/>
+              </a:rPr>
+              <a:t>hat</a:t>
+            </a:r>
+            <a:r>
+              <a:rPr lang="fr-FR" sz="1600" dirty="0" smtClean="0">
+                <a:cs typeface="Tahoma" pitchFamily="2"/>
+              </a:rPr>
+              <a:t> »  très grossière et Google la repère très rapidement. Ensuite, vous êtes pénalisé. LightHouse ne prend pas ce paramètre en compte, les notes ne changent donc pas mais il est primordial de les supprimer.</a:t>
+            </a:r>
+          </a:p>
+          <a:p>
+            <a:endParaRPr lang="fr-FR" dirty="0"/>
+          </a:p>
+        </p:txBody>
+      </p:sp>
+      <p:sp>
+        <p:nvSpPr>
+          <p:cNvPr id="3" name="Titre 2"/>
+          <p:cNvSpPr>
+            <a:spLocks noGrp="1"/>
+          </p:cNvSpPr>
+          <p:nvPr>
+            <p:ph type="title"/>
+          </p:nvPr>
+        </p:nvSpPr>
+        <p:spPr/>
+        <p:txBody>
           <a:bodyPr>
-            <a:normAutofit fontScale="62500" lnSpcReduction="20000"/>
+            <a:normAutofit fontScale="90000"/>
           </a:bodyPr>
           <a:lstStyle/>
           <a:p>
-            <a:pPr lvl="0"/>
-            <a:r>
-              <a:rPr lang="fr-FR" sz="1900" dirty="0" smtClean="0">
+            <a:r>
+              <a:rPr lang="fr-FR" dirty="0" smtClean="0">
                 <a:cs typeface="Tahoma" pitchFamily="2"/>
               </a:rPr>
-              <a:t>Le terme « Page2 » est présent en tant que nom de fichier, balise title de la page, et en format texte dans le menu en tant que lien hypertexte.</a:t>
-            </a:r>
-          </a:p>
-          <a:p>
-            <a:pPr lvl="0"/>
-            <a:endParaRPr lang="fr-FR" sz="1900" dirty="0" smtClean="0">
-              <a:cs typeface="Tahoma" pitchFamily="2"/>
-            </a:endParaRPr>
-          </a:p>
-          <a:p>
-            <a:pPr lvl="0"/>
-            <a:r>
-              <a:rPr lang="fr-FR" sz="1900" dirty="0" smtClean="0">
+              <a:t>Suppression des </a:t>
+            </a:r>
+            <a:r>
+              <a:rPr lang="fr-FR" dirty="0" err="1" smtClean="0">
                 <a:cs typeface="Tahoma" pitchFamily="2"/>
               </a:rPr>
-              <a:t> Le terme « Page2 » sera remplacées par « Contact » pour que ce soit plus clair à la fois pour les moteurs de recherche, et les utilisateurs</a:t>
-            </a:r>
-          </a:p>
-          <a:p>
-            <a:pPr lvl="0"/>
-            <a:endParaRPr lang="fr-FR" sz="1900" dirty="0" smtClean="0">
-              <a:cs typeface="Tahoma" pitchFamily="2"/>
-            </a:endParaRPr>
-          </a:p>
-          <a:p>
-            <a:pPr lvl="0"/>
-            <a:r>
-              <a:rPr lang="fr-FR" sz="1900" dirty="0" smtClean="0">
+              <a:t>divs</a:t>
+            </a:r>
+            <a:r>
+              <a:rPr lang="fr-FR" dirty="0" smtClean="0">
                 <a:cs typeface="Tahoma" pitchFamily="2"/>
               </a:rPr>
-              <a:t>Cela n’affecte pas le score de </a:t>
-            </a:r>
-            <a:r>
-              <a:rPr lang="fr-FR" sz="1900" dirty="0" err="1" smtClean="0">
-                <a:cs typeface="Tahoma" pitchFamily="2"/>
-              </a:rPr>
-              <a:t>seo</a:t>
-            </a:r>
-            <a:r>
-              <a:rPr lang="fr-FR" sz="1900" dirty="0" smtClean="0">
-                <a:cs typeface="Tahoma" pitchFamily="2"/>
-              </a:rPr>
-              <a:t> de LightHouse </a:t>
-            </a:r>
-          </a:p>
-          <a:p>
-            <a:pPr lvl="0"/>
-            <a:r>
-              <a:rPr lang="fr-FR" sz="1900" dirty="0" smtClean="0">
-                <a:cs typeface="Tahoma" pitchFamily="2"/>
-              </a:rPr>
-              <a:t>Mais cela affecte le SEO de </a:t>
-            </a:r>
-            <a:r>
-              <a:rPr lang="fr-FR" sz="1900" dirty="0" err="1" smtClean="0">
-                <a:cs typeface="Tahoma" pitchFamily="2"/>
-              </a:rPr>
-              <a:t>google</a:t>
-            </a:r>
-            <a:r>
-              <a:rPr lang="fr-FR" sz="1900" dirty="0" smtClean="0">
-                <a:cs typeface="Tahoma" pitchFamily="2"/>
-              </a:rPr>
-              <a:t>.</a:t>
-            </a:r>
-          </a:p>
-          <a:p>
-            <a:pPr lvl="0"/>
-            <a:endParaRPr lang="fr-FR" sz="1900" dirty="0" smtClean="0">
-              <a:cs typeface="Tahoma" pitchFamily="2"/>
-            </a:endParaRPr>
-          </a:p>
-          <a:p>
-            <a:pPr lvl="0"/>
+              <a:t> « keywords »</a:t>
+            </a:r>
             <a:endParaRPr lang="fr-FR" dirty="0"/>
-          </a:p>
-        </p:txBody>
-      </p:sp>
-      <p:sp>
-        <p:nvSpPr>
-          <p:cNvPr id="3" name="Titre 2"/>
-          <p:cNvSpPr>
-            <a:spLocks noGrp="1"/>
-          </p:cNvSpPr>
-          <p:nvPr>
-            <p:ph type="title"/>
-          </p:nvPr>
-        </p:nvSpPr>
-        <p:spPr/>
-        <p:txBody>
-          <a:bodyPr>
-            <a:normAutofit/>
-          </a:bodyPr>
-          <a:lstStyle/>
-          <a:p>
-            <a:r>
-              <a:rPr lang="fr-FR" sz="3200" dirty="0" smtClean="0">
-                <a:cs typeface="Tahoma" pitchFamily="2"/>
-              </a:rPr>
-              <a:t>Modifier les occurrences « page2 » par « contact »</a:t>
-            </a:r>
-            <a:endParaRPr lang="fr-FR" sz="3200" dirty="0"/>
           </a:p>
         </p:txBody>
       </p:sp>
@@ -10212,41 +10426,97 @@
             <p:ph idx="1"/>
           </p:nvPr>
         </p:nvSpPr>
-        <p:spPr/>
-        <p:txBody>
-          <a:bodyPr/>
+        <p:spPr>
+          <a:xfrm>
+            <a:off x="457200" y="1481328"/>
+            <a:ext cx="8229600" cy="1590481"/>
+          </a:xfrm>
+        </p:spPr>
+        <p:txBody>
+          <a:bodyPr>
+            <a:normAutofit fontScale="62500" lnSpcReduction="20000"/>
+          </a:bodyPr>
           <a:lstStyle/>
           <a:p>
             <a:pPr lvl="0"/>
             <a:r>
-              <a:rPr lang="fr-FR" sz="1600" dirty="0" smtClean="0">
+              <a:rPr lang="fr-FR" sz="1900" dirty="0" smtClean="0">
                 <a:cs typeface="Tahoma" pitchFamily="2"/>
               </a:rPr>
-              <a:t>Il vaut mieux privilégier la qualité à la quantité, c’est partenaires et </a:t>
-            </a:r>
-            <a:r>
-              <a:rPr lang="fr-FR" sz="1600" dirty="0" err="1" smtClean="0">
+              <a:t>Le terme « Page2 » est présent en tant que nom de fichier, balise title de la page, et en format texte dans le menu en tant que lien hypertexte.</a:t>
+            </a:r>
+          </a:p>
+          <a:p>
+            <a:pPr lvl="0"/>
+            <a:endParaRPr lang="fr-FR" sz="1900" dirty="0" smtClean="0">
+              <a:cs typeface="Tahoma" pitchFamily="2"/>
+            </a:endParaRPr>
+          </a:p>
+          <a:p>
+            <a:pPr lvl="0"/>
+            <a:r>
+              <a:rPr lang="fr-FR" sz="1900" dirty="0" smtClean="0">
                 <a:cs typeface="Tahoma" pitchFamily="2"/>
               </a:rPr>
-              <a:t>backlinks</a:t>
-            </a:r>
-            <a:r>
-              <a:rPr lang="fr-FR" sz="1600" dirty="0" smtClean="0">
+              <a:t> Le terme « Page2 » sera remplacées par « Contact » pour que ce soit plus clair à la fois pour les moteurs de recherche, et les utilisateurs</a:t>
+            </a:r>
+          </a:p>
+          <a:p>
+            <a:pPr lvl="0"/>
+            <a:endParaRPr lang="fr-FR" sz="1900" dirty="0" smtClean="0">
+              <a:cs typeface="Tahoma" pitchFamily="2"/>
+            </a:endParaRPr>
+          </a:p>
+          <a:p>
+            <a:pPr lvl="0"/>
+            <a:r>
+              <a:rPr lang="fr-FR" sz="1900" dirty="0" smtClean="0">
                 <a:cs typeface="Tahoma" pitchFamily="2"/>
               </a:rPr>
-              <a:t> ne sont pas pertinents pour votre entreprise car</a:t>
-            </a:r>
-          </a:p>
-          <a:p>
-            <a:pPr lvl="0"/>
-            <a:r>
-              <a:rPr lang="fr-FR" sz="1600" dirty="0" smtClean="0">
+              <a:t>Cela n’affecte pas le score de </a:t>
+            </a:r>
+            <a:r>
+              <a:rPr lang="fr-FR" sz="1900" dirty="0" err="1" smtClean="0">
                 <a:cs typeface="Tahoma" pitchFamily="2"/>
               </a:rPr>
-              <a:t>ils sont de mauvaise qualité ou hors sujet. Ils ont même un impact négatif car cela s’apparente à du spam.</a:t>
-            </a:r>
-          </a:p>
-          <a:p>
+              <a:t>seo</a:t>
+            </a:r>
+            <a:r>
+              <a:rPr lang="fr-FR" sz="1900" dirty="0" smtClean="0">
+                <a:cs typeface="Tahoma" pitchFamily="2"/>
+              </a:rPr>
+              <a:t> de LightHouse </a:t>
+            </a:r>
+          </a:p>
+          <a:p>
+            <a:pPr lvl="0"/>
+            <a:r>
+              <a:rPr lang="fr-FR" sz="1900" dirty="0" smtClean="0">
+                <a:cs typeface="Tahoma" pitchFamily="2"/>
+              </a:rPr>
+              <a:t>Mais cela affecte le SEO de </a:t>
+            </a:r>
+            <a:r>
+              <a:rPr lang="fr-FR" sz="1900" dirty="0" err="1" smtClean="0">
+                <a:cs typeface="Tahoma" pitchFamily="2"/>
+              </a:rPr>
+              <a:t>google</a:t>
+            </a:r>
+            <a:r>
+              <a:rPr lang="fr-FR" sz="1900" dirty="0" smtClean="0">
+                <a:cs typeface="Tahoma" pitchFamily="2"/>
+              </a:rPr>
+              <a:t>.</a:t>
+            </a:r>
+          </a:p>
+          <a:p>
+            <a:pPr lvl="0"/>
+            <a:endParaRPr lang="fr-FR" sz="1900" dirty="0" smtClean="0">
+              <a:cs typeface="Tahoma" pitchFamily="2"/>
+            </a:endParaRPr>
+          </a:p>
+          <a:p>
+            <a:pPr lvl="0"/>
             <a:endParaRPr lang="fr-FR" dirty="0"/>
           </a:p>
         </p:txBody>
@@ -10264,109 +10534,17 @@
         <p:spPr/>
         <p:txBody>
           <a:bodyPr>
-            <a:normAutofit fontScale="90000"/>
+            <a:normAutofit/>
           </a:bodyPr>
           <a:lstStyle/>
           <a:p>
             <a:r>
-              <a:rPr lang="fr-FR" dirty="0" smtClean="0">
+              <a:rPr lang="fr-FR" sz="3200" dirty="0" smtClean="0">
                 <a:cs typeface="Tahoma" pitchFamily="2"/>
               </a:rPr>
-              <a:t>Suppression de l’annuaire et des partenaires</a:t>
-            </a:r>
-            <a:endParaRPr lang="fr-FR" dirty="0"/>
-          </a:p>
-        </p:txBody>
-      </p:sp>
-      <p:pic>
-        <p:nvPicPr>
-          <p:cNvPr id="2050" name="Picture 2" descr="C:\Users\gress\Desktop\P4_gressier_gwenael\seo page 2 apres modif footer.PNG"/>
-          <p:cNvPicPr>
-            <a:picLocks noChangeAspect="1" noChangeArrowheads="1"/>
-          </p:cNvPicPr>
-          <p:nvPr/>
-        </p:nvPicPr>
-        <p:blipFill>
-          <a:blip r:embed="rId2" cstate="print"/>
-          <a:srcRect/>
-          <a:stretch>
-            <a:fillRect/>
-          </a:stretch>
-        </p:blipFill>
-        <p:spPr bwMode="auto">
-          <a:xfrm>
-            <a:off x="5715008" y="4572008"/>
-            <a:ext cx="1058862" cy="1333500"/>
-          </a:xfrm>
-          <a:prstGeom prst="rect">
-            <a:avLst/>
-          </a:prstGeom>
-          <a:noFill/>
-        </p:spPr>
-      </p:pic>
-      <p:pic>
-        <p:nvPicPr>
-          <p:cNvPr id="2051" name="Picture 3" descr="C:\Users\gress\Desktop\P4_gressier_gwenael\lighthouse sur index apres modif description.PNG"/>
-          <p:cNvPicPr>
-            <a:picLocks noChangeAspect="1" noChangeArrowheads="1"/>
-          </p:cNvPicPr>
-          <p:nvPr/>
-        </p:nvPicPr>
-        <p:blipFill>
-          <a:blip r:embed="rId3" cstate="print"/>
-          <a:srcRect/>
-          <a:stretch>
-            <a:fillRect/>
-          </a:stretch>
-        </p:blipFill>
-        <p:spPr bwMode="auto">
-          <a:xfrm>
-            <a:off x="2571736" y="4572008"/>
-            <a:ext cx="1082675" cy="1341437"/>
-          </a:xfrm>
-          <a:prstGeom prst="rect">
-            <a:avLst/>
-          </a:prstGeom>
-          <a:noFill/>
-        </p:spPr>
-      </p:pic>
-      <p:sp>
-        <p:nvSpPr>
-          <p:cNvPr id="6" name="Flèche droite 5"/>
-          <p:cNvSpPr/>
-          <p:nvPr/>
-        </p:nvSpPr>
-        <p:spPr>
-          <a:xfrm>
-            <a:off x="3929058" y="5214950"/>
-            <a:ext cx="1500198" cy="142876"/>
-          </a:xfrm>
-          <a:prstGeom prst="rightArrow">
-            <a:avLst/>
-          </a:prstGeom>
-        </p:spPr>
-        <p:style>
-          <a:lnRef idx="2">
-            <a:schemeClr val="accent1">
-              <a:shade val="50000"/>
-            </a:schemeClr>
-          </a:lnRef>
-          <a:fillRef idx="1">
-            <a:schemeClr val="accent1"/>
-          </a:fillRef>
-          <a:effectRef idx="0">
-            <a:schemeClr val="accent1"/>
-          </a:effectRef>
-          <a:fontRef idx="minor">
-            <a:schemeClr val="lt1"/>
-          </a:fontRef>
-        </p:style>
-        <p:txBody>
-          <a:bodyPr rtlCol="0" anchor="ctr"/>
-          <a:lstStyle/>
-          <a:p>
-            <a:pPr algn="ctr"/>
-            <a:endParaRPr lang="fr-FR"/>
+              <a:t>Modifier les occurrences « page2 » par « contact »</a:t>
+            </a:r>
+            <a:endParaRPr lang="fr-FR" sz="3200" dirty="0"/>
           </a:p>
         </p:txBody>
       </p:sp>

</xml_diff>